<commit_message>
- dodao sam dva slajda, jedan s animacijom realizacije AR
</commit_message>
<xml_diff>
--- a/Prezentacija/FERmula 1.pptx
+++ b/Prezentacija/FERmula 1.pptx
@@ -7,6 +7,7 @@
   <p:sldIdLst>
     <p:sldId id="256" r:id="rId2"/>
     <p:sldId id="257" r:id="rId3"/>
+    <p:sldId id="258" r:id="rId4"/>
   </p:sldIdLst>
   <p:sldSz cx="9144000" cy="6858000" type="screen4x3"/>
   <p:notesSz cx="6858000" cy="9144000"/>
@@ -356,6 +357,7 @@
           <a:p>
             <a:fld id="{2DBBB0F6-46EE-46F2-B73E-356937B7D97C}" type="datetimeFigureOut">
               <a:rPr lang="hr-HR" smtClean="0"/>
+              <a:pPr/>
               <a:t>20.12.2010.</a:t>
             </a:fld>
             <a:endParaRPr lang="hr-HR"/>
@@ -398,6 +400,7 @@
           <a:p>
             <a:fld id="{D936D0F5-8833-46C7-8D0C-B1757B67FA88}" type="slidenum">
               <a:rPr lang="hr-HR" smtClean="0"/>
+              <a:pPr/>
               <a:t>‹#›</a:t>
             </a:fld>
             <a:endParaRPr lang="hr-HR"/>
@@ -579,6 +582,7 @@
           <a:p>
             <a:fld id="{2DBBB0F6-46EE-46F2-B73E-356937B7D97C}" type="datetimeFigureOut">
               <a:rPr lang="hr-HR" smtClean="0"/>
+              <a:pPr/>
               <a:t>20.12.2010.</a:t>
             </a:fld>
             <a:endParaRPr lang="hr-HR"/>
@@ -621,6 +625,7 @@
           <a:p>
             <a:fld id="{D936D0F5-8833-46C7-8D0C-B1757B67FA88}" type="slidenum">
               <a:rPr lang="hr-HR" smtClean="0"/>
+              <a:pPr/>
               <a:t>‹#›</a:t>
             </a:fld>
             <a:endParaRPr lang="hr-HR"/>
@@ -859,6 +864,7 @@
           <a:p>
             <a:fld id="{2DBBB0F6-46EE-46F2-B73E-356937B7D97C}" type="datetimeFigureOut">
               <a:rPr lang="hr-HR" smtClean="0"/>
+              <a:pPr/>
               <a:t>20.12.2010.</a:t>
             </a:fld>
             <a:endParaRPr lang="hr-HR"/>
@@ -906,6 +912,7 @@
           <a:p>
             <a:fld id="{D936D0F5-8833-46C7-8D0C-B1757B67FA88}" type="slidenum">
               <a:rPr lang="hr-HR" smtClean="0"/>
+              <a:pPr/>
               <a:t>‹#›</a:t>
             </a:fld>
             <a:endParaRPr lang="hr-HR"/>
@@ -1038,6 +1045,7 @@
           <a:p>
             <a:fld id="{2DBBB0F6-46EE-46F2-B73E-356937B7D97C}" type="datetimeFigureOut">
               <a:rPr lang="hr-HR" smtClean="0"/>
+              <a:pPr/>
               <a:t>20.12.2010.</a:t>
             </a:fld>
             <a:endParaRPr lang="hr-HR"/>
@@ -1080,6 +1088,7 @@
           <a:p>
             <a:fld id="{D936D0F5-8833-46C7-8D0C-B1757B67FA88}" type="slidenum">
               <a:rPr lang="hr-HR" smtClean="0"/>
+              <a:pPr/>
               <a:t>‹#›</a:t>
             </a:fld>
             <a:endParaRPr lang="hr-HR"/>
@@ -1396,6 +1405,7 @@
           <a:p>
             <a:fld id="{2DBBB0F6-46EE-46F2-B73E-356937B7D97C}" type="datetimeFigureOut">
               <a:rPr lang="hr-HR" smtClean="0"/>
+              <a:pPr/>
               <a:t>20.12.2010.</a:t>
             </a:fld>
             <a:endParaRPr lang="hr-HR"/>
@@ -1438,6 +1448,7 @@
           <a:p>
             <a:fld id="{D936D0F5-8833-46C7-8D0C-B1757B67FA88}" type="slidenum">
               <a:rPr lang="hr-HR" smtClean="0"/>
+              <a:pPr/>
               <a:t>‹#›</a:t>
             </a:fld>
             <a:endParaRPr lang="hr-HR"/>
@@ -1683,6 +1694,7 @@
           <a:p>
             <a:fld id="{2DBBB0F6-46EE-46F2-B73E-356937B7D97C}" type="datetimeFigureOut">
               <a:rPr lang="hr-HR" smtClean="0"/>
+              <a:pPr/>
               <a:t>20.12.2010.</a:t>
             </a:fld>
             <a:endParaRPr lang="hr-HR"/>
@@ -1725,6 +1737,7 @@
           <a:p>
             <a:fld id="{D936D0F5-8833-46C7-8D0C-B1757B67FA88}" type="slidenum">
               <a:rPr lang="hr-HR" smtClean="0"/>
+              <a:pPr/>
               <a:t>‹#›</a:t>
             </a:fld>
             <a:endParaRPr lang="hr-HR"/>
@@ -2105,6 +2118,7 @@
           <a:p>
             <a:fld id="{2DBBB0F6-46EE-46F2-B73E-356937B7D97C}" type="datetimeFigureOut">
               <a:rPr lang="hr-HR" smtClean="0"/>
+              <a:pPr/>
               <a:t>20.12.2010.</a:t>
             </a:fld>
             <a:endParaRPr lang="hr-HR"/>
@@ -2147,6 +2161,7 @@
           <a:p>
             <a:fld id="{D936D0F5-8833-46C7-8D0C-B1757B67FA88}" type="slidenum">
               <a:rPr lang="hr-HR" smtClean="0"/>
+              <a:pPr/>
               <a:t>‹#›</a:t>
             </a:fld>
             <a:endParaRPr lang="hr-HR"/>
@@ -2220,6 +2235,7 @@
           <a:p>
             <a:fld id="{2DBBB0F6-46EE-46F2-B73E-356937B7D97C}" type="datetimeFigureOut">
               <a:rPr lang="hr-HR" smtClean="0"/>
+              <a:pPr/>
               <a:t>20.12.2010.</a:t>
             </a:fld>
             <a:endParaRPr lang="hr-HR"/>
@@ -2262,6 +2278,7 @@
           <a:p>
             <a:fld id="{D936D0F5-8833-46C7-8D0C-B1757B67FA88}" type="slidenum">
               <a:rPr lang="hr-HR" smtClean="0"/>
+              <a:pPr/>
               <a:t>‹#›</a:t>
             </a:fld>
             <a:endParaRPr lang="hr-HR"/>
@@ -2310,6 +2327,7 @@
           <a:p>
             <a:fld id="{2DBBB0F6-46EE-46F2-B73E-356937B7D97C}" type="datetimeFigureOut">
               <a:rPr lang="hr-HR" smtClean="0"/>
+              <a:pPr/>
               <a:t>20.12.2010.</a:t>
             </a:fld>
             <a:endParaRPr lang="hr-HR"/>
@@ -2352,6 +2370,7 @@
           <a:p>
             <a:fld id="{D936D0F5-8833-46C7-8D0C-B1757B67FA88}" type="slidenum">
               <a:rPr lang="hr-HR" smtClean="0"/>
+              <a:pPr/>
               <a:t>‹#›</a:t>
             </a:fld>
             <a:endParaRPr lang="hr-HR"/>
@@ -2588,6 +2607,7 @@
           <a:p>
             <a:fld id="{2DBBB0F6-46EE-46F2-B73E-356937B7D97C}" type="datetimeFigureOut">
               <a:rPr lang="hr-HR" smtClean="0"/>
+              <a:pPr/>
               <a:t>20.12.2010.</a:t>
             </a:fld>
             <a:endParaRPr lang="hr-HR"/>
@@ -2630,6 +2650,7 @@
           <a:p>
             <a:fld id="{D936D0F5-8833-46C7-8D0C-B1757B67FA88}" type="slidenum">
               <a:rPr lang="hr-HR" smtClean="0"/>
+              <a:pPr/>
               <a:t>‹#›</a:t>
             </a:fld>
             <a:endParaRPr lang="hr-HR"/>
@@ -2954,6 +2975,7 @@
           <a:p>
             <a:fld id="{2DBBB0F6-46EE-46F2-B73E-356937B7D97C}" type="datetimeFigureOut">
               <a:rPr lang="hr-HR" smtClean="0"/>
+              <a:pPr/>
               <a:t>20.12.2010.</a:t>
             </a:fld>
             <a:endParaRPr lang="hr-HR"/>
@@ -3110,6 +3132,7 @@
           <a:p>
             <a:fld id="{D936D0F5-8833-46C7-8D0C-B1757B67FA88}" type="slidenum">
               <a:rPr lang="hr-HR" smtClean="0"/>
+              <a:pPr/>
               <a:t>‹#›</a:t>
             </a:fld>
             <a:endParaRPr lang="hr-HR"/>
@@ -3391,6 +3414,7 @@
           <a:p>
             <a:fld id="{2DBBB0F6-46EE-46F2-B73E-356937B7D97C}" type="datetimeFigureOut">
               <a:rPr lang="hr-HR" smtClean="0"/>
+              <a:pPr/>
               <a:t>20.12.2010.</a:t>
             </a:fld>
             <a:endParaRPr lang="hr-HR"/>
@@ -3471,6 +3495,7 @@
           <a:p>
             <a:fld id="{D936D0F5-8833-46C7-8D0C-B1757B67FA88}" type="slidenum">
               <a:rPr lang="hr-HR" smtClean="0"/>
+              <a:pPr/>
               <a:t>‹#›</a:t>
             </a:fld>
             <a:endParaRPr lang="hr-HR"/>
@@ -3908,6 +3933,14 @@
           <a:prstGeom prst="rect">
             <a:avLst/>
           </a:prstGeom>
+          <a:effectLst>
+            <a:glow rad="63500">
+              <a:schemeClr val="accent1">
+                <a:satMod val="175000"/>
+                <a:alpha val="40000"/>
+              </a:schemeClr>
+            </a:glow>
+          </a:effectLst>
         </p:spPr>
       </p:pic>
       <p:pic>
@@ -3926,7 +3959,7 @@
         </p:blipFill>
         <p:spPr>
           <a:xfrm rot="857971">
-            <a:off x="2713982" y="3224441"/>
+            <a:off x="2696163" y="3073024"/>
             <a:ext cx="4548063" cy="3456528"/>
           </a:xfrm>
           <a:prstGeom prst="rect">
@@ -3936,10 +3969,10 @@
             <a:noFill/>
           </a:ln>
           <a:effectLst>
-            <a:outerShdw blurRad="292100" dist="139700" dir="2700000" algn="tl" rotWithShape="0">
-              <a:srgbClr val="333333">
-                <a:alpha val="65000"/>
-              </a:srgbClr>
+            <a:outerShdw blurRad="76200" dir="13500000" sy="23000" kx="1200000" algn="br" rotWithShape="0">
+              <a:prstClr val="black">
+                <a:alpha val="20000"/>
+              </a:prstClr>
             </a:outerShdw>
           </a:effectLst>
         </p:spPr>
@@ -3952,7 +3985,170 @@
   <p:timing>
     <p:tnLst>
       <p:par>
-        <p:cTn id="1" dur="indefinite" restart="never" nodeType="tmRoot"/>
+        <p:cTn id="1" dur="indefinite" restart="never" nodeType="tmRoot">
+          <p:childTnLst>
+            <p:seq concurrent="1" nextAc="seek">
+              <p:cTn id="2" dur="indefinite" nodeType="mainSeq">
+                <p:childTnLst>
+                  <p:par>
+                    <p:cTn id="3" fill="hold">
+                      <p:stCondLst>
+                        <p:cond delay="indefinite"/>
+                        <p:cond evt="onBegin" delay="0">
+                          <p:tn val="2"/>
+                        </p:cond>
+                      </p:stCondLst>
+                      <p:childTnLst>
+                        <p:par>
+                          <p:cTn id="4" fill="hold">
+                            <p:stCondLst>
+                              <p:cond delay="0"/>
+                            </p:stCondLst>
+                            <p:childTnLst>
+                              <p:par>
+                                <p:cTn id="5" presetID="15" presetClass="entr" presetSubtype="0" fill="hold" nodeType="withEffect">
+                                  <p:stCondLst>
+                                    <p:cond delay="0"/>
+                                  </p:stCondLst>
+                                  <p:childTnLst>
+                                    <p:set>
+                                      <p:cBhvr>
+                                        <p:cTn id="6" dur="1" fill="hold">
+                                          <p:stCondLst>
+                                            <p:cond delay="0"/>
+                                          </p:stCondLst>
+                                        </p:cTn>
+                                        <p:tgtEl>
+                                          <p:spTgt spid="8"/>
+                                        </p:tgtEl>
+                                        <p:attrNameLst>
+                                          <p:attrName>style.visibility</p:attrName>
+                                        </p:attrNameLst>
+                                      </p:cBhvr>
+                                      <p:to>
+                                        <p:strVal val="visible"/>
+                                      </p:to>
+                                    </p:set>
+                                    <p:anim calcmode="lin" valueType="num">
+                                      <p:cBhvr>
+                                        <p:cTn id="7" dur="1000" fill="hold"/>
+                                        <p:tgtEl>
+                                          <p:spTgt spid="8"/>
+                                        </p:tgtEl>
+                                        <p:attrNameLst>
+                                          <p:attrName>ppt_w</p:attrName>
+                                        </p:attrNameLst>
+                                      </p:cBhvr>
+                                      <p:tavLst>
+                                        <p:tav tm="0">
+                                          <p:val>
+                                            <p:fltVal val="0"/>
+                                          </p:val>
+                                        </p:tav>
+                                        <p:tav tm="100000">
+                                          <p:val>
+                                            <p:strVal val="#ppt_w"/>
+                                          </p:val>
+                                        </p:tav>
+                                      </p:tavLst>
+                                    </p:anim>
+                                    <p:anim calcmode="lin" valueType="num">
+                                      <p:cBhvr>
+                                        <p:cTn id="8" dur="1000" fill="hold"/>
+                                        <p:tgtEl>
+                                          <p:spTgt spid="8"/>
+                                        </p:tgtEl>
+                                        <p:attrNameLst>
+                                          <p:attrName>ppt_h</p:attrName>
+                                        </p:attrNameLst>
+                                      </p:cBhvr>
+                                      <p:tavLst>
+                                        <p:tav tm="0">
+                                          <p:val>
+                                            <p:fltVal val="0"/>
+                                          </p:val>
+                                        </p:tav>
+                                        <p:tav tm="100000">
+                                          <p:val>
+                                            <p:strVal val="#ppt_h"/>
+                                          </p:val>
+                                        </p:tav>
+                                      </p:tavLst>
+                                    </p:anim>
+                                    <p:anim calcmode="lin" valueType="num">
+                                      <p:cBhvr>
+                                        <p:cTn id="9" dur="1000" fill="hold"/>
+                                        <p:tgtEl>
+                                          <p:spTgt spid="8"/>
+                                        </p:tgtEl>
+                                        <p:attrNameLst>
+                                          <p:attrName>ppt_x</p:attrName>
+                                        </p:attrNameLst>
+                                      </p:cBhvr>
+                                      <p:tavLst>
+                                        <p:tav tm="0" fmla="#ppt_x+(cos(-2*pi*(1-$))*-#ppt_x-sin(-2*pi*(1-$))*(1-#ppt_y))*(1-$)">
+                                          <p:val>
+                                            <p:fltVal val="0"/>
+                                          </p:val>
+                                        </p:tav>
+                                        <p:tav tm="100000">
+                                          <p:val>
+                                            <p:fltVal val="1"/>
+                                          </p:val>
+                                        </p:tav>
+                                      </p:tavLst>
+                                    </p:anim>
+                                    <p:anim calcmode="lin" valueType="num">
+                                      <p:cBhvr>
+                                        <p:cTn id="10" dur="1000" fill="hold"/>
+                                        <p:tgtEl>
+                                          <p:spTgt spid="8"/>
+                                        </p:tgtEl>
+                                        <p:attrNameLst>
+                                          <p:attrName>ppt_y</p:attrName>
+                                        </p:attrNameLst>
+                                      </p:cBhvr>
+                                      <p:tavLst>
+                                        <p:tav tm="0" fmla="#ppt_y+(sin(-2*pi*(1-$))*-#ppt_x+cos(-2*pi*(1-$))*(1-#ppt_y))*(1-$)">
+                                          <p:val>
+                                            <p:fltVal val="0"/>
+                                          </p:val>
+                                        </p:tav>
+                                        <p:tav tm="100000">
+                                          <p:val>
+                                            <p:fltVal val="1"/>
+                                          </p:val>
+                                        </p:tav>
+                                      </p:tavLst>
+                                    </p:anim>
+                                  </p:childTnLst>
+                                </p:cTn>
+                              </p:par>
+                            </p:childTnLst>
+                          </p:cTn>
+                        </p:par>
+                      </p:childTnLst>
+                    </p:cTn>
+                  </p:par>
+                </p:childTnLst>
+              </p:cTn>
+              <p:prevCondLst>
+                <p:cond evt="onPrev" delay="0">
+                  <p:tgtEl>
+                    <p:sldTgt/>
+                  </p:tgtEl>
+                </p:cond>
+              </p:prevCondLst>
+              <p:nextCondLst>
+                <p:cond evt="onNext" delay="0">
+                  <p:tgtEl>
+                    <p:sldTgt/>
+                  </p:tgtEl>
+                </p:cond>
+              </p:nextCondLst>
+            </p:seq>
+          </p:childTnLst>
+        </p:cTn>
       </p:par>
     </p:tnLst>
   </p:timing>
@@ -4009,9 +4205,16 @@
             <p:ph idx="1"/>
           </p:nvPr>
         </p:nvSpPr>
-        <p:spPr/>
-        <p:txBody>
-          <a:bodyPr/>
+        <p:spPr>
+          <a:xfrm>
+            <a:off x="457200" y="1775191"/>
+            <a:ext cx="5626968" cy="4625609"/>
+          </a:xfrm>
+        </p:spPr>
+        <p:txBody>
+          <a:bodyPr>
+            <a:normAutofit lnSpcReduction="10000"/>
+          </a:bodyPr>
           <a:lstStyle/>
           <a:p>
             <a:r>
@@ -4034,7 +4237,40 @@
               <a:rPr lang="hr-HR" i="1" dirty="0" err="1" smtClean="0"/>
               <a:t>Reality</a:t>
             </a:r>
-            <a:endParaRPr lang="hr-HR" i="1" dirty="0"/>
+            <a:endParaRPr lang="hr-HR" i="1" dirty="0" smtClean="0"/>
+          </a:p>
+          <a:p>
+            <a:r>
+              <a:rPr lang="hr-HR" dirty="0" smtClean="0"/>
+              <a:t>M</a:t>
+            </a:r>
+            <a:r>
+              <a:rPr lang="hr-HR" dirty="0" smtClean="0"/>
+              <a:t>ogućnost </a:t>
+            </a:r>
+            <a:r>
+              <a:rPr lang="hr-HR" dirty="0" smtClean="0"/>
+              <a:t>da računarski generiranu virtualnu stvarnost možemo dodati našem </a:t>
+            </a:r>
+            <a:r>
+              <a:rPr lang="hr-HR" dirty="0" smtClean="0"/>
+              <a:t>percipiranju prave </a:t>
+            </a:r>
+            <a:r>
+              <a:rPr lang="hr-HR" dirty="0" smtClean="0"/>
+              <a:t>stvarnosti oko </a:t>
+            </a:r>
+            <a:r>
+              <a:rPr lang="hr-HR" dirty="0" smtClean="0"/>
+              <a:t>nas</a:t>
+            </a:r>
+          </a:p>
+          <a:p>
+            <a:r>
+              <a:rPr lang="hr-HR" dirty="0" smtClean="0"/>
+              <a:t>Obilježja: interakcija u stvarnom vremenu, kombinacija prividnog i stvarnog, 3D</a:t>
+            </a:r>
+            <a:endParaRPr lang="hr-HR" dirty="0"/>
           </a:p>
         </p:txBody>
       </p:sp>
@@ -4080,9 +4316,2247 @@
   <p:timing>
     <p:tnLst>
       <p:par>
-        <p:cTn id="1" dur="indefinite" restart="never" nodeType="tmRoot"/>
+        <p:cTn id="1" dur="indefinite" restart="never" nodeType="tmRoot">
+          <p:childTnLst>
+            <p:seq concurrent="1" nextAc="seek">
+              <p:cTn id="2" dur="indefinite" nodeType="mainSeq">
+                <p:childTnLst>
+                  <p:par>
+                    <p:cTn id="3" fill="hold">
+                      <p:stCondLst>
+                        <p:cond delay="indefinite"/>
+                      </p:stCondLst>
+                      <p:childTnLst>
+                        <p:par>
+                          <p:cTn id="4" fill="hold">
+                            <p:stCondLst>
+                              <p:cond delay="0"/>
+                            </p:stCondLst>
+                            <p:childTnLst>
+                              <p:par>
+                                <p:cTn id="5" presetID="2" presetClass="entr" presetSubtype="4" fill="hold" grpId="0" nodeType="clickEffect">
+                                  <p:stCondLst>
+                                    <p:cond delay="0"/>
+                                  </p:stCondLst>
+                                  <p:childTnLst>
+                                    <p:set>
+                                      <p:cBhvr>
+                                        <p:cTn id="6" dur="1" fill="hold">
+                                          <p:stCondLst>
+                                            <p:cond delay="0"/>
+                                          </p:stCondLst>
+                                        </p:cTn>
+                                        <p:tgtEl>
+                                          <p:spTgt spid="3">
+                                            <p:txEl>
+                                              <p:pRg st="0" end="0"/>
+                                            </p:txEl>
+                                          </p:spTgt>
+                                        </p:tgtEl>
+                                        <p:attrNameLst>
+                                          <p:attrName>style.visibility</p:attrName>
+                                        </p:attrNameLst>
+                                      </p:cBhvr>
+                                      <p:to>
+                                        <p:strVal val="visible"/>
+                                      </p:to>
+                                    </p:set>
+                                    <p:anim calcmode="lin" valueType="num">
+                                      <p:cBhvr additive="base">
+                                        <p:cTn id="7" dur="500" fill="hold"/>
+                                        <p:tgtEl>
+                                          <p:spTgt spid="3">
+                                            <p:txEl>
+                                              <p:pRg st="0" end="0"/>
+                                            </p:txEl>
+                                          </p:spTgt>
+                                        </p:tgtEl>
+                                        <p:attrNameLst>
+                                          <p:attrName>ppt_x</p:attrName>
+                                        </p:attrNameLst>
+                                      </p:cBhvr>
+                                      <p:tavLst>
+                                        <p:tav tm="0">
+                                          <p:val>
+                                            <p:strVal val="#ppt_x"/>
+                                          </p:val>
+                                        </p:tav>
+                                        <p:tav tm="100000">
+                                          <p:val>
+                                            <p:strVal val="#ppt_x"/>
+                                          </p:val>
+                                        </p:tav>
+                                      </p:tavLst>
+                                    </p:anim>
+                                    <p:anim calcmode="lin" valueType="num">
+                                      <p:cBhvr additive="base">
+                                        <p:cTn id="8" dur="500" fill="hold"/>
+                                        <p:tgtEl>
+                                          <p:spTgt spid="3">
+                                            <p:txEl>
+                                              <p:pRg st="0" end="0"/>
+                                            </p:txEl>
+                                          </p:spTgt>
+                                        </p:tgtEl>
+                                        <p:attrNameLst>
+                                          <p:attrName>ppt_y</p:attrName>
+                                        </p:attrNameLst>
+                                      </p:cBhvr>
+                                      <p:tavLst>
+                                        <p:tav tm="0">
+                                          <p:val>
+                                            <p:strVal val="1+#ppt_h/2"/>
+                                          </p:val>
+                                        </p:tav>
+                                        <p:tav tm="100000">
+                                          <p:val>
+                                            <p:strVal val="#ppt_y"/>
+                                          </p:val>
+                                        </p:tav>
+                                      </p:tavLst>
+                                    </p:anim>
+                                  </p:childTnLst>
+                                </p:cTn>
+                              </p:par>
+                            </p:childTnLst>
+                          </p:cTn>
+                        </p:par>
+                      </p:childTnLst>
+                    </p:cTn>
+                  </p:par>
+                  <p:par>
+                    <p:cTn id="9" fill="hold">
+                      <p:stCondLst>
+                        <p:cond delay="indefinite"/>
+                      </p:stCondLst>
+                      <p:childTnLst>
+                        <p:par>
+                          <p:cTn id="10" fill="hold">
+                            <p:stCondLst>
+                              <p:cond delay="0"/>
+                            </p:stCondLst>
+                            <p:childTnLst>
+                              <p:par>
+                                <p:cTn id="11" presetID="2" presetClass="entr" presetSubtype="4" fill="hold" grpId="0" nodeType="clickEffect">
+                                  <p:stCondLst>
+                                    <p:cond delay="0"/>
+                                  </p:stCondLst>
+                                  <p:childTnLst>
+                                    <p:set>
+                                      <p:cBhvr>
+                                        <p:cTn id="12" dur="1" fill="hold">
+                                          <p:stCondLst>
+                                            <p:cond delay="0"/>
+                                          </p:stCondLst>
+                                        </p:cTn>
+                                        <p:tgtEl>
+                                          <p:spTgt spid="3">
+                                            <p:txEl>
+                                              <p:pRg st="1" end="1"/>
+                                            </p:txEl>
+                                          </p:spTgt>
+                                        </p:tgtEl>
+                                        <p:attrNameLst>
+                                          <p:attrName>style.visibility</p:attrName>
+                                        </p:attrNameLst>
+                                      </p:cBhvr>
+                                      <p:to>
+                                        <p:strVal val="visible"/>
+                                      </p:to>
+                                    </p:set>
+                                    <p:anim calcmode="lin" valueType="num">
+                                      <p:cBhvr additive="base">
+                                        <p:cTn id="13" dur="500" fill="hold"/>
+                                        <p:tgtEl>
+                                          <p:spTgt spid="3">
+                                            <p:txEl>
+                                              <p:pRg st="1" end="1"/>
+                                            </p:txEl>
+                                          </p:spTgt>
+                                        </p:tgtEl>
+                                        <p:attrNameLst>
+                                          <p:attrName>ppt_x</p:attrName>
+                                        </p:attrNameLst>
+                                      </p:cBhvr>
+                                      <p:tavLst>
+                                        <p:tav tm="0">
+                                          <p:val>
+                                            <p:strVal val="#ppt_x"/>
+                                          </p:val>
+                                        </p:tav>
+                                        <p:tav tm="100000">
+                                          <p:val>
+                                            <p:strVal val="#ppt_x"/>
+                                          </p:val>
+                                        </p:tav>
+                                      </p:tavLst>
+                                    </p:anim>
+                                    <p:anim calcmode="lin" valueType="num">
+                                      <p:cBhvr additive="base">
+                                        <p:cTn id="14" dur="500" fill="hold"/>
+                                        <p:tgtEl>
+                                          <p:spTgt spid="3">
+                                            <p:txEl>
+                                              <p:pRg st="1" end="1"/>
+                                            </p:txEl>
+                                          </p:spTgt>
+                                        </p:tgtEl>
+                                        <p:attrNameLst>
+                                          <p:attrName>ppt_y</p:attrName>
+                                        </p:attrNameLst>
+                                      </p:cBhvr>
+                                      <p:tavLst>
+                                        <p:tav tm="0">
+                                          <p:val>
+                                            <p:strVal val="1+#ppt_h/2"/>
+                                          </p:val>
+                                        </p:tav>
+                                        <p:tav tm="100000">
+                                          <p:val>
+                                            <p:strVal val="#ppt_y"/>
+                                          </p:val>
+                                        </p:tav>
+                                      </p:tavLst>
+                                    </p:anim>
+                                  </p:childTnLst>
+                                </p:cTn>
+                              </p:par>
+                            </p:childTnLst>
+                          </p:cTn>
+                        </p:par>
+                      </p:childTnLst>
+                    </p:cTn>
+                  </p:par>
+                  <p:par>
+                    <p:cTn id="15" fill="hold">
+                      <p:stCondLst>
+                        <p:cond delay="indefinite"/>
+                      </p:stCondLst>
+                      <p:childTnLst>
+                        <p:par>
+                          <p:cTn id="16" fill="hold">
+                            <p:stCondLst>
+                              <p:cond delay="0"/>
+                            </p:stCondLst>
+                            <p:childTnLst>
+                              <p:par>
+                                <p:cTn id="17" presetID="2" presetClass="entr" presetSubtype="4" fill="hold" grpId="0" nodeType="clickEffect">
+                                  <p:stCondLst>
+                                    <p:cond delay="0"/>
+                                  </p:stCondLst>
+                                  <p:childTnLst>
+                                    <p:set>
+                                      <p:cBhvr>
+                                        <p:cTn id="18" dur="1" fill="hold">
+                                          <p:stCondLst>
+                                            <p:cond delay="0"/>
+                                          </p:stCondLst>
+                                        </p:cTn>
+                                        <p:tgtEl>
+                                          <p:spTgt spid="3">
+                                            <p:txEl>
+                                              <p:pRg st="2" end="2"/>
+                                            </p:txEl>
+                                          </p:spTgt>
+                                        </p:tgtEl>
+                                        <p:attrNameLst>
+                                          <p:attrName>style.visibility</p:attrName>
+                                        </p:attrNameLst>
+                                      </p:cBhvr>
+                                      <p:to>
+                                        <p:strVal val="visible"/>
+                                      </p:to>
+                                    </p:set>
+                                    <p:anim calcmode="lin" valueType="num">
+                                      <p:cBhvr additive="base">
+                                        <p:cTn id="19" dur="500" fill="hold"/>
+                                        <p:tgtEl>
+                                          <p:spTgt spid="3">
+                                            <p:txEl>
+                                              <p:pRg st="2" end="2"/>
+                                            </p:txEl>
+                                          </p:spTgt>
+                                        </p:tgtEl>
+                                        <p:attrNameLst>
+                                          <p:attrName>ppt_x</p:attrName>
+                                        </p:attrNameLst>
+                                      </p:cBhvr>
+                                      <p:tavLst>
+                                        <p:tav tm="0">
+                                          <p:val>
+                                            <p:strVal val="#ppt_x"/>
+                                          </p:val>
+                                        </p:tav>
+                                        <p:tav tm="100000">
+                                          <p:val>
+                                            <p:strVal val="#ppt_x"/>
+                                          </p:val>
+                                        </p:tav>
+                                      </p:tavLst>
+                                    </p:anim>
+                                    <p:anim calcmode="lin" valueType="num">
+                                      <p:cBhvr additive="base">
+                                        <p:cTn id="20" dur="500" fill="hold"/>
+                                        <p:tgtEl>
+                                          <p:spTgt spid="3">
+                                            <p:txEl>
+                                              <p:pRg st="2" end="2"/>
+                                            </p:txEl>
+                                          </p:spTgt>
+                                        </p:tgtEl>
+                                        <p:attrNameLst>
+                                          <p:attrName>ppt_y</p:attrName>
+                                        </p:attrNameLst>
+                                      </p:cBhvr>
+                                      <p:tavLst>
+                                        <p:tav tm="0">
+                                          <p:val>
+                                            <p:strVal val="1+#ppt_h/2"/>
+                                          </p:val>
+                                        </p:tav>
+                                        <p:tav tm="100000">
+                                          <p:val>
+                                            <p:strVal val="#ppt_y"/>
+                                          </p:val>
+                                        </p:tav>
+                                      </p:tavLst>
+                                    </p:anim>
+                                  </p:childTnLst>
+                                </p:cTn>
+                              </p:par>
+                            </p:childTnLst>
+                          </p:cTn>
+                        </p:par>
+                      </p:childTnLst>
+                    </p:cTn>
+                  </p:par>
+                </p:childTnLst>
+              </p:cTn>
+              <p:prevCondLst>
+                <p:cond evt="onPrev" delay="0">
+                  <p:tgtEl>
+                    <p:sldTgt/>
+                  </p:tgtEl>
+                </p:cond>
+              </p:prevCondLst>
+              <p:nextCondLst>
+                <p:cond evt="onNext" delay="0">
+                  <p:tgtEl>
+                    <p:sldTgt/>
+                  </p:tgtEl>
+                </p:cond>
+              </p:nextCondLst>
+            </p:seq>
+          </p:childTnLst>
+        </p:cTn>
       </p:par>
     </p:tnLst>
+    <p:bldLst>
+      <p:bldP spid="3" grpId="0" build="p"/>
+    </p:bldLst>
+  </p:timing>
+</p:sld>
+</file>
+
+<file path=ppt/slides/slide3.xml><?xml version="1.0" encoding="utf-8"?>
+<p:sld xmlns:a="http://schemas.openxmlformats.org/drawingml/2006/main" xmlns:r="http://schemas.openxmlformats.org/officeDocument/2006/relationships" xmlns:p="http://schemas.openxmlformats.org/presentationml/2006/main">
+  <p:cSld>
+    <p:spTree>
+      <p:nvGrpSpPr>
+        <p:cNvPr id="1" name=""/>
+        <p:cNvGrpSpPr/>
+        <p:nvPr/>
+      </p:nvGrpSpPr>
+      <p:grpSpPr>
+        <a:xfrm>
+          <a:off x="0" y="0"/>
+          <a:ext cx="0" cy="0"/>
+          <a:chOff x="0" y="0"/>
+          <a:chExt cx="0" cy="0"/>
+        </a:xfrm>
+      </p:grpSpPr>
+      <p:pic>
+        <p:nvPicPr>
+          <p:cNvPr id="25" name="Picture 24" descr="h.png"/>
+          <p:cNvPicPr>
+            <a:picLocks noChangeAspect="1"/>
+          </p:cNvPicPr>
+          <p:nvPr/>
+        </p:nvPicPr>
+        <p:blipFill>
+          <a:blip r:embed="rId2" cstate="print"/>
+          <a:stretch>
+            <a:fillRect/>
+          </a:stretch>
+        </p:blipFill>
+        <p:spPr>
+          <a:xfrm>
+            <a:off x="0" y="3807042"/>
+            <a:ext cx="4067944" cy="3050958"/>
+          </a:xfrm>
+          <a:prstGeom prst="rect">
+            <a:avLst/>
+          </a:prstGeom>
+        </p:spPr>
+      </p:pic>
+      <p:sp>
+        <p:nvSpPr>
+          <p:cNvPr id="29" name="Freeform 28"/>
+          <p:cNvSpPr/>
+          <p:nvPr/>
+        </p:nvSpPr>
+        <p:spPr>
+          <a:xfrm>
+            <a:off x="2327564" y="2249055"/>
+            <a:ext cx="4502727" cy="339436"/>
+          </a:xfrm>
+          <a:custGeom>
+            <a:avLst/>
+            <a:gdLst>
+              <a:gd name="connsiteX0" fmla="*/ 0 w 4502727"/>
+              <a:gd name="connsiteY0" fmla="*/ 314036 h 339436"/>
+              <a:gd name="connsiteX1" fmla="*/ 692727 w 4502727"/>
+              <a:gd name="connsiteY1" fmla="*/ 64654 h 339436"/>
+              <a:gd name="connsiteX2" fmla="*/ 1371600 w 4502727"/>
+              <a:gd name="connsiteY2" fmla="*/ 258618 h 339436"/>
+              <a:gd name="connsiteX3" fmla="*/ 2036618 w 4502727"/>
+              <a:gd name="connsiteY3" fmla="*/ 9236 h 339436"/>
+              <a:gd name="connsiteX4" fmla="*/ 2715491 w 4502727"/>
+              <a:gd name="connsiteY4" fmla="*/ 314036 h 339436"/>
+              <a:gd name="connsiteX5" fmla="*/ 3325091 w 4502727"/>
+              <a:gd name="connsiteY5" fmla="*/ 161636 h 339436"/>
+              <a:gd name="connsiteX6" fmla="*/ 4502727 w 4502727"/>
+              <a:gd name="connsiteY6" fmla="*/ 286327 h 339436"/>
+            </a:gdLst>
+            <a:ahLst/>
+            <a:cxnLst>
+              <a:cxn ang="0">
+                <a:pos x="connsiteX0" y="connsiteY0"/>
+              </a:cxn>
+              <a:cxn ang="0">
+                <a:pos x="connsiteX1" y="connsiteY1"/>
+              </a:cxn>
+              <a:cxn ang="0">
+                <a:pos x="connsiteX2" y="connsiteY2"/>
+              </a:cxn>
+              <a:cxn ang="0">
+                <a:pos x="connsiteX3" y="connsiteY3"/>
+              </a:cxn>
+              <a:cxn ang="0">
+                <a:pos x="connsiteX4" y="connsiteY4"/>
+              </a:cxn>
+              <a:cxn ang="0">
+                <a:pos x="connsiteX5" y="connsiteY5"/>
+              </a:cxn>
+              <a:cxn ang="0">
+                <a:pos x="connsiteX6" y="connsiteY6"/>
+              </a:cxn>
+            </a:cxnLst>
+            <a:rect l="l" t="t" r="r" b="b"/>
+            <a:pathLst>
+              <a:path w="4502727" h="339436">
+                <a:moveTo>
+                  <a:pt x="0" y="314036"/>
+                </a:moveTo>
+                <a:cubicBezTo>
+                  <a:pt x="232063" y="193963"/>
+                  <a:pt x="464127" y="73890"/>
+                  <a:pt x="692727" y="64654"/>
+                </a:cubicBezTo>
+                <a:cubicBezTo>
+                  <a:pt x="921327" y="55418"/>
+                  <a:pt x="1147618" y="267854"/>
+                  <a:pt x="1371600" y="258618"/>
+                </a:cubicBezTo>
+                <a:cubicBezTo>
+                  <a:pt x="1595582" y="249382"/>
+                  <a:pt x="1812636" y="0"/>
+                  <a:pt x="2036618" y="9236"/>
+                </a:cubicBezTo>
+                <a:cubicBezTo>
+                  <a:pt x="2260600" y="18472"/>
+                  <a:pt x="2500746" y="288636"/>
+                  <a:pt x="2715491" y="314036"/>
+                </a:cubicBezTo>
+                <a:cubicBezTo>
+                  <a:pt x="2930237" y="339436"/>
+                  <a:pt x="3027218" y="166254"/>
+                  <a:pt x="3325091" y="161636"/>
+                </a:cubicBezTo>
+                <a:cubicBezTo>
+                  <a:pt x="3622964" y="157018"/>
+                  <a:pt x="4062845" y="221672"/>
+                  <a:pt x="4502727" y="286327"/>
+                </a:cubicBezTo>
+              </a:path>
+            </a:pathLst>
+          </a:custGeom>
+          <a:ln w="28575"/>
+          <a:effectLst>
+            <a:outerShdw blurRad="50800" dist="38100" dir="2700000" algn="tl" rotWithShape="0">
+              <a:prstClr val="black">
+                <a:alpha val="40000"/>
+              </a:prstClr>
+            </a:outerShdw>
+          </a:effectLst>
+        </p:spPr>
+        <p:style>
+          <a:lnRef idx="1">
+            <a:schemeClr val="accent1"/>
+          </a:lnRef>
+          <a:fillRef idx="0">
+            <a:schemeClr val="accent1"/>
+          </a:fillRef>
+          <a:effectRef idx="0">
+            <a:schemeClr val="accent1"/>
+          </a:effectRef>
+          <a:fontRef idx="minor">
+            <a:schemeClr val="tx1"/>
+          </a:fontRef>
+        </p:style>
+        <p:txBody>
+          <a:bodyPr rtlCol="0" anchor="ctr"/>
+          <a:lstStyle/>
+          <a:p>
+            <a:pPr algn="ctr"/>
+            <a:endParaRPr lang="hr-HR"/>
+          </a:p>
+        </p:txBody>
+      </p:sp>
+      <p:sp>
+        <p:nvSpPr>
+          <p:cNvPr id="2" name="Title 1"/>
+          <p:cNvSpPr>
+            <a:spLocks noGrp="1"/>
+          </p:cNvSpPr>
+          <p:nvPr>
+            <p:ph type="title"/>
+          </p:nvPr>
+        </p:nvSpPr>
+        <p:spPr/>
+        <p:txBody>
+          <a:bodyPr/>
+          <a:lstStyle/>
+          <a:p>
+            <a:r>
+              <a:rPr lang="hr-HR" dirty="0" smtClean="0"/>
+              <a:t>Primjer realizacije AR</a:t>
+            </a:r>
+            <a:endParaRPr lang="hr-HR" dirty="0"/>
+          </a:p>
+        </p:txBody>
+      </p:sp>
+      <p:pic>
+        <p:nvPicPr>
+          <p:cNvPr id="7" name="Picture 6" descr="Portable-Computer-icon.png"/>
+          <p:cNvPicPr>
+            <a:picLocks noChangeAspect="1"/>
+          </p:cNvPicPr>
+          <p:nvPr/>
+        </p:nvPicPr>
+        <p:blipFill>
+          <a:blip r:embed="rId3" cstate="print"/>
+          <a:stretch>
+            <a:fillRect/>
+          </a:stretch>
+        </p:blipFill>
+        <p:spPr>
+          <a:xfrm>
+            <a:off x="323528" y="1484784"/>
+            <a:ext cx="2438400" cy="2438400"/>
+          </a:xfrm>
+          <a:prstGeom prst="rect">
+            <a:avLst/>
+          </a:prstGeom>
+        </p:spPr>
+      </p:pic>
+      <p:pic>
+        <p:nvPicPr>
+          <p:cNvPr id="12" name="Picture 11" descr="user-icon.png"/>
+          <p:cNvPicPr>
+            <a:picLocks noChangeAspect="1"/>
+          </p:cNvPicPr>
+          <p:nvPr/>
+        </p:nvPicPr>
+        <p:blipFill>
+          <a:blip r:embed="rId4" cstate="print"/>
+          <a:stretch>
+            <a:fillRect/>
+          </a:stretch>
+        </p:blipFill>
+        <p:spPr>
+          <a:xfrm flipH="1">
+            <a:off x="6516216" y="4653136"/>
+            <a:ext cx="1656184" cy="1656184"/>
+          </a:xfrm>
+          <a:prstGeom prst="rect">
+            <a:avLst/>
+          </a:prstGeom>
+        </p:spPr>
+      </p:pic>
+      <p:pic>
+        <p:nvPicPr>
+          <p:cNvPr id="9" name="Picture 8" descr="web-camera-icon.png"/>
+          <p:cNvPicPr>
+            <a:picLocks noChangeAspect="1"/>
+          </p:cNvPicPr>
+          <p:nvPr/>
+        </p:nvPicPr>
+        <p:blipFill>
+          <a:blip r:embed="rId5" cstate="print"/>
+          <a:stretch>
+            <a:fillRect/>
+          </a:stretch>
+        </p:blipFill>
+        <p:spPr>
+          <a:xfrm>
+            <a:off x="6372200" y="2060848"/>
+            <a:ext cx="1512168" cy="1512168"/>
+          </a:xfrm>
+          <a:prstGeom prst="rect">
+            <a:avLst/>
+          </a:prstGeom>
+        </p:spPr>
+      </p:pic>
+      <p:pic>
+        <p:nvPicPr>
+          <p:cNvPr id="14" name="Picture 13" descr="TextureExtractAR_marker.png"/>
+          <p:cNvPicPr>
+            <a:picLocks noChangeAspect="1"/>
+          </p:cNvPicPr>
+          <p:nvPr/>
+        </p:nvPicPr>
+        <p:blipFill>
+          <a:blip r:embed="rId6" cstate="print"/>
+          <a:stretch>
+            <a:fillRect/>
+          </a:stretch>
+        </p:blipFill>
+        <p:spPr>
+          <a:xfrm>
+            <a:off x="6156176" y="5445224"/>
+            <a:ext cx="1008112" cy="1008112"/>
+          </a:xfrm>
+          <a:prstGeom prst="rect">
+            <a:avLst/>
+          </a:prstGeom>
+          <a:solidFill>
+            <a:srgbClr val="FFFFFF">
+              <a:shade val="85000"/>
+            </a:srgbClr>
+          </a:solidFill>
+          <a:ln w="101600" cap="sq">
+            <a:solidFill>
+              <a:srgbClr val="FDFDFD"/>
+            </a:solidFill>
+            <a:miter lim="800000"/>
+          </a:ln>
+          <a:effectLst>
+            <a:outerShdw blurRad="57150" dist="37500" dir="7560000" sy="98000" kx="110000" ky="200000" algn="tl" rotWithShape="0">
+              <a:srgbClr val="000000">
+                <a:alpha val="20000"/>
+              </a:srgbClr>
+            </a:outerShdw>
+          </a:effectLst>
+          <a:scene3d>
+            <a:camera prst="perspectiveRelaxed">
+              <a:rot lat="18960000" lon="0" rev="0"/>
+            </a:camera>
+            <a:lightRig rig="twoPt" dir="t">
+              <a:rot lat="0" lon="0" rev="7200000"/>
+            </a:lightRig>
+          </a:scene3d>
+          <a:sp3d prstMaterial="matte">
+            <a:bevelT w="22860" h="12700"/>
+            <a:contourClr>
+              <a:srgbClr val="FFFFFF"/>
+            </a:contourClr>
+          </a:sp3d>
+        </p:spPr>
+      </p:pic>
+      <p:pic>
+        <p:nvPicPr>
+          <p:cNvPr id="15" name="Picture 14" descr="flarlogo-marker.png"/>
+          <p:cNvPicPr>
+            <a:picLocks noChangeAspect="1"/>
+          </p:cNvPicPr>
+          <p:nvPr/>
+        </p:nvPicPr>
+        <p:blipFill>
+          <a:blip r:embed="rId7" cstate="print"/>
+          <a:stretch>
+            <a:fillRect/>
+          </a:stretch>
+        </p:blipFill>
+        <p:spPr>
+          <a:xfrm>
+            <a:off x="5364088" y="5085184"/>
+            <a:ext cx="1008112" cy="1008112"/>
+          </a:xfrm>
+          <a:prstGeom prst="rect">
+            <a:avLst/>
+          </a:prstGeom>
+          <a:solidFill>
+            <a:srgbClr val="FFFFFF">
+              <a:shade val="85000"/>
+            </a:srgbClr>
+          </a:solidFill>
+          <a:ln w="101600" cap="sq">
+            <a:solidFill>
+              <a:srgbClr val="FDFDFD"/>
+            </a:solidFill>
+            <a:miter lim="800000"/>
+          </a:ln>
+          <a:effectLst>
+            <a:outerShdw blurRad="57150" dist="37500" dir="7560000" sy="98000" kx="110000" ky="200000" algn="tl" rotWithShape="0">
+              <a:srgbClr val="000000">
+                <a:alpha val="20000"/>
+              </a:srgbClr>
+            </a:outerShdw>
+          </a:effectLst>
+          <a:scene3d>
+            <a:camera prst="perspectiveRelaxed">
+              <a:rot lat="18960000" lon="0" rev="0"/>
+            </a:camera>
+            <a:lightRig rig="twoPt" dir="t">
+              <a:rot lat="0" lon="0" rev="7200000"/>
+            </a:lightRig>
+          </a:scene3d>
+          <a:sp3d prstMaterial="matte">
+            <a:bevelT w="22860" h="12700"/>
+            <a:contourClr>
+              <a:srgbClr val="FFFFFF"/>
+            </a:contourClr>
+          </a:sp3d>
+        </p:spPr>
+      </p:pic>
+      <p:sp>
+        <p:nvSpPr>
+          <p:cNvPr id="23" name="Curved Left Arrow 22"/>
+          <p:cNvSpPr/>
+          <p:nvPr/>
+        </p:nvSpPr>
+        <p:spPr>
+          <a:xfrm>
+            <a:off x="7884368" y="2780928"/>
+            <a:ext cx="936104" cy="2448272"/>
+          </a:xfrm>
+          <a:prstGeom prst="curvedLeftArrow">
+            <a:avLst/>
+          </a:prstGeom>
+        </p:spPr>
+        <p:style>
+          <a:lnRef idx="2">
+            <a:schemeClr val="accent1">
+              <a:shade val="50000"/>
+            </a:schemeClr>
+          </a:lnRef>
+          <a:fillRef idx="1">
+            <a:schemeClr val="accent1"/>
+          </a:fillRef>
+          <a:effectRef idx="0">
+            <a:schemeClr val="accent1"/>
+          </a:effectRef>
+          <a:fontRef idx="minor">
+            <a:schemeClr val="lt1"/>
+          </a:fontRef>
+        </p:style>
+        <p:txBody>
+          <a:bodyPr rtlCol="0" anchor="ctr"/>
+          <a:lstStyle/>
+          <a:p>
+            <a:pPr algn="ctr"/>
+            <a:endParaRPr lang="hr-HR">
+              <a:solidFill>
+                <a:schemeClr val="tx1"/>
+              </a:solidFill>
+            </a:endParaRPr>
+          </a:p>
+        </p:txBody>
+      </p:sp>
+      <p:sp>
+        <p:nvSpPr>
+          <p:cNvPr id="24" name="Down Arrow 23"/>
+          <p:cNvSpPr/>
+          <p:nvPr/>
+        </p:nvSpPr>
+        <p:spPr>
+          <a:xfrm>
+            <a:off x="467544" y="3789040"/>
+            <a:ext cx="1008112" cy="864096"/>
+          </a:xfrm>
+          <a:prstGeom prst="downArrow">
+            <a:avLst>
+              <a:gd name="adj1" fmla="val 29010"/>
+              <a:gd name="adj2" fmla="val 44753"/>
+            </a:avLst>
+          </a:prstGeom>
+        </p:spPr>
+        <p:style>
+          <a:lnRef idx="2">
+            <a:schemeClr val="accent1">
+              <a:shade val="50000"/>
+            </a:schemeClr>
+          </a:lnRef>
+          <a:fillRef idx="1">
+            <a:schemeClr val="accent1"/>
+          </a:fillRef>
+          <a:effectRef idx="0">
+            <a:schemeClr val="accent1"/>
+          </a:effectRef>
+          <a:fontRef idx="minor">
+            <a:schemeClr val="lt1"/>
+          </a:fontRef>
+        </p:style>
+        <p:txBody>
+          <a:bodyPr rtlCol="0" anchor="ctr"/>
+          <a:lstStyle/>
+          <a:p>
+            <a:pPr algn="ctr"/>
+            <a:endParaRPr lang="hr-HR"/>
+          </a:p>
+        </p:txBody>
+      </p:sp>
+      <p:pic>
+        <p:nvPicPr>
+          <p:cNvPr id="26" name="Picture 25" descr="user-icon.png"/>
+          <p:cNvPicPr>
+            <a:picLocks noChangeAspect="1"/>
+          </p:cNvPicPr>
+          <p:nvPr/>
+        </p:nvPicPr>
+        <p:blipFill>
+          <a:blip r:embed="rId4" cstate="print"/>
+          <a:stretch>
+            <a:fillRect/>
+          </a:stretch>
+        </p:blipFill>
+        <p:spPr>
+          <a:xfrm>
+            <a:off x="0" y="4941168"/>
+            <a:ext cx="1368152" cy="1368152"/>
+          </a:xfrm>
+          <a:prstGeom prst="rect">
+            <a:avLst/>
+          </a:prstGeom>
+        </p:spPr>
+      </p:pic>
+      <p:sp>
+        <p:nvSpPr>
+          <p:cNvPr id="27" name="Striped Right Arrow 26"/>
+          <p:cNvSpPr/>
+          <p:nvPr/>
+        </p:nvSpPr>
+        <p:spPr>
+          <a:xfrm flipH="1">
+            <a:off x="3779912" y="5157192"/>
+            <a:ext cx="1224136" cy="936104"/>
+          </a:xfrm>
+          <a:prstGeom prst="stripedRightArrow">
+            <a:avLst>
+              <a:gd name="adj1" fmla="val 47435"/>
+              <a:gd name="adj2" fmla="val 50000"/>
+            </a:avLst>
+          </a:prstGeom>
+        </p:spPr>
+        <p:style>
+          <a:lnRef idx="2">
+            <a:schemeClr val="accent1">
+              <a:shade val="50000"/>
+            </a:schemeClr>
+          </a:lnRef>
+          <a:fillRef idx="1">
+            <a:schemeClr val="accent1"/>
+          </a:fillRef>
+          <a:effectRef idx="0">
+            <a:schemeClr val="accent1"/>
+          </a:effectRef>
+          <a:fontRef idx="minor">
+            <a:schemeClr val="lt1"/>
+          </a:fontRef>
+        </p:style>
+        <p:txBody>
+          <a:bodyPr rtlCol="0" anchor="ctr"/>
+          <a:lstStyle/>
+          <a:p>
+            <a:pPr algn="ctr"/>
+            <a:endParaRPr lang="hr-HR"/>
+          </a:p>
+        </p:txBody>
+      </p:sp>
+      <p:sp>
+        <p:nvSpPr>
+          <p:cNvPr id="30" name="TextBox 29"/>
+          <p:cNvSpPr txBox="1"/>
+          <p:nvPr/>
+        </p:nvSpPr>
+        <p:spPr>
+          <a:xfrm>
+            <a:off x="1187624" y="3789040"/>
+            <a:ext cx="1800200" cy="369332"/>
+          </a:xfrm>
+          <a:prstGeom prst="rect">
+            <a:avLst/>
+          </a:prstGeom>
+          <a:noFill/>
+        </p:spPr>
+        <p:txBody>
+          <a:bodyPr wrap="square" rtlCol="0">
+            <a:spAutoFit/>
+          </a:bodyPr>
+          <a:lstStyle/>
+          <a:p>
+            <a:r>
+              <a:rPr lang="hr-HR" dirty="0" smtClean="0"/>
+              <a:t>Osobno računalo</a:t>
+            </a:r>
+            <a:endParaRPr lang="hr-HR" dirty="0"/>
+          </a:p>
+        </p:txBody>
+      </p:sp>
+      <p:sp>
+        <p:nvSpPr>
+          <p:cNvPr id="31" name="TextBox 30"/>
+          <p:cNvSpPr txBox="1"/>
+          <p:nvPr/>
+        </p:nvSpPr>
+        <p:spPr>
+          <a:xfrm>
+            <a:off x="6012160" y="3356992"/>
+            <a:ext cx="1800200" cy="369332"/>
+          </a:xfrm>
+          <a:prstGeom prst="rect">
+            <a:avLst/>
+          </a:prstGeom>
+          <a:noFill/>
+        </p:spPr>
+        <p:txBody>
+          <a:bodyPr wrap="square" rtlCol="0">
+            <a:spAutoFit/>
+          </a:bodyPr>
+          <a:lstStyle/>
+          <a:p>
+            <a:r>
+              <a:rPr lang="hr-HR" dirty="0" smtClean="0"/>
+              <a:t>WEB kamera</a:t>
+            </a:r>
+            <a:endParaRPr lang="hr-HR" dirty="0"/>
+          </a:p>
+        </p:txBody>
+      </p:sp>
+      <p:sp>
+        <p:nvSpPr>
+          <p:cNvPr id="32" name="TextBox 31"/>
+          <p:cNvSpPr txBox="1"/>
+          <p:nvPr/>
+        </p:nvSpPr>
+        <p:spPr>
+          <a:xfrm>
+            <a:off x="7092280" y="6309320"/>
+            <a:ext cx="1800200" cy="369332"/>
+          </a:xfrm>
+          <a:prstGeom prst="rect">
+            <a:avLst/>
+          </a:prstGeom>
+          <a:noFill/>
+        </p:spPr>
+        <p:txBody>
+          <a:bodyPr wrap="square" rtlCol="0">
+            <a:spAutoFit/>
+          </a:bodyPr>
+          <a:lstStyle/>
+          <a:p>
+            <a:r>
+              <a:rPr lang="hr-HR" dirty="0" smtClean="0"/>
+              <a:t>Korisnik</a:t>
+            </a:r>
+            <a:endParaRPr lang="hr-HR" dirty="0"/>
+          </a:p>
+        </p:txBody>
+      </p:sp>
+      <p:sp>
+        <p:nvSpPr>
+          <p:cNvPr id="33" name="TextBox 32"/>
+          <p:cNvSpPr txBox="1"/>
+          <p:nvPr/>
+        </p:nvSpPr>
+        <p:spPr>
+          <a:xfrm>
+            <a:off x="5148064" y="6021288"/>
+            <a:ext cx="1080120" cy="369332"/>
+          </a:xfrm>
+          <a:prstGeom prst="rect">
+            <a:avLst/>
+          </a:prstGeom>
+          <a:noFill/>
+        </p:spPr>
+        <p:txBody>
+          <a:bodyPr wrap="square" rtlCol="0">
+            <a:spAutoFit/>
+          </a:bodyPr>
+          <a:lstStyle/>
+          <a:p>
+            <a:r>
+              <a:rPr lang="hr-HR" dirty="0" smtClean="0"/>
+              <a:t>Markeri</a:t>
+            </a:r>
+            <a:endParaRPr lang="hr-HR" dirty="0"/>
+          </a:p>
+        </p:txBody>
+      </p:sp>
+      <p:sp>
+        <p:nvSpPr>
+          <p:cNvPr id="34" name="TextBox 33"/>
+          <p:cNvSpPr txBox="1"/>
+          <p:nvPr/>
+        </p:nvSpPr>
+        <p:spPr>
+          <a:xfrm>
+            <a:off x="179512" y="6309320"/>
+            <a:ext cx="2016224" cy="369332"/>
+          </a:xfrm>
+          <a:prstGeom prst="rect">
+            <a:avLst/>
+          </a:prstGeom>
+          <a:noFill/>
+        </p:spPr>
+        <p:txBody>
+          <a:bodyPr wrap="square" rtlCol="0">
+            <a:spAutoFit/>
+          </a:bodyPr>
+          <a:lstStyle/>
+          <a:p>
+            <a:r>
+              <a:rPr lang="hr-HR" dirty="0" smtClean="0"/>
+              <a:t>Prividna stvarnost</a:t>
+            </a:r>
+            <a:endParaRPr lang="hr-HR" dirty="0"/>
+          </a:p>
+        </p:txBody>
+      </p:sp>
+    </p:spTree>
+  </p:cSld>
+  <p:clrMapOvr>
+    <a:masterClrMapping/>
+  </p:clrMapOvr>
+  <p:timing>
+    <p:tnLst>
+      <p:par>
+        <p:cTn id="1" dur="indefinite" restart="never" nodeType="tmRoot">
+          <p:childTnLst>
+            <p:seq concurrent="1" nextAc="seek">
+              <p:cTn id="2" dur="indefinite" nodeType="mainSeq">
+                <p:childTnLst>
+                  <p:par>
+                    <p:cTn id="3" fill="hold">
+                      <p:stCondLst>
+                        <p:cond delay="indefinite"/>
+                      </p:stCondLst>
+                      <p:childTnLst>
+                        <p:par>
+                          <p:cTn id="4" fill="hold">
+                            <p:stCondLst>
+                              <p:cond delay="0"/>
+                            </p:stCondLst>
+                            <p:childTnLst>
+                              <p:par>
+                                <p:cTn id="5" presetID="2" presetClass="entr" presetSubtype="4" fill="hold" nodeType="clickEffect">
+                                  <p:stCondLst>
+                                    <p:cond delay="0"/>
+                                  </p:stCondLst>
+                                  <p:childTnLst>
+                                    <p:set>
+                                      <p:cBhvr>
+                                        <p:cTn id="6" dur="1" fill="hold">
+                                          <p:stCondLst>
+                                            <p:cond delay="0"/>
+                                          </p:stCondLst>
+                                        </p:cTn>
+                                        <p:tgtEl>
+                                          <p:spTgt spid="7"/>
+                                        </p:tgtEl>
+                                        <p:attrNameLst>
+                                          <p:attrName>style.visibility</p:attrName>
+                                        </p:attrNameLst>
+                                      </p:cBhvr>
+                                      <p:to>
+                                        <p:strVal val="visible"/>
+                                      </p:to>
+                                    </p:set>
+                                    <p:anim calcmode="lin" valueType="num">
+                                      <p:cBhvr additive="base">
+                                        <p:cTn id="7" dur="500" fill="hold"/>
+                                        <p:tgtEl>
+                                          <p:spTgt spid="7"/>
+                                        </p:tgtEl>
+                                        <p:attrNameLst>
+                                          <p:attrName>ppt_x</p:attrName>
+                                        </p:attrNameLst>
+                                      </p:cBhvr>
+                                      <p:tavLst>
+                                        <p:tav tm="0">
+                                          <p:val>
+                                            <p:strVal val="#ppt_x"/>
+                                          </p:val>
+                                        </p:tav>
+                                        <p:tav tm="100000">
+                                          <p:val>
+                                            <p:strVal val="#ppt_x"/>
+                                          </p:val>
+                                        </p:tav>
+                                      </p:tavLst>
+                                    </p:anim>
+                                    <p:anim calcmode="lin" valueType="num">
+                                      <p:cBhvr additive="base">
+                                        <p:cTn id="8" dur="500" fill="hold"/>
+                                        <p:tgtEl>
+                                          <p:spTgt spid="7"/>
+                                        </p:tgtEl>
+                                        <p:attrNameLst>
+                                          <p:attrName>ppt_y</p:attrName>
+                                        </p:attrNameLst>
+                                      </p:cBhvr>
+                                      <p:tavLst>
+                                        <p:tav tm="0">
+                                          <p:val>
+                                            <p:strVal val="1+#ppt_h/2"/>
+                                          </p:val>
+                                        </p:tav>
+                                        <p:tav tm="100000">
+                                          <p:val>
+                                            <p:strVal val="#ppt_y"/>
+                                          </p:val>
+                                        </p:tav>
+                                      </p:tavLst>
+                                    </p:anim>
+                                  </p:childTnLst>
+                                </p:cTn>
+                              </p:par>
+                              <p:par>
+                                <p:cTn id="9" presetID="2" presetClass="entr" presetSubtype="4" fill="hold" grpId="0" nodeType="withEffect">
+                                  <p:stCondLst>
+                                    <p:cond delay="0"/>
+                                  </p:stCondLst>
+                                  <p:childTnLst>
+                                    <p:set>
+                                      <p:cBhvr>
+                                        <p:cTn id="10" dur="1" fill="hold">
+                                          <p:stCondLst>
+                                            <p:cond delay="0"/>
+                                          </p:stCondLst>
+                                        </p:cTn>
+                                        <p:tgtEl>
+                                          <p:spTgt spid="30"/>
+                                        </p:tgtEl>
+                                        <p:attrNameLst>
+                                          <p:attrName>style.visibility</p:attrName>
+                                        </p:attrNameLst>
+                                      </p:cBhvr>
+                                      <p:to>
+                                        <p:strVal val="visible"/>
+                                      </p:to>
+                                    </p:set>
+                                    <p:anim calcmode="lin" valueType="num">
+                                      <p:cBhvr additive="base">
+                                        <p:cTn id="11" dur="500" fill="hold"/>
+                                        <p:tgtEl>
+                                          <p:spTgt spid="30"/>
+                                        </p:tgtEl>
+                                        <p:attrNameLst>
+                                          <p:attrName>ppt_x</p:attrName>
+                                        </p:attrNameLst>
+                                      </p:cBhvr>
+                                      <p:tavLst>
+                                        <p:tav tm="0">
+                                          <p:val>
+                                            <p:strVal val="#ppt_x"/>
+                                          </p:val>
+                                        </p:tav>
+                                        <p:tav tm="100000">
+                                          <p:val>
+                                            <p:strVal val="#ppt_x"/>
+                                          </p:val>
+                                        </p:tav>
+                                      </p:tavLst>
+                                    </p:anim>
+                                    <p:anim calcmode="lin" valueType="num">
+                                      <p:cBhvr additive="base">
+                                        <p:cTn id="12" dur="500" fill="hold"/>
+                                        <p:tgtEl>
+                                          <p:spTgt spid="30"/>
+                                        </p:tgtEl>
+                                        <p:attrNameLst>
+                                          <p:attrName>ppt_y</p:attrName>
+                                        </p:attrNameLst>
+                                      </p:cBhvr>
+                                      <p:tavLst>
+                                        <p:tav tm="0">
+                                          <p:val>
+                                            <p:strVal val="1+#ppt_h/2"/>
+                                          </p:val>
+                                        </p:tav>
+                                        <p:tav tm="100000">
+                                          <p:val>
+                                            <p:strVal val="#ppt_y"/>
+                                          </p:val>
+                                        </p:tav>
+                                      </p:tavLst>
+                                    </p:anim>
+                                  </p:childTnLst>
+                                </p:cTn>
+                              </p:par>
+                            </p:childTnLst>
+                          </p:cTn>
+                        </p:par>
+                      </p:childTnLst>
+                    </p:cTn>
+                  </p:par>
+                  <p:par>
+                    <p:cTn id="13" fill="hold">
+                      <p:stCondLst>
+                        <p:cond delay="indefinite"/>
+                      </p:stCondLst>
+                      <p:childTnLst>
+                        <p:par>
+                          <p:cTn id="14" fill="hold">
+                            <p:stCondLst>
+                              <p:cond delay="0"/>
+                            </p:stCondLst>
+                            <p:childTnLst>
+                              <p:par>
+                                <p:cTn id="15" presetID="2" presetClass="entr" presetSubtype="4" fill="hold" nodeType="clickEffect">
+                                  <p:stCondLst>
+                                    <p:cond delay="0"/>
+                                  </p:stCondLst>
+                                  <p:childTnLst>
+                                    <p:set>
+                                      <p:cBhvr>
+                                        <p:cTn id="16" dur="1" fill="hold">
+                                          <p:stCondLst>
+                                            <p:cond delay="0"/>
+                                          </p:stCondLst>
+                                        </p:cTn>
+                                        <p:tgtEl>
+                                          <p:spTgt spid="9"/>
+                                        </p:tgtEl>
+                                        <p:attrNameLst>
+                                          <p:attrName>style.visibility</p:attrName>
+                                        </p:attrNameLst>
+                                      </p:cBhvr>
+                                      <p:to>
+                                        <p:strVal val="visible"/>
+                                      </p:to>
+                                    </p:set>
+                                    <p:anim calcmode="lin" valueType="num">
+                                      <p:cBhvr additive="base">
+                                        <p:cTn id="17" dur="500" fill="hold"/>
+                                        <p:tgtEl>
+                                          <p:spTgt spid="9"/>
+                                        </p:tgtEl>
+                                        <p:attrNameLst>
+                                          <p:attrName>ppt_x</p:attrName>
+                                        </p:attrNameLst>
+                                      </p:cBhvr>
+                                      <p:tavLst>
+                                        <p:tav tm="0">
+                                          <p:val>
+                                            <p:strVal val="#ppt_x"/>
+                                          </p:val>
+                                        </p:tav>
+                                        <p:tav tm="100000">
+                                          <p:val>
+                                            <p:strVal val="#ppt_x"/>
+                                          </p:val>
+                                        </p:tav>
+                                      </p:tavLst>
+                                    </p:anim>
+                                    <p:anim calcmode="lin" valueType="num">
+                                      <p:cBhvr additive="base">
+                                        <p:cTn id="18" dur="500" fill="hold"/>
+                                        <p:tgtEl>
+                                          <p:spTgt spid="9"/>
+                                        </p:tgtEl>
+                                        <p:attrNameLst>
+                                          <p:attrName>ppt_y</p:attrName>
+                                        </p:attrNameLst>
+                                      </p:cBhvr>
+                                      <p:tavLst>
+                                        <p:tav tm="0">
+                                          <p:val>
+                                            <p:strVal val="1+#ppt_h/2"/>
+                                          </p:val>
+                                        </p:tav>
+                                        <p:tav tm="100000">
+                                          <p:val>
+                                            <p:strVal val="#ppt_y"/>
+                                          </p:val>
+                                        </p:tav>
+                                      </p:tavLst>
+                                    </p:anim>
+                                  </p:childTnLst>
+                                </p:cTn>
+                              </p:par>
+                              <p:par>
+                                <p:cTn id="19" presetID="2" presetClass="entr" presetSubtype="4" fill="hold" grpId="0" nodeType="withEffect">
+                                  <p:stCondLst>
+                                    <p:cond delay="0"/>
+                                  </p:stCondLst>
+                                  <p:childTnLst>
+                                    <p:set>
+                                      <p:cBhvr>
+                                        <p:cTn id="20" dur="1" fill="hold">
+                                          <p:stCondLst>
+                                            <p:cond delay="0"/>
+                                          </p:stCondLst>
+                                        </p:cTn>
+                                        <p:tgtEl>
+                                          <p:spTgt spid="31"/>
+                                        </p:tgtEl>
+                                        <p:attrNameLst>
+                                          <p:attrName>style.visibility</p:attrName>
+                                        </p:attrNameLst>
+                                      </p:cBhvr>
+                                      <p:to>
+                                        <p:strVal val="visible"/>
+                                      </p:to>
+                                    </p:set>
+                                    <p:anim calcmode="lin" valueType="num">
+                                      <p:cBhvr additive="base">
+                                        <p:cTn id="21" dur="500" fill="hold"/>
+                                        <p:tgtEl>
+                                          <p:spTgt spid="31"/>
+                                        </p:tgtEl>
+                                        <p:attrNameLst>
+                                          <p:attrName>ppt_x</p:attrName>
+                                        </p:attrNameLst>
+                                      </p:cBhvr>
+                                      <p:tavLst>
+                                        <p:tav tm="0">
+                                          <p:val>
+                                            <p:strVal val="#ppt_x"/>
+                                          </p:val>
+                                        </p:tav>
+                                        <p:tav tm="100000">
+                                          <p:val>
+                                            <p:strVal val="#ppt_x"/>
+                                          </p:val>
+                                        </p:tav>
+                                      </p:tavLst>
+                                    </p:anim>
+                                    <p:anim calcmode="lin" valueType="num">
+                                      <p:cBhvr additive="base">
+                                        <p:cTn id="22" dur="500" fill="hold"/>
+                                        <p:tgtEl>
+                                          <p:spTgt spid="31"/>
+                                        </p:tgtEl>
+                                        <p:attrNameLst>
+                                          <p:attrName>ppt_y</p:attrName>
+                                        </p:attrNameLst>
+                                      </p:cBhvr>
+                                      <p:tavLst>
+                                        <p:tav tm="0">
+                                          <p:val>
+                                            <p:strVal val="1+#ppt_h/2"/>
+                                          </p:val>
+                                        </p:tav>
+                                        <p:tav tm="100000">
+                                          <p:val>
+                                            <p:strVal val="#ppt_y"/>
+                                          </p:val>
+                                        </p:tav>
+                                      </p:tavLst>
+                                    </p:anim>
+                                  </p:childTnLst>
+                                </p:cTn>
+                              </p:par>
+                            </p:childTnLst>
+                          </p:cTn>
+                        </p:par>
+                      </p:childTnLst>
+                    </p:cTn>
+                  </p:par>
+                  <p:par>
+                    <p:cTn id="23" fill="hold">
+                      <p:stCondLst>
+                        <p:cond delay="indefinite"/>
+                      </p:stCondLst>
+                      <p:childTnLst>
+                        <p:par>
+                          <p:cTn id="24" fill="hold">
+                            <p:stCondLst>
+                              <p:cond delay="0"/>
+                            </p:stCondLst>
+                            <p:childTnLst>
+                              <p:par>
+                                <p:cTn id="25" presetID="18" presetClass="entr" presetSubtype="3" fill="hold" grpId="0" nodeType="clickEffect">
+                                  <p:stCondLst>
+                                    <p:cond delay="0"/>
+                                  </p:stCondLst>
+                                  <p:childTnLst>
+                                    <p:set>
+                                      <p:cBhvr>
+                                        <p:cTn id="26" dur="1" fill="hold">
+                                          <p:stCondLst>
+                                            <p:cond delay="0"/>
+                                          </p:stCondLst>
+                                        </p:cTn>
+                                        <p:tgtEl>
+                                          <p:spTgt spid="29"/>
+                                        </p:tgtEl>
+                                        <p:attrNameLst>
+                                          <p:attrName>style.visibility</p:attrName>
+                                        </p:attrNameLst>
+                                      </p:cBhvr>
+                                      <p:to>
+                                        <p:strVal val="visible"/>
+                                      </p:to>
+                                    </p:set>
+                                    <p:animEffect transition="in" filter="strips(upRight)">
+                                      <p:cBhvr>
+                                        <p:cTn id="27" dur="500"/>
+                                        <p:tgtEl>
+                                          <p:spTgt spid="29"/>
+                                        </p:tgtEl>
+                                      </p:cBhvr>
+                                    </p:animEffect>
+                                  </p:childTnLst>
+                                </p:cTn>
+                              </p:par>
+                            </p:childTnLst>
+                          </p:cTn>
+                        </p:par>
+                      </p:childTnLst>
+                    </p:cTn>
+                  </p:par>
+                  <p:par>
+                    <p:cTn id="28" fill="hold">
+                      <p:stCondLst>
+                        <p:cond delay="indefinite"/>
+                      </p:stCondLst>
+                      <p:childTnLst>
+                        <p:par>
+                          <p:cTn id="29" fill="hold">
+                            <p:stCondLst>
+                              <p:cond delay="0"/>
+                            </p:stCondLst>
+                            <p:childTnLst>
+                              <p:par>
+                                <p:cTn id="30" presetID="2" presetClass="entr" presetSubtype="4" fill="hold" nodeType="clickEffect">
+                                  <p:stCondLst>
+                                    <p:cond delay="0"/>
+                                  </p:stCondLst>
+                                  <p:childTnLst>
+                                    <p:set>
+                                      <p:cBhvr>
+                                        <p:cTn id="31" dur="1" fill="hold">
+                                          <p:stCondLst>
+                                            <p:cond delay="0"/>
+                                          </p:stCondLst>
+                                        </p:cTn>
+                                        <p:tgtEl>
+                                          <p:spTgt spid="12"/>
+                                        </p:tgtEl>
+                                        <p:attrNameLst>
+                                          <p:attrName>style.visibility</p:attrName>
+                                        </p:attrNameLst>
+                                      </p:cBhvr>
+                                      <p:to>
+                                        <p:strVal val="visible"/>
+                                      </p:to>
+                                    </p:set>
+                                    <p:anim calcmode="lin" valueType="num">
+                                      <p:cBhvr additive="base">
+                                        <p:cTn id="32" dur="500" fill="hold"/>
+                                        <p:tgtEl>
+                                          <p:spTgt spid="12"/>
+                                        </p:tgtEl>
+                                        <p:attrNameLst>
+                                          <p:attrName>ppt_x</p:attrName>
+                                        </p:attrNameLst>
+                                      </p:cBhvr>
+                                      <p:tavLst>
+                                        <p:tav tm="0">
+                                          <p:val>
+                                            <p:strVal val="#ppt_x"/>
+                                          </p:val>
+                                        </p:tav>
+                                        <p:tav tm="100000">
+                                          <p:val>
+                                            <p:strVal val="#ppt_x"/>
+                                          </p:val>
+                                        </p:tav>
+                                      </p:tavLst>
+                                    </p:anim>
+                                    <p:anim calcmode="lin" valueType="num">
+                                      <p:cBhvr additive="base">
+                                        <p:cTn id="33" dur="500" fill="hold"/>
+                                        <p:tgtEl>
+                                          <p:spTgt spid="12"/>
+                                        </p:tgtEl>
+                                        <p:attrNameLst>
+                                          <p:attrName>ppt_y</p:attrName>
+                                        </p:attrNameLst>
+                                      </p:cBhvr>
+                                      <p:tavLst>
+                                        <p:tav tm="0">
+                                          <p:val>
+                                            <p:strVal val="1+#ppt_h/2"/>
+                                          </p:val>
+                                        </p:tav>
+                                        <p:tav tm="100000">
+                                          <p:val>
+                                            <p:strVal val="#ppt_y"/>
+                                          </p:val>
+                                        </p:tav>
+                                      </p:tavLst>
+                                    </p:anim>
+                                  </p:childTnLst>
+                                </p:cTn>
+                              </p:par>
+                              <p:par>
+                                <p:cTn id="34" presetID="2" presetClass="entr" presetSubtype="4" fill="hold" grpId="0" nodeType="withEffect">
+                                  <p:stCondLst>
+                                    <p:cond delay="0"/>
+                                  </p:stCondLst>
+                                  <p:childTnLst>
+                                    <p:set>
+                                      <p:cBhvr>
+                                        <p:cTn id="35" dur="1" fill="hold">
+                                          <p:stCondLst>
+                                            <p:cond delay="0"/>
+                                          </p:stCondLst>
+                                        </p:cTn>
+                                        <p:tgtEl>
+                                          <p:spTgt spid="32"/>
+                                        </p:tgtEl>
+                                        <p:attrNameLst>
+                                          <p:attrName>style.visibility</p:attrName>
+                                        </p:attrNameLst>
+                                      </p:cBhvr>
+                                      <p:to>
+                                        <p:strVal val="visible"/>
+                                      </p:to>
+                                    </p:set>
+                                    <p:anim calcmode="lin" valueType="num">
+                                      <p:cBhvr additive="base">
+                                        <p:cTn id="36" dur="500" fill="hold"/>
+                                        <p:tgtEl>
+                                          <p:spTgt spid="32"/>
+                                        </p:tgtEl>
+                                        <p:attrNameLst>
+                                          <p:attrName>ppt_x</p:attrName>
+                                        </p:attrNameLst>
+                                      </p:cBhvr>
+                                      <p:tavLst>
+                                        <p:tav tm="0">
+                                          <p:val>
+                                            <p:strVal val="#ppt_x"/>
+                                          </p:val>
+                                        </p:tav>
+                                        <p:tav tm="100000">
+                                          <p:val>
+                                            <p:strVal val="#ppt_x"/>
+                                          </p:val>
+                                        </p:tav>
+                                      </p:tavLst>
+                                    </p:anim>
+                                    <p:anim calcmode="lin" valueType="num">
+                                      <p:cBhvr additive="base">
+                                        <p:cTn id="37" dur="500" fill="hold"/>
+                                        <p:tgtEl>
+                                          <p:spTgt spid="32"/>
+                                        </p:tgtEl>
+                                        <p:attrNameLst>
+                                          <p:attrName>ppt_y</p:attrName>
+                                        </p:attrNameLst>
+                                      </p:cBhvr>
+                                      <p:tavLst>
+                                        <p:tav tm="0">
+                                          <p:val>
+                                            <p:strVal val="1+#ppt_h/2"/>
+                                          </p:val>
+                                        </p:tav>
+                                        <p:tav tm="100000">
+                                          <p:val>
+                                            <p:strVal val="#ppt_y"/>
+                                          </p:val>
+                                        </p:tav>
+                                      </p:tavLst>
+                                    </p:anim>
+                                  </p:childTnLst>
+                                </p:cTn>
+                              </p:par>
+                            </p:childTnLst>
+                          </p:cTn>
+                        </p:par>
+                      </p:childTnLst>
+                    </p:cTn>
+                  </p:par>
+                  <p:par>
+                    <p:cTn id="38" fill="hold">
+                      <p:stCondLst>
+                        <p:cond delay="indefinite"/>
+                      </p:stCondLst>
+                      <p:childTnLst>
+                        <p:par>
+                          <p:cTn id="39" fill="hold">
+                            <p:stCondLst>
+                              <p:cond delay="0"/>
+                            </p:stCondLst>
+                            <p:childTnLst>
+                              <p:par>
+                                <p:cTn id="40" presetID="2" presetClass="entr" presetSubtype="4" fill="hold" nodeType="clickEffect">
+                                  <p:stCondLst>
+                                    <p:cond delay="0"/>
+                                  </p:stCondLst>
+                                  <p:childTnLst>
+                                    <p:set>
+                                      <p:cBhvr>
+                                        <p:cTn id="41" dur="1" fill="hold">
+                                          <p:stCondLst>
+                                            <p:cond delay="0"/>
+                                          </p:stCondLst>
+                                        </p:cTn>
+                                        <p:tgtEl>
+                                          <p:spTgt spid="15"/>
+                                        </p:tgtEl>
+                                        <p:attrNameLst>
+                                          <p:attrName>style.visibility</p:attrName>
+                                        </p:attrNameLst>
+                                      </p:cBhvr>
+                                      <p:to>
+                                        <p:strVal val="visible"/>
+                                      </p:to>
+                                    </p:set>
+                                    <p:anim calcmode="lin" valueType="num">
+                                      <p:cBhvr additive="base">
+                                        <p:cTn id="42" dur="500" fill="hold"/>
+                                        <p:tgtEl>
+                                          <p:spTgt spid="15"/>
+                                        </p:tgtEl>
+                                        <p:attrNameLst>
+                                          <p:attrName>ppt_x</p:attrName>
+                                        </p:attrNameLst>
+                                      </p:cBhvr>
+                                      <p:tavLst>
+                                        <p:tav tm="0">
+                                          <p:val>
+                                            <p:strVal val="#ppt_x"/>
+                                          </p:val>
+                                        </p:tav>
+                                        <p:tav tm="100000">
+                                          <p:val>
+                                            <p:strVal val="#ppt_x"/>
+                                          </p:val>
+                                        </p:tav>
+                                      </p:tavLst>
+                                    </p:anim>
+                                    <p:anim calcmode="lin" valueType="num">
+                                      <p:cBhvr additive="base">
+                                        <p:cTn id="43" dur="500" fill="hold"/>
+                                        <p:tgtEl>
+                                          <p:spTgt spid="15"/>
+                                        </p:tgtEl>
+                                        <p:attrNameLst>
+                                          <p:attrName>ppt_y</p:attrName>
+                                        </p:attrNameLst>
+                                      </p:cBhvr>
+                                      <p:tavLst>
+                                        <p:tav tm="0">
+                                          <p:val>
+                                            <p:strVal val="1+#ppt_h/2"/>
+                                          </p:val>
+                                        </p:tav>
+                                        <p:tav tm="100000">
+                                          <p:val>
+                                            <p:strVal val="#ppt_y"/>
+                                          </p:val>
+                                        </p:tav>
+                                      </p:tavLst>
+                                    </p:anim>
+                                  </p:childTnLst>
+                                </p:cTn>
+                              </p:par>
+                              <p:par>
+                                <p:cTn id="44" presetID="2" presetClass="entr" presetSubtype="4" fill="hold" nodeType="withEffect">
+                                  <p:stCondLst>
+                                    <p:cond delay="0"/>
+                                  </p:stCondLst>
+                                  <p:childTnLst>
+                                    <p:set>
+                                      <p:cBhvr>
+                                        <p:cTn id="45" dur="1" fill="hold">
+                                          <p:stCondLst>
+                                            <p:cond delay="0"/>
+                                          </p:stCondLst>
+                                        </p:cTn>
+                                        <p:tgtEl>
+                                          <p:spTgt spid="14"/>
+                                        </p:tgtEl>
+                                        <p:attrNameLst>
+                                          <p:attrName>style.visibility</p:attrName>
+                                        </p:attrNameLst>
+                                      </p:cBhvr>
+                                      <p:to>
+                                        <p:strVal val="visible"/>
+                                      </p:to>
+                                    </p:set>
+                                    <p:anim calcmode="lin" valueType="num">
+                                      <p:cBhvr additive="base">
+                                        <p:cTn id="46" dur="500" fill="hold"/>
+                                        <p:tgtEl>
+                                          <p:spTgt spid="14"/>
+                                        </p:tgtEl>
+                                        <p:attrNameLst>
+                                          <p:attrName>ppt_x</p:attrName>
+                                        </p:attrNameLst>
+                                      </p:cBhvr>
+                                      <p:tavLst>
+                                        <p:tav tm="0">
+                                          <p:val>
+                                            <p:strVal val="#ppt_x"/>
+                                          </p:val>
+                                        </p:tav>
+                                        <p:tav tm="100000">
+                                          <p:val>
+                                            <p:strVal val="#ppt_x"/>
+                                          </p:val>
+                                        </p:tav>
+                                      </p:tavLst>
+                                    </p:anim>
+                                    <p:anim calcmode="lin" valueType="num">
+                                      <p:cBhvr additive="base">
+                                        <p:cTn id="47" dur="500" fill="hold"/>
+                                        <p:tgtEl>
+                                          <p:spTgt spid="14"/>
+                                        </p:tgtEl>
+                                        <p:attrNameLst>
+                                          <p:attrName>ppt_y</p:attrName>
+                                        </p:attrNameLst>
+                                      </p:cBhvr>
+                                      <p:tavLst>
+                                        <p:tav tm="0">
+                                          <p:val>
+                                            <p:strVal val="1+#ppt_h/2"/>
+                                          </p:val>
+                                        </p:tav>
+                                        <p:tav tm="100000">
+                                          <p:val>
+                                            <p:strVal val="#ppt_y"/>
+                                          </p:val>
+                                        </p:tav>
+                                      </p:tavLst>
+                                    </p:anim>
+                                  </p:childTnLst>
+                                </p:cTn>
+                              </p:par>
+                              <p:par>
+                                <p:cTn id="48" presetID="2" presetClass="entr" presetSubtype="4" fill="hold" grpId="0" nodeType="withEffect">
+                                  <p:stCondLst>
+                                    <p:cond delay="0"/>
+                                  </p:stCondLst>
+                                  <p:childTnLst>
+                                    <p:set>
+                                      <p:cBhvr>
+                                        <p:cTn id="49" dur="1" fill="hold">
+                                          <p:stCondLst>
+                                            <p:cond delay="0"/>
+                                          </p:stCondLst>
+                                        </p:cTn>
+                                        <p:tgtEl>
+                                          <p:spTgt spid="33"/>
+                                        </p:tgtEl>
+                                        <p:attrNameLst>
+                                          <p:attrName>style.visibility</p:attrName>
+                                        </p:attrNameLst>
+                                      </p:cBhvr>
+                                      <p:to>
+                                        <p:strVal val="visible"/>
+                                      </p:to>
+                                    </p:set>
+                                    <p:anim calcmode="lin" valueType="num">
+                                      <p:cBhvr additive="base">
+                                        <p:cTn id="50" dur="500" fill="hold"/>
+                                        <p:tgtEl>
+                                          <p:spTgt spid="33"/>
+                                        </p:tgtEl>
+                                        <p:attrNameLst>
+                                          <p:attrName>ppt_x</p:attrName>
+                                        </p:attrNameLst>
+                                      </p:cBhvr>
+                                      <p:tavLst>
+                                        <p:tav tm="0">
+                                          <p:val>
+                                            <p:strVal val="#ppt_x"/>
+                                          </p:val>
+                                        </p:tav>
+                                        <p:tav tm="100000">
+                                          <p:val>
+                                            <p:strVal val="#ppt_x"/>
+                                          </p:val>
+                                        </p:tav>
+                                      </p:tavLst>
+                                    </p:anim>
+                                    <p:anim calcmode="lin" valueType="num">
+                                      <p:cBhvr additive="base">
+                                        <p:cTn id="51" dur="500" fill="hold"/>
+                                        <p:tgtEl>
+                                          <p:spTgt spid="33"/>
+                                        </p:tgtEl>
+                                        <p:attrNameLst>
+                                          <p:attrName>ppt_y</p:attrName>
+                                        </p:attrNameLst>
+                                      </p:cBhvr>
+                                      <p:tavLst>
+                                        <p:tav tm="0">
+                                          <p:val>
+                                            <p:strVal val="1+#ppt_h/2"/>
+                                          </p:val>
+                                        </p:tav>
+                                        <p:tav tm="100000">
+                                          <p:val>
+                                            <p:strVal val="#ppt_y"/>
+                                          </p:val>
+                                        </p:tav>
+                                      </p:tavLst>
+                                    </p:anim>
+                                  </p:childTnLst>
+                                </p:cTn>
+                              </p:par>
+                            </p:childTnLst>
+                          </p:cTn>
+                        </p:par>
+                      </p:childTnLst>
+                    </p:cTn>
+                  </p:par>
+                  <p:par>
+                    <p:cTn id="52" fill="hold">
+                      <p:stCondLst>
+                        <p:cond delay="indefinite"/>
+                      </p:stCondLst>
+                      <p:childTnLst>
+                        <p:par>
+                          <p:cTn id="53" fill="hold">
+                            <p:stCondLst>
+                              <p:cond delay="0"/>
+                            </p:stCondLst>
+                            <p:childTnLst>
+                              <p:par>
+                                <p:cTn id="54" presetID="18" presetClass="entr" presetSubtype="12" fill="hold" grpId="0" nodeType="clickEffect">
+                                  <p:stCondLst>
+                                    <p:cond delay="0"/>
+                                  </p:stCondLst>
+                                  <p:childTnLst>
+                                    <p:set>
+                                      <p:cBhvr>
+                                        <p:cTn id="55" dur="1" fill="hold">
+                                          <p:stCondLst>
+                                            <p:cond delay="0"/>
+                                          </p:stCondLst>
+                                        </p:cTn>
+                                        <p:tgtEl>
+                                          <p:spTgt spid="23"/>
+                                        </p:tgtEl>
+                                        <p:attrNameLst>
+                                          <p:attrName>style.visibility</p:attrName>
+                                        </p:attrNameLst>
+                                      </p:cBhvr>
+                                      <p:to>
+                                        <p:strVal val="visible"/>
+                                      </p:to>
+                                    </p:set>
+                                    <p:animEffect transition="in" filter="strips(downLeft)">
+                                      <p:cBhvr>
+                                        <p:cTn id="56" dur="500"/>
+                                        <p:tgtEl>
+                                          <p:spTgt spid="23"/>
+                                        </p:tgtEl>
+                                      </p:cBhvr>
+                                    </p:animEffect>
+                                  </p:childTnLst>
+                                </p:cTn>
+                              </p:par>
+                            </p:childTnLst>
+                          </p:cTn>
+                        </p:par>
+                      </p:childTnLst>
+                    </p:cTn>
+                  </p:par>
+                  <p:par>
+                    <p:cTn id="57" fill="hold">
+                      <p:stCondLst>
+                        <p:cond delay="indefinite"/>
+                      </p:stCondLst>
+                      <p:childTnLst>
+                        <p:par>
+                          <p:cTn id="58" fill="hold">
+                            <p:stCondLst>
+                              <p:cond delay="0"/>
+                            </p:stCondLst>
+                            <p:childTnLst>
+                              <p:par>
+                                <p:cTn id="59" presetID="18" presetClass="entr" presetSubtype="6" fill="hold" grpId="0" nodeType="clickEffect">
+                                  <p:stCondLst>
+                                    <p:cond delay="0"/>
+                                  </p:stCondLst>
+                                  <p:childTnLst>
+                                    <p:set>
+                                      <p:cBhvr>
+                                        <p:cTn id="60" dur="1" fill="hold">
+                                          <p:stCondLst>
+                                            <p:cond delay="0"/>
+                                          </p:stCondLst>
+                                        </p:cTn>
+                                        <p:tgtEl>
+                                          <p:spTgt spid="24"/>
+                                        </p:tgtEl>
+                                        <p:attrNameLst>
+                                          <p:attrName>style.visibility</p:attrName>
+                                        </p:attrNameLst>
+                                      </p:cBhvr>
+                                      <p:to>
+                                        <p:strVal val="visible"/>
+                                      </p:to>
+                                    </p:set>
+                                    <p:animEffect transition="in" filter="strips(downRight)">
+                                      <p:cBhvr>
+                                        <p:cTn id="61" dur="500"/>
+                                        <p:tgtEl>
+                                          <p:spTgt spid="24"/>
+                                        </p:tgtEl>
+                                      </p:cBhvr>
+                                    </p:animEffect>
+                                  </p:childTnLst>
+                                </p:cTn>
+                              </p:par>
+                            </p:childTnLst>
+                          </p:cTn>
+                        </p:par>
+                      </p:childTnLst>
+                    </p:cTn>
+                  </p:par>
+                  <p:par>
+                    <p:cTn id="62" fill="hold">
+                      <p:stCondLst>
+                        <p:cond delay="indefinite"/>
+                      </p:stCondLst>
+                      <p:childTnLst>
+                        <p:par>
+                          <p:cTn id="63" fill="hold">
+                            <p:stCondLst>
+                              <p:cond delay="0"/>
+                            </p:stCondLst>
+                            <p:childTnLst>
+                              <p:par>
+                                <p:cTn id="64" presetID="2" presetClass="entr" presetSubtype="4" fill="hold" nodeType="clickEffect">
+                                  <p:stCondLst>
+                                    <p:cond delay="0"/>
+                                  </p:stCondLst>
+                                  <p:childTnLst>
+                                    <p:set>
+                                      <p:cBhvr>
+                                        <p:cTn id="65" dur="1" fill="hold">
+                                          <p:stCondLst>
+                                            <p:cond delay="0"/>
+                                          </p:stCondLst>
+                                        </p:cTn>
+                                        <p:tgtEl>
+                                          <p:spTgt spid="25"/>
+                                        </p:tgtEl>
+                                        <p:attrNameLst>
+                                          <p:attrName>style.visibility</p:attrName>
+                                        </p:attrNameLst>
+                                      </p:cBhvr>
+                                      <p:to>
+                                        <p:strVal val="visible"/>
+                                      </p:to>
+                                    </p:set>
+                                    <p:anim calcmode="lin" valueType="num">
+                                      <p:cBhvr additive="base">
+                                        <p:cTn id="66" dur="500" fill="hold"/>
+                                        <p:tgtEl>
+                                          <p:spTgt spid="25"/>
+                                        </p:tgtEl>
+                                        <p:attrNameLst>
+                                          <p:attrName>ppt_x</p:attrName>
+                                        </p:attrNameLst>
+                                      </p:cBhvr>
+                                      <p:tavLst>
+                                        <p:tav tm="0">
+                                          <p:val>
+                                            <p:strVal val="#ppt_x"/>
+                                          </p:val>
+                                        </p:tav>
+                                        <p:tav tm="100000">
+                                          <p:val>
+                                            <p:strVal val="#ppt_x"/>
+                                          </p:val>
+                                        </p:tav>
+                                      </p:tavLst>
+                                    </p:anim>
+                                    <p:anim calcmode="lin" valueType="num">
+                                      <p:cBhvr additive="base">
+                                        <p:cTn id="67" dur="500" fill="hold"/>
+                                        <p:tgtEl>
+                                          <p:spTgt spid="25"/>
+                                        </p:tgtEl>
+                                        <p:attrNameLst>
+                                          <p:attrName>ppt_y</p:attrName>
+                                        </p:attrNameLst>
+                                      </p:cBhvr>
+                                      <p:tavLst>
+                                        <p:tav tm="0">
+                                          <p:val>
+                                            <p:strVal val="1+#ppt_h/2"/>
+                                          </p:val>
+                                        </p:tav>
+                                        <p:tav tm="100000">
+                                          <p:val>
+                                            <p:strVal val="#ppt_y"/>
+                                          </p:val>
+                                        </p:tav>
+                                      </p:tavLst>
+                                    </p:anim>
+                                  </p:childTnLst>
+                                </p:cTn>
+                              </p:par>
+                              <p:par>
+                                <p:cTn id="68" presetID="2" presetClass="entr" presetSubtype="4" fill="hold" nodeType="withEffect">
+                                  <p:stCondLst>
+                                    <p:cond delay="0"/>
+                                  </p:stCondLst>
+                                  <p:childTnLst>
+                                    <p:set>
+                                      <p:cBhvr>
+                                        <p:cTn id="69" dur="1" fill="hold">
+                                          <p:stCondLst>
+                                            <p:cond delay="0"/>
+                                          </p:stCondLst>
+                                        </p:cTn>
+                                        <p:tgtEl>
+                                          <p:spTgt spid="26"/>
+                                        </p:tgtEl>
+                                        <p:attrNameLst>
+                                          <p:attrName>style.visibility</p:attrName>
+                                        </p:attrNameLst>
+                                      </p:cBhvr>
+                                      <p:to>
+                                        <p:strVal val="visible"/>
+                                      </p:to>
+                                    </p:set>
+                                    <p:anim calcmode="lin" valueType="num">
+                                      <p:cBhvr additive="base">
+                                        <p:cTn id="70" dur="500" fill="hold"/>
+                                        <p:tgtEl>
+                                          <p:spTgt spid="26"/>
+                                        </p:tgtEl>
+                                        <p:attrNameLst>
+                                          <p:attrName>ppt_x</p:attrName>
+                                        </p:attrNameLst>
+                                      </p:cBhvr>
+                                      <p:tavLst>
+                                        <p:tav tm="0">
+                                          <p:val>
+                                            <p:strVal val="#ppt_x"/>
+                                          </p:val>
+                                        </p:tav>
+                                        <p:tav tm="100000">
+                                          <p:val>
+                                            <p:strVal val="#ppt_x"/>
+                                          </p:val>
+                                        </p:tav>
+                                      </p:tavLst>
+                                    </p:anim>
+                                    <p:anim calcmode="lin" valueType="num">
+                                      <p:cBhvr additive="base">
+                                        <p:cTn id="71" dur="500" fill="hold"/>
+                                        <p:tgtEl>
+                                          <p:spTgt spid="26"/>
+                                        </p:tgtEl>
+                                        <p:attrNameLst>
+                                          <p:attrName>ppt_y</p:attrName>
+                                        </p:attrNameLst>
+                                      </p:cBhvr>
+                                      <p:tavLst>
+                                        <p:tav tm="0">
+                                          <p:val>
+                                            <p:strVal val="1+#ppt_h/2"/>
+                                          </p:val>
+                                        </p:tav>
+                                        <p:tav tm="100000">
+                                          <p:val>
+                                            <p:strVal val="#ppt_y"/>
+                                          </p:val>
+                                        </p:tav>
+                                      </p:tavLst>
+                                    </p:anim>
+                                  </p:childTnLst>
+                                </p:cTn>
+                              </p:par>
+                              <p:par>
+                                <p:cTn id="72" presetID="2" presetClass="entr" presetSubtype="4" fill="hold" grpId="0" nodeType="withEffect">
+                                  <p:stCondLst>
+                                    <p:cond delay="0"/>
+                                  </p:stCondLst>
+                                  <p:childTnLst>
+                                    <p:set>
+                                      <p:cBhvr>
+                                        <p:cTn id="73" dur="1" fill="hold">
+                                          <p:stCondLst>
+                                            <p:cond delay="0"/>
+                                          </p:stCondLst>
+                                        </p:cTn>
+                                        <p:tgtEl>
+                                          <p:spTgt spid="34"/>
+                                        </p:tgtEl>
+                                        <p:attrNameLst>
+                                          <p:attrName>style.visibility</p:attrName>
+                                        </p:attrNameLst>
+                                      </p:cBhvr>
+                                      <p:to>
+                                        <p:strVal val="visible"/>
+                                      </p:to>
+                                    </p:set>
+                                    <p:anim calcmode="lin" valueType="num">
+                                      <p:cBhvr additive="base">
+                                        <p:cTn id="74" dur="500" fill="hold"/>
+                                        <p:tgtEl>
+                                          <p:spTgt spid="34"/>
+                                        </p:tgtEl>
+                                        <p:attrNameLst>
+                                          <p:attrName>ppt_x</p:attrName>
+                                        </p:attrNameLst>
+                                      </p:cBhvr>
+                                      <p:tavLst>
+                                        <p:tav tm="0">
+                                          <p:val>
+                                            <p:strVal val="#ppt_x"/>
+                                          </p:val>
+                                        </p:tav>
+                                        <p:tav tm="100000">
+                                          <p:val>
+                                            <p:strVal val="#ppt_x"/>
+                                          </p:val>
+                                        </p:tav>
+                                      </p:tavLst>
+                                    </p:anim>
+                                    <p:anim calcmode="lin" valueType="num">
+                                      <p:cBhvr additive="base">
+                                        <p:cTn id="75" dur="500" fill="hold"/>
+                                        <p:tgtEl>
+                                          <p:spTgt spid="34"/>
+                                        </p:tgtEl>
+                                        <p:attrNameLst>
+                                          <p:attrName>ppt_y</p:attrName>
+                                        </p:attrNameLst>
+                                      </p:cBhvr>
+                                      <p:tavLst>
+                                        <p:tav tm="0">
+                                          <p:val>
+                                            <p:strVal val="1+#ppt_h/2"/>
+                                          </p:val>
+                                        </p:tav>
+                                        <p:tav tm="100000">
+                                          <p:val>
+                                            <p:strVal val="#ppt_y"/>
+                                          </p:val>
+                                        </p:tav>
+                                      </p:tavLst>
+                                    </p:anim>
+                                  </p:childTnLst>
+                                </p:cTn>
+                              </p:par>
+                            </p:childTnLst>
+                          </p:cTn>
+                        </p:par>
+                      </p:childTnLst>
+                    </p:cTn>
+                  </p:par>
+                  <p:par>
+                    <p:cTn id="76" fill="hold">
+                      <p:stCondLst>
+                        <p:cond delay="indefinite"/>
+                      </p:stCondLst>
+                      <p:childTnLst>
+                        <p:par>
+                          <p:cTn id="77" fill="hold">
+                            <p:stCondLst>
+                              <p:cond delay="0"/>
+                            </p:stCondLst>
+                            <p:childTnLst>
+                              <p:par>
+                                <p:cTn id="78" presetID="18" presetClass="entr" presetSubtype="12" fill="hold" grpId="0" nodeType="clickEffect">
+                                  <p:stCondLst>
+                                    <p:cond delay="0"/>
+                                  </p:stCondLst>
+                                  <p:childTnLst>
+                                    <p:set>
+                                      <p:cBhvr>
+                                        <p:cTn id="79" dur="1" fill="hold">
+                                          <p:stCondLst>
+                                            <p:cond delay="0"/>
+                                          </p:stCondLst>
+                                        </p:cTn>
+                                        <p:tgtEl>
+                                          <p:spTgt spid="27"/>
+                                        </p:tgtEl>
+                                        <p:attrNameLst>
+                                          <p:attrName>style.visibility</p:attrName>
+                                        </p:attrNameLst>
+                                      </p:cBhvr>
+                                      <p:to>
+                                        <p:strVal val="visible"/>
+                                      </p:to>
+                                    </p:set>
+                                    <p:animEffect transition="in" filter="strips(downLeft)">
+                                      <p:cBhvr>
+                                        <p:cTn id="80" dur="500"/>
+                                        <p:tgtEl>
+                                          <p:spTgt spid="27"/>
+                                        </p:tgtEl>
+                                      </p:cBhvr>
+                                    </p:animEffect>
+                                  </p:childTnLst>
+                                </p:cTn>
+                              </p:par>
+                            </p:childTnLst>
+                          </p:cTn>
+                        </p:par>
+                      </p:childTnLst>
+                    </p:cTn>
+                  </p:par>
+                </p:childTnLst>
+              </p:cTn>
+              <p:prevCondLst>
+                <p:cond evt="onPrev" delay="0">
+                  <p:tgtEl>
+                    <p:sldTgt/>
+                  </p:tgtEl>
+                </p:cond>
+              </p:prevCondLst>
+              <p:nextCondLst>
+                <p:cond evt="onNext" delay="0">
+                  <p:tgtEl>
+                    <p:sldTgt/>
+                  </p:tgtEl>
+                </p:cond>
+              </p:nextCondLst>
+            </p:seq>
+          </p:childTnLst>
+        </p:cTn>
+      </p:par>
+    </p:tnLst>
+    <p:bldLst>
+      <p:bldP spid="29" grpId="0" animBg="1"/>
+      <p:bldP spid="23" grpId="0" animBg="1"/>
+      <p:bldP spid="24" grpId="0" animBg="1"/>
+      <p:bldP spid="27" grpId="0" animBg="1"/>
+      <p:bldP spid="30" grpId="0"/>
+      <p:bldP spid="31" grpId="0"/>
+      <p:bldP spid="32" grpId="0"/>
+      <p:bldP spid="33" grpId="0"/>
+      <p:bldP spid="34" grpId="0"/>
+    </p:bldLst>
   </p:timing>
 </p:sld>
 </file>

</xml_diff>

<commit_message>
dodao sam slajd o zakretanju kotača
</commit_message>
<xml_diff>
--- a/Prezentacija/FERmula 1.pptx
+++ b/Prezentacija/FERmula 1.pptx
@@ -9,6 +9,7 @@
     <p:sldId id="257" r:id="rId3"/>
     <p:sldId id="258" r:id="rId4"/>
     <p:sldId id="259" r:id="rId5"/>
+    <p:sldId id="260" r:id="rId6"/>
   </p:sldIdLst>
   <p:sldSz cx="9144000" cy="6858000" type="screen4x3"/>
   <p:notesSz cx="6858000" cy="9144000"/>
@@ -8851,6 +8852,2632 @@
 </p:sld>
 </file>
 
+<file path=ppt/slides/slide5.xml><?xml version="1.0" encoding="utf-8"?>
+<p:sld xmlns:a="http://schemas.openxmlformats.org/drawingml/2006/main" xmlns:r="http://schemas.openxmlformats.org/officeDocument/2006/relationships" xmlns:p="http://schemas.openxmlformats.org/presentationml/2006/main">
+  <p:cSld>
+    <p:spTree>
+      <p:nvGrpSpPr>
+        <p:cNvPr id="1" name=""/>
+        <p:cNvGrpSpPr/>
+        <p:nvPr/>
+      </p:nvGrpSpPr>
+      <p:grpSpPr>
+        <a:xfrm>
+          <a:off x="0" y="0"/>
+          <a:ext cx="0" cy="0"/>
+          <a:chOff x="0" y="0"/>
+          <a:chExt cx="0" cy="0"/>
+        </a:xfrm>
+      </p:grpSpPr>
+      <p:sp>
+        <p:nvSpPr>
+          <p:cNvPr id="2" name="Title 1"/>
+          <p:cNvSpPr>
+            <a:spLocks noGrp="1"/>
+          </p:cNvSpPr>
+          <p:nvPr>
+            <p:ph type="title"/>
+          </p:nvPr>
+        </p:nvSpPr>
+        <p:spPr/>
+        <p:txBody>
+          <a:bodyPr/>
+          <a:lstStyle/>
+          <a:p>
+            <a:r>
+              <a:rPr lang="hr-HR" dirty="0" smtClean="0"/>
+              <a:t>Zakretanje kotača </a:t>
+            </a:r>
+            <a:r>
+              <a:rPr lang="hr-HR" dirty="0" err="1" smtClean="0"/>
+              <a:t>FERmule</a:t>
+            </a:r>
+            <a:endParaRPr lang="hr-HR" dirty="0"/>
+          </a:p>
+        </p:txBody>
+      </p:sp>
+      <p:pic>
+        <p:nvPicPr>
+          <p:cNvPr id="4" name="Content Placeholder 3" descr="Capture.PNG"/>
+          <p:cNvPicPr>
+            <a:picLocks noGrp="1" noChangeAspect="1"/>
+          </p:cNvPicPr>
+          <p:nvPr>
+            <p:ph idx="1"/>
+          </p:nvPr>
+        </p:nvPicPr>
+        <p:blipFill>
+          <a:blip r:embed="rId2" cstate="print"/>
+          <a:stretch>
+            <a:fillRect/>
+          </a:stretch>
+        </p:blipFill>
+        <p:spPr>
+          <a:xfrm>
+            <a:off x="251520" y="1700808"/>
+            <a:ext cx="6059064" cy="3816424"/>
+          </a:xfrm>
+        </p:spPr>
+      </p:pic>
+      <p:sp>
+        <p:nvSpPr>
+          <p:cNvPr id="5" name="TextBox 4"/>
+          <p:cNvSpPr txBox="1"/>
+          <p:nvPr/>
+        </p:nvSpPr>
+        <p:spPr>
+          <a:xfrm>
+            <a:off x="2627784" y="4869160"/>
+            <a:ext cx="1080120" cy="369332"/>
+          </a:xfrm>
+          <a:prstGeom prst="rect">
+            <a:avLst/>
+          </a:prstGeom>
+          <a:noFill/>
+        </p:spPr>
+        <p:txBody>
+          <a:bodyPr wrap="square" rtlCol="0">
+            <a:spAutoFit/>
+          </a:bodyPr>
+          <a:lstStyle/>
+          <a:p>
+            <a:r>
+              <a:rPr lang="hr-HR" b="1" dirty="0" smtClean="0">
+                <a:solidFill>
+                  <a:srgbClr val="FFC000"/>
+                </a:solidFill>
+              </a:rPr>
+              <a:t>kotacPL</a:t>
+            </a:r>
+            <a:endParaRPr lang="hr-HR" b="1" dirty="0">
+              <a:solidFill>
+                <a:srgbClr val="FFC000"/>
+              </a:solidFill>
+            </a:endParaRPr>
+          </a:p>
+        </p:txBody>
+      </p:sp>
+      <p:sp>
+        <p:nvSpPr>
+          <p:cNvPr id="6" name="TextBox 5"/>
+          <p:cNvSpPr txBox="1"/>
+          <p:nvPr/>
+        </p:nvSpPr>
+        <p:spPr>
+          <a:xfrm>
+            <a:off x="971600" y="2780928"/>
+            <a:ext cx="1080120" cy="369332"/>
+          </a:xfrm>
+          <a:prstGeom prst="rect">
+            <a:avLst/>
+          </a:prstGeom>
+          <a:noFill/>
+        </p:spPr>
+        <p:txBody>
+          <a:bodyPr wrap="square" rtlCol="0">
+            <a:spAutoFit/>
+          </a:bodyPr>
+          <a:lstStyle/>
+          <a:p>
+            <a:r>
+              <a:rPr lang="hr-HR" b="1" dirty="0" smtClean="0">
+                <a:solidFill>
+                  <a:srgbClr val="FFC000"/>
+                </a:solidFill>
+              </a:rPr>
+              <a:t>kotacPD</a:t>
+            </a:r>
+            <a:endParaRPr lang="hr-HR" b="1" dirty="0">
+              <a:solidFill>
+                <a:srgbClr val="FFC000"/>
+              </a:solidFill>
+            </a:endParaRPr>
+          </a:p>
+        </p:txBody>
+      </p:sp>
+      <p:cxnSp>
+        <p:nvCxnSpPr>
+          <p:cNvPr id="11" name="Straight Arrow Connector 10"/>
+          <p:cNvCxnSpPr/>
+          <p:nvPr/>
+        </p:nvCxnSpPr>
+        <p:spPr>
+          <a:xfrm rot="5400000" flipH="1" flipV="1">
+            <a:off x="1835696" y="2780928"/>
+            <a:ext cx="792088" cy="216024"/>
+          </a:xfrm>
+          <a:prstGeom prst="straightConnector1">
+            <a:avLst/>
+          </a:prstGeom>
+          <a:ln w="28575">
+            <a:solidFill>
+              <a:srgbClr val="00B050"/>
+            </a:solidFill>
+            <a:tailEnd type="arrow"/>
+          </a:ln>
+        </p:spPr>
+        <p:style>
+          <a:lnRef idx="1">
+            <a:schemeClr val="accent1"/>
+          </a:lnRef>
+          <a:fillRef idx="0">
+            <a:schemeClr val="accent1"/>
+          </a:fillRef>
+          <a:effectRef idx="0">
+            <a:schemeClr val="accent1"/>
+          </a:effectRef>
+          <a:fontRef idx="minor">
+            <a:schemeClr val="tx1"/>
+          </a:fontRef>
+        </p:style>
+      </p:cxnSp>
+      <p:sp>
+        <p:nvSpPr>
+          <p:cNvPr id="13" name="TextBox 12"/>
+          <p:cNvSpPr txBox="1"/>
+          <p:nvPr/>
+        </p:nvSpPr>
+        <p:spPr>
+          <a:xfrm>
+            <a:off x="1691680" y="2132856"/>
+            <a:ext cx="1368152" cy="369332"/>
+          </a:xfrm>
+          <a:prstGeom prst="rect">
+            <a:avLst/>
+          </a:prstGeom>
+          <a:noFill/>
+        </p:spPr>
+        <p:txBody>
+          <a:bodyPr wrap="square" rtlCol="0">
+            <a:spAutoFit/>
+          </a:bodyPr>
+          <a:lstStyle/>
+          <a:p>
+            <a:r>
+              <a:rPr lang="hr-HR" b="1" dirty="0" smtClean="0">
+                <a:solidFill>
+                  <a:srgbClr val="00B050"/>
+                </a:solidFill>
+              </a:rPr>
+              <a:t>“</a:t>
+            </a:r>
+            <a:r>
+              <a:rPr lang="hr-HR" b="1" dirty="0" err="1" smtClean="0">
+                <a:solidFill>
+                  <a:srgbClr val="00B050"/>
+                </a:solidFill>
+              </a:rPr>
+              <a:t>Dummy</a:t>
+            </a:r>
+            <a:r>
+              <a:rPr lang="hr-HR" b="1" dirty="0" smtClean="0">
+                <a:solidFill>
+                  <a:srgbClr val="00B050"/>
+                </a:solidFill>
+              </a:rPr>
+              <a:t>”</a:t>
+            </a:r>
+            <a:endParaRPr lang="hr-HR" b="1" dirty="0">
+              <a:solidFill>
+                <a:srgbClr val="00B050"/>
+              </a:solidFill>
+            </a:endParaRPr>
+          </a:p>
+        </p:txBody>
+      </p:sp>
+      <p:sp>
+        <p:nvSpPr>
+          <p:cNvPr id="14" name="TextBox 13"/>
+          <p:cNvSpPr txBox="1"/>
+          <p:nvPr/>
+        </p:nvSpPr>
+        <p:spPr>
+          <a:xfrm>
+            <a:off x="251520" y="5229200"/>
+            <a:ext cx="4536504" cy="1446550"/>
+          </a:xfrm>
+          <a:prstGeom prst="rect">
+            <a:avLst/>
+          </a:prstGeom>
+          <a:solidFill>
+            <a:srgbClr val="FFC000"/>
+          </a:solidFill>
+          <a:ln>
+            <a:solidFill>
+              <a:schemeClr val="accent1">
+                <a:lumMod val="75000"/>
+              </a:schemeClr>
+            </a:solidFill>
+          </a:ln>
+        </p:spPr>
+        <p:txBody>
+          <a:bodyPr wrap="square" rtlCol="0">
+            <a:spAutoFit/>
+          </a:bodyPr>
+          <a:lstStyle/>
+          <a:p>
+            <a:r>
+              <a:rPr lang="hr-HR" sz="1400" dirty="0" smtClean="0">
+                <a:latin typeface="Courier New" pitchFamily="49" charset="0"/>
+                <a:cs typeface="Courier New" pitchFamily="49" charset="0"/>
+              </a:rPr>
+              <a:t>case </a:t>
+            </a:r>
+            <a:r>
+              <a:rPr lang="hr-HR" sz="1400" dirty="0" err="1" smtClean="0">
+                <a:latin typeface="Courier New" pitchFamily="49" charset="0"/>
+                <a:cs typeface="Courier New" pitchFamily="49" charset="0"/>
+              </a:rPr>
+              <a:t>osgGA</a:t>
+            </a:r>
+            <a:r>
+              <a:rPr lang="hr-HR" sz="1400" dirty="0" smtClean="0">
+                <a:latin typeface="Courier New" pitchFamily="49" charset="0"/>
+                <a:cs typeface="Courier New" pitchFamily="49" charset="0"/>
+              </a:rPr>
+              <a:t>::</a:t>
+            </a:r>
+            <a:r>
+              <a:rPr lang="hr-HR" sz="1400" dirty="0" err="1" smtClean="0">
+                <a:latin typeface="Courier New" pitchFamily="49" charset="0"/>
+                <a:cs typeface="Courier New" pitchFamily="49" charset="0"/>
+              </a:rPr>
+              <a:t>GUIEventAdapter</a:t>
+            </a:r>
+            <a:r>
+              <a:rPr lang="hr-HR" sz="1400" dirty="0" smtClean="0">
+                <a:latin typeface="Courier New" pitchFamily="49" charset="0"/>
+                <a:cs typeface="Courier New" pitchFamily="49" charset="0"/>
+              </a:rPr>
+              <a:t>::</a:t>
+            </a:r>
+            <a:r>
+              <a:rPr lang="hr-HR" sz="1400" dirty="0" smtClean="0">
+                <a:latin typeface="Courier New" pitchFamily="49" charset="0"/>
+                <a:cs typeface="Courier New" pitchFamily="49" charset="0"/>
+              </a:rPr>
+              <a:t>KEY_</a:t>
+            </a:r>
+            <a:r>
+              <a:rPr lang="hr-HR" sz="1400" dirty="0" err="1" smtClean="0">
+                <a:latin typeface="Courier New" pitchFamily="49" charset="0"/>
+                <a:cs typeface="Courier New" pitchFamily="49" charset="0"/>
+              </a:rPr>
+              <a:t>Right</a:t>
+            </a:r>
+            <a:r>
+              <a:rPr lang="hr-HR" sz="1400" dirty="0" smtClean="0">
+                <a:latin typeface="Courier New" pitchFamily="49" charset="0"/>
+                <a:cs typeface="Courier New" pitchFamily="49" charset="0"/>
+              </a:rPr>
+              <a:t>:</a:t>
+            </a:r>
+            <a:endParaRPr lang="hr-HR" sz="1400" dirty="0" smtClean="0">
+              <a:latin typeface="Courier New" pitchFamily="49" charset="0"/>
+              <a:cs typeface="Courier New" pitchFamily="49" charset="0"/>
+            </a:endParaRPr>
+          </a:p>
+          <a:p>
+            <a:r>
+              <a:rPr lang="hr-HR" sz="1400" dirty="0" smtClean="0">
+                <a:latin typeface="Courier New" pitchFamily="49" charset="0"/>
+                <a:cs typeface="Courier New" pitchFamily="49" charset="0"/>
+              </a:rPr>
+              <a:t>{</a:t>
+            </a:r>
+          </a:p>
+          <a:p>
+            <a:r>
+              <a:rPr lang="hr-HR" sz="1400" dirty="0" smtClean="0">
+                <a:latin typeface="Courier New" pitchFamily="49" charset="0"/>
+                <a:cs typeface="Courier New" pitchFamily="49" charset="0"/>
+              </a:rPr>
+              <a:t>voziloInputDeviceState-&gt;</a:t>
+            </a:r>
+            <a:r>
+              <a:rPr lang="hr-HR" sz="1400" dirty="0" err="1" smtClean="0">
+                <a:latin typeface="Courier New" pitchFamily="49" charset="0"/>
+                <a:cs typeface="Courier New" pitchFamily="49" charset="0"/>
+              </a:rPr>
+              <a:t>rotDReq</a:t>
+            </a:r>
+            <a:r>
+              <a:rPr lang="hr-HR" sz="1400" dirty="0" smtClean="0">
+                <a:latin typeface="Courier New" pitchFamily="49" charset="0"/>
+                <a:cs typeface="Courier New" pitchFamily="49" charset="0"/>
+              </a:rPr>
+              <a:t> </a:t>
+            </a:r>
+            <a:r>
+              <a:rPr lang="hr-HR" sz="1400" dirty="0" smtClean="0">
+                <a:latin typeface="Courier New" pitchFamily="49" charset="0"/>
+                <a:cs typeface="Courier New" pitchFamily="49" charset="0"/>
+              </a:rPr>
+              <a:t>= </a:t>
+            </a:r>
+            <a:r>
+              <a:rPr lang="hr-HR" sz="1400" dirty="0" err="1" smtClean="0">
+                <a:latin typeface="Courier New" pitchFamily="49" charset="0"/>
+                <a:cs typeface="Courier New" pitchFamily="49" charset="0"/>
+              </a:rPr>
+              <a:t>false</a:t>
+            </a:r>
+            <a:r>
+              <a:rPr lang="hr-HR" sz="1400" dirty="0" smtClean="0">
+                <a:latin typeface="Courier New" pitchFamily="49" charset="0"/>
+                <a:cs typeface="Courier New" pitchFamily="49" charset="0"/>
+              </a:rPr>
+              <a:t>;</a:t>
+            </a:r>
+          </a:p>
+          <a:p>
+            <a:r>
+              <a:rPr lang="hr-HR" sz="1400" dirty="0" smtClean="0">
+                <a:latin typeface="Courier New" pitchFamily="49" charset="0"/>
+                <a:cs typeface="Courier New" pitchFamily="49" charset="0"/>
+              </a:rPr>
+              <a:t>v-&gt;</a:t>
+            </a:r>
+            <a:r>
+              <a:rPr lang="hr-HR" sz="1400" dirty="0" err="1" smtClean="0">
+                <a:latin typeface="Courier New" pitchFamily="49" charset="0"/>
+                <a:cs typeface="Courier New" pitchFamily="49" charset="0"/>
+              </a:rPr>
+              <a:t>okreniLijevo</a:t>
+            </a:r>
+            <a:r>
+              <a:rPr lang="hr-HR" sz="1400" dirty="0" smtClean="0">
+                <a:latin typeface="Courier New" pitchFamily="49" charset="0"/>
+                <a:cs typeface="Courier New" pitchFamily="49" charset="0"/>
+              </a:rPr>
+              <a:t>(</a:t>
+            </a:r>
+            <a:r>
+              <a:rPr lang="hr-HR" sz="1400" dirty="0" err="1" smtClean="0">
+                <a:latin typeface="Courier New" pitchFamily="49" charset="0"/>
+                <a:cs typeface="Courier New" pitchFamily="49" charset="0"/>
+              </a:rPr>
+              <a:t>false</a:t>
+            </a:r>
+            <a:r>
+              <a:rPr lang="hr-HR" sz="1400" dirty="0" smtClean="0">
+                <a:latin typeface="Courier New" pitchFamily="49" charset="0"/>
+                <a:cs typeface="Courier New" pitchFamily="49" charset="0"/>
+              </a:rPr>
+              <a:t>);</a:t>
+            </a:r>
+          </a:p>
+          <a:p>
+            <a:r>
+              <a:rPr lang="hr-HR" sz="1400" dirty="0" err="1" smtClean="0">
+                <a:latin typeface="Courier New" pitchFamily="49" charset="0"/>
+                <a:cs typeface="Courier New" pitchFamily="49" charset="0"/>
+              </a:rPr>
+              <a:t>return</a:t>
+            </a:r>
+            <a:r>
+              <a:rPr lang="hr-HR" sz="1400" dirty="0" smtClean="0">
+                <a:latin typeface="Courier New" pitchFamily="49" charset="0"/>
+                <a:cs typeface="Courier New" pitchFamily="49" charset="0"/>
+              </a:rPr>
+              <a:t> </a:t>
+            </a:r>
+            <a:r>
+              <a:rPr lang="hr-HR" sz="1400" dirty="0" err="1" smtClean="0">
+                <a:latin typeface="Courier New" pitchFamily="49" charset="0"/>
+                <a:cs typeface="Courier New" pitchFamily="49" charset="0"/>
+              </a:rPr>
+              <a:t>false</a:t>
+            </a:r>
+            <a:r>
+              <a:rPr lang="hr-HR" sz="1400" dirty="0" smtClean="0">
+                <a:latin typeface="Courier New" pitchFamily="49" charset="0"/>
+                <a:cs typeface="Courier New" pitchFamily="49" charset="0"/>
+              </a:rPr>
+              <a:t>;</a:t>
+            </a:r>
+          </a:p>
+          <a:p>
+            <a:r>
+              <a:rPr lang="hr-HR" dirty="0" smtClean="0">
+                <a:latin typeface="Courier New" pitchFamily="49" charset="0"/>
+                <a:cs typeface="Courier New" pitchFamily="49" charset="0"/>
+              </a:rPr>
+              <a:t>}</a:t>
+            </a:r>
+            <a:endParaRPr lang="hr-HR" dirty="0"/>
+          </a:p>
+        </p:txBody>
+      </p:sp>
+      <p:sp>
+        <p:nvSpPr>
+          <p:cNvPr id="15" name="TextBox 14"/>
+          <p:cNvSpPr txBox="1"/>
+          <p:nvPr/>
+        </p:nvSpPr>
+        <p:spPr>
+          <a:xfrm>
+            <a:off x="4427984" y="1484784"/>
+            <a:ext cx="4536504" cy="4185761"/>
+          </a:xfrm>
+          <a:prstGeom prst="rect">
+            <a:avLst/>
+          </a:prstGeom>
+          <a:solidFill>
+            <a:srgbClr val="FFC000"/>
+          </a:solidFill>
+          <a:ln>
+            <a:solidFill>
+              <a:schemeClr val="accent1">
+                <a:lumMod val="75000"/>
+              </a:schemeClr>
+            </a:solidFill>
+          </a:ln>
+        </p:spPr>
+        <p:txBody>
+          <a:bodyPr wrap="square" rtlCol="0">
+            <a:spAutoFit/>
+          </a:bodyPr>
+          <a:lstStyle/>
+          <a:p>
+            <a:r>
+              <a:rPr lang="hr-HR" sz="1400" dirty="0" err="1" smtClean="0">
+                <a:latin typeface="Courier New" pitchFamily="49" charset="0"/>
+                <a:cs typeface="Courier New" pitchFamily="49" charset="0"/>
+              </a:rPr>
+              <a:t>void</a:t>
+            </a:r>
+            <a:r>
+              <a:rPr lang="hr-HR" sz="1400" dirty="0" smtClean="0">
+                <a:latin typeface="Courier New" pitchFamily="49" charset="0"/>
+                <a:cs typeface="Courier New" pitchFamily="49" charset="0"/>
+              </a:rPr>
+              <a:t> </a:t>
+            </a:r>
+            <a:r>
+              <a:rPr lang="hr-HR" sz="1400" dirty="0" err="1" smtClean="0">
+                <a:latin typeface="Courier New" pitchFamily="49" charset="0"/>
+                <a:cs typeface="Courier New" pitchFamily="49" charset="0"/>
+              </a:rPr>
+              <a:t>okreniLijevo</a:t>
+            </a:r>
+            <a:r>
+              <a:rPr lang="hr-HR" sz="1400" dirty="0" smtClean="0">
+                <a:latin typeface="Courier New" pitchFamily="49" charset="0"/>
+                <a:cs typeface="Courier New" pitchFamily="49" charset="0"/>
+              </a:rPr>
+              <a:t>(bool t)</a:t>
+            </a:r>
+          </a:p>
+          <a:p>
+            <a:r>
+              <a:rPr lang="hr-HR" sz="1400" dirty="0" smtClean="0">
+                <a:latin typeface="Courier New" pitchFamily="49" charset="0"/>
+                <a:cs typeface="Courier New" pitchFamily="49" charset="0"/>
+              </a:rPr>
+              <a:t>{</a:t>
+            </a:r>
+          </a:p>
+          <a:p>
+            <a:r>
+              <a:rPr lang="hr-HR" sz="1400" dirty="0" err="1" smtClean="0">
+                <a:latin typeface="Courier New" pitchFamily="49" charset="0"/>
+                <a:cs typeface="Courier New" pitchFamily="49" charset="0"/>
+              </a:rPr>
+              <a:t>if</a:t>
+            </a:r>
+            <a:r>
+              <a:rPr lang="hr-HR" sz="1400" dirty="0" smtClean="0">
+                <a:latin typeface="Courier New" pitchFamily="49" charset="0"/>
+                <a:cs typeface="Courier New" pitchFamily="49" charset="0"/>
+              </a:rPr>
+              <a:t> (t) </a:t>
+            </a:r>
+            <a:r>
+              <a:rPr lang="hr-HR" sz="1400" dirty="0" err="1" smtClean="0">
+                <a:latin typeface="Courier New" pitchFamily="49" charset="0"/>
+                <a:cs typeface="Courier New" pitchFamily="49" charset="0"/>
+              </a:rPr>
+              <a:t>okrenutL</a:t>
+            </a:r>
+            <a:r>
+              <a:rPr lang="hr-HR" sz="1400" dirty="0" smtClean="0">
+                <a:latin typeface="Courier New" pitchFamily="49" charset="0"/>
+                <a:cs typeface="Courier New" pitchFamily="49" charset="0"/>
+              </a:rPr>
+              <a:t> = 1;</a:t>
+            </a:r>
+          </a:p>
+          <a:p>
+            <a:r>
+              <a:rPr lang="hr-HR" sz="1400" dirty="0" err="1" smtClean="0">
+                <a:latin typeface="Courier New" pitchFamily="49" charset="0"/>
+                <a:cs typeface="Courier New" pitchFamily="49" charset="0"/>
+              </a:rPr>
+              <a:t>else</a:t>
+            </a:r>
+            <a:r>
+              <a:rPr lang="hr-HR" sz="1400" dirty="0" smtClean="0">
+                <a:latin typeface="Courier New" pitchFamily="49" charset="0"/>
+                <a:cs typeface="Courier New" pitchFamily="49" charset="0"/>
+              </a:rPr>
+              <a:t> </a:t>
+            </a:r>
+            <a:r>
+              <a:rPr lang="hr-HR" sz="1400" dirty="0" err="1" smtClean="0">
+                <a:latin typeface="Courier New" pitchFamily="49" charset="0"/>
+                <a:cs typeface="Courier New" pitchFamily="49" charset="0"/>
+              </a:rPr>
+              <a:t>okrenutD</a:t>
+            </a:r>
+            <a:r>
+              <a:rPr lang="hr-HR" sz="1400" dirty="0" smtClean="0">
+                <a:latin typeface="Courier New" pitchFamily="49" charset="0"/>
+                <a:cs typeface="Courier New" pitchFamily="49" charset="0"/>
+              </a:rPr>
+              <a:t> = 0;</a:t>
+            </a:r>
+          </a:p>
+          <a:p>
+            <a:r>
+              <a:rPr lang="hr-HR" sz="1400" dirty="0" err="1" smtClean="0">
+                <a:latin typeface="Courier New" pitchFamily="49" charset="0"/>
+                <a:cs typeface="Courier New" pitchFamily="49" charset="0"/>
+              </a:rPr>
+              <a:t>osg</a:t>
+            </a:r>
+            <a:r>
+              <a:rPr lang="hr-HR" sz="1400" dirty="0" smtClean="0">
+                <a:latin typeface="Courier New" pitchFamily="49" charset="0"/>
+                <a:cs typeface="Courier New" pitchFamily="49" charset="0"/>
+              </a:rPr>
+              <a:t>::</a:t>
+            </a:r>
+            <a:r>
+              <a:rPr lang="hr-HR" sz="1400" dirty="0" err="1" smtClean="0">
+                <a:latin typeface="Courier New" pitchFamily="49" charset="0"/>
+                <a:cs typeface="Courier New" pitchFamily="49" charset="0"/>
+              </a:rPr>
+              <a:t>Node</a:t>
+            </a:r>
+            <a:r>
+              <a:rPr lang="hr-HR" sz="1400" dirty="0" smtClean="0">
+                <a:latin typeface="Courier New" pitchFamily="49" charset="0"/>
+                <a:cs typeface="Courier New" pitchFamily="49" charset="0"/>
+              </a:rPr>
+              <a:t>* </a:t>
+            </a:r>
+            <a:r>
+              <a:rPr lang="hr-HR" sz="1400" dirty="0" err="1" smtClean="0">
+                <a:latin typeface="Courier New" pitchFamily="49" charset="0"/>
+                <a:cs typeface="Courier New" pitchFamily="49" charset="0"/>
+              </a:rPr>
+              <a:t>lijeviKotac</a:t>
+            </a:r>
+            <a:r>
+              <a:rPr lang="hr-HR" sz="1400" dirty="0" smtClean="0">
+                <a:latin typeface="Courier New" pitchFamily="49" charset="0"/>
+                <a:cs typeface="Courier New" pitchFamily="49" charset="0"/>
+              </a:rPr>
+              <a:t> = </a:t>
+            </a:r>
+            <a:r>
+              <a:rPr lang="hr-HR" sz="1400" dirty="0" err="1" smtClean="0">
+                <a:latin typeface="Courier New" pitchFamily="49" charset="0"/>
+                <a:cs typeface="Courier New" pitchFamily="49" charset="0"/>
+              </a:rPr>
+              <a:t>FindNodeByName</a:t>
+            </a:r>
+            <a:r>
+              <a:rPr lang="hr-HR" sz="1400" dirty="0" smtClean="0">
+                <a:latin typeface="Courier New" pitchFamily="49" charset="0"/>
+                <a:cs typeface="Courier New" pitchFamily="49" charset="0"/>
+              </a:rPr>
+              <a:t>( Model, "kotacPL" );</a:t>
+            </a:r>
+          </a:p>
+          <a:p>
+            <a:r>
+              <a:rPr lang="hr-HR" sz="1400" dirty="0" err="1" smtClean="0">
+                <a:latin typeface="Courier New" pitchFamily="49" charset="0"/>
+                <a:cs typeface="Courier New" pitchFamily="49" charset="0"/>
+              </a:rPr>
+              <a:t>osg</a:t>
+            </a:r>
+            <a:r>
+              <a:rPr lang="hr-HR" sz="1400" dirty="0" smtClean="0">
+                <a:latin typeface="Courier New" pitchFamily="49" charset="0"/>
+                <a:cs typeface="Courier New" pitchFamily="49" charset="0"/>
+              </a:rPr>
+              <a:t>::</a:t>
+            </a:r>
+            <a:r>
+              <a:rPr lang="hr-HR" sz="1400" dirty="0" err="1" smtClean="0">
+                <a:latin typeface="Courier New" pitchFamily="49" charset="0"/>
+                <a:cs typeface="Courier New" pitchFamily="49" charset="0"/>
+              </a:rPr>
+              <a:t>Node</a:t>
+            </a:r>
+            <a:r>
+              <a:rPr lang="hr-HR" sz="1400" dirty="0" smtClean="0">
+                <a:latin typeface="Courier New" pitchFamily="49" charset="0"/>
+                <a:cs typeface="Courier New" pitchFamily="49" charset="0"/>
+              </a:rPr>
+              <a:t>* </a:t>
+            </a:r>
+            <a:r>
+              <a:rPr lang="hr-HR" sz="1400" dirty="0" err="1" smtClean="0">
+                <a:latin typeface="Courier New" pitchFamily="49" charset="0"/>
+                <a:cs typeface="Courier New" pitchFamily="49" charset="0"/>
+              </a:rPr>
+              <a:t>desniKotac</a:t>
+            </a:r>
+            <a:r>
+              <a:rPr lang="hr-HR" sz="1400" dirty="0" smtClean="0">
+                <a:latin typeface="Courier New" pitchFamily="49" charset="0"/>
+                <a:cs typeface="Courier New" pitchFamily="49" charset="0"/>
+              </a:rPr>
+              <a:t> = </a:t>
+            </a:r>
+            <a:r>
+              <a:rPr lang="hr-HR" sz="1400" dirty="0" err="1" smtClean="0">
+                <a:latin typeface="Courier New" pitchFamily="49" charset="0"/>
+                <a:cs typeface="Courier New" pitchFamily="49" charset="0"/>
+              </a:rPr>
+              <a:t>FindNodeByName</a:t>
+            </a:r>
+            <a:r>
+              <a:rPr lang="hr-HR" sz="1400" dirty="0" smtClean="0">
+                <a:latin typeface="Courier New" pitchFamily="49" charset="0"/>
+                <a:cs typeface="Courier New" pitchFamily="49" charset="0"/>
+              </a:rPr>
+              <a:t>( Model, "kotacPD" );</a:t>
+            </a:r>
+          </a:p>
+          <a:p>
+            <a:r>
+              <a:rPr lang="hr-HR" sz="1400" dirty="0" err="1" smtClean="0">
+                <a:latin typeface="Courier New" pitchFamily="49" charset="0"/>
+                <a:cs typeface="Courier New" pitchFamily="49" charset="0"/>
+              </a:rPr>
+              <a:t>osg</a:t>
+            </a:r>
+            <a:r>
+              <a:rPr lang="hr-HR" sz="1400" dirty="0" smtClean="0">
+                <a:latin typeface="Courier New" pitchFamily="49" charset="0"/>
+                <a:cs typeface="Courier New" pitchFamily="49" charset="0"/>
+              </a:rPr>
+              <a:t>::</a:t>
+            </a:r>
+            <a:r>
+              <a:rPr lang="hr-HR" sz="1400" dirty="0" err="1" smtClean="0">
+                <a:latin typeface="Courier New" pitchFamily="49" charset="0"/>
+                <a:cs typeface="Courier New" pitchFamily="49" charset="0"/>
+              </a:rPr>
+              <a:t>MatrixTransform</a:t>
+            </a:r>
+            <a:r>
+              <a:rPr lang="hr-HR" sz="1400" dirty="0" smtClean="0">
+                <a:latin typeface="Courier New" pitchFamily="49" charset="0"/>
+                <a:cs typeface="Courier New" pitchFamily="49" charset="0"/>
+              </a:rPr>
+              <a:t>* </a:t>
+            </a:r>
+            <a:r>
+              <a:rPr lang="hr-HR" sz="1400" dirty="0" err="1" smtClean="0">
+                <a:latin typeface="Courier New" pitchFamily="49" charset="0"/>
+                <a:cs typeface="Courier New" pitchFamily="49" charset="0"/>
+              </a:rPr>
+              <a:t>ltr</a:t>
+            </a:r>
+            <a:r>
+              <a:rPr lang="hr-HR" sz="1400" dirty="0" smtClean="0">
+                <a:latin typeface="Courier New" pitchFamily="49" charset="0"/>
+                <a:cs typeface="Courier New" pitchFamily="49" charset="0"/>
+              </a:rPr>
+              <a:t> = </a:t>
+            </a:r>
+            <a:r>
+              <a:rPr lang="hr-HR" sz="1400" dirty="0" err="1" smtClean="0">
+                <a:latin typeface="Courier New" pitchFamily="49" charset="0"/>
+                <a:cs typeface="Courier New" pitchFamily="49" charset="0"/>
+              </a:rPr>
+              <a:t>AddMatrixTransform</a:t>
+            </a:r>
+            <a:r>
+              <a:rPr lang="hr-HR" sz="1400" dirty="0" smtClean="0">
+                <a:latin typeface="Courier New" pitchFamily="49" charset="0"/>
+                <a:cs typeface="Courier New" pitchFamily="49" charset="0"/>
+              </a:rPr>
+              <a:t>(</a:t>
+            </a:r>
+            <a:r>
+              <a:rPr lang="hr-HR" sz="1400" dirty="0" err="1" smtClean="0">
+                <a:latin typeface="Courier New" pitchFamily="49" charset="0"/>
+                <a:cs typeface="Courier New" pitchFamily="49" charset="0"/>
+              </a:rPr>
+              <a:t>lijeviKotac</a:t>
+            </a:r>
+            <a:r>
+              <a:rPr lang="hr-HR" sz="1400" dirty="0" smtClean="0">
+                <a:latin typeface="Courier New" pitchFamily="49" charset="0"/>
+                <a:cs typeface="Courier New" pitchFamily="49" charset="0"/>
+              </a:rPr>
+              <a:t>);</a:t>
+            </a:r>
+          </a:p>
+          <a:p>
+            <a:r>
+              <a:rPr lang="hr-HR" sz="1400" dirty="0" err="1" smtClean="0">
+                <a:latin typeface="Courier New" pitchFamily="49" charset="0"/>
+                <a:cs typeface="Courier New" pitchFamily="49" charset="0"/>
+              </a:rPr>
+              <a:t>osg</a:t>
+            </a:r>
+            <a:r>
+              <a:rPr lang="hr-HR" sz="1400" dirty="0" smtClean="0">
+                <a:latin typeface="Courier New" pitchFamily="49" charset="0"/>
+                <a:cs typeface="Courier New" pitchFamily="49" charset="0"/>
+              </a:rPr>
+              <a:t>::</a:t>
+            </a:r>
+            <a:r>
+              <a:rPr lang="hr-HR" sz="1400" dirty="0" err="1" smtClean="0">
+                <a:latin typeface="Courier New" pitchFamily="49" charset="0"/>
+                <a:cs typeface="Courier New" pitchFamily="49" charset="0"/>
+              </a:rPr>
+              <a:t>MatrixTransform</a:t>
+            </a:r>
+            <a:r>
+              <a:rPr lang="hr-HR" sz="1400" dirty="0" smtClean="0">
+                <a:latin typeface="Courier New" pitchFamily="49" charset="0"/>
+                <a:cs typeface="Courier New" pitchFamily="49" charset="0"/>
+              </a:rPr>
+              <a:t>* </a:t>
+            </a:r>
+            <a:r>
+              <a:rPr lang="hr-HR" sz="1400" dirty="0" err="1" smtClean="0">
+                <a:latin typeface="Courier New" pitchFamily="49" charset="0"/>
+                <a:cs typeface="Courier New" pitchFamily="49" charset="0"/>
+              </a:rPr>
+              <a:t>dtr</a:t>
+            </a:r>
+            <a:r>
+              <a:rPr lang="hr-HR" sz="1400" dirty="0" smtClean="0">
+                <a:latin typeface="Courier New" pitchFamily="49" charset="0"/>
+                <a:cs typeface="Courier New" pitchFamily="49" charset="0"/>
+              </a:rPr>
+              <a:t> = </a:t>
+            </a:r>
+            <a:r>
+              <a:rPr lang="hr-HR" sz="1400" dirty="0" err="1" smtClean="0">
+                <a:latin typeface="Courier New" pitchFamily="49" charset="0"/>
+                <a:cs typeface="Courier New" pitchFamily="49" charset="0"/>
+              </a:rPr>
+              <a:t>AddMatrixTransform</a:t>
+            </a:r>
+            <a:r>
+              <a:rPr lang="hr-HR" sz="1400" dirty="0" smtClean="0">
+                <a:latin typeface="Courier New" pitchFamily="49" charset="0"/>
+                <a:cs typeface="Courier New" pitchFamily="49" charset="0"/>
+              </a:rPr>
+              <a:t>(</a:t>
+            </a:r>
+            <a:r>
+              <a:rPr lang="hr-HR" sz="1400" dirty="0" err="1" smtClean="0">
+                <a:latin typeface="Courier New" pitchFamily="49" charset="0"/>
+                <a:cs typeface="Courier New" pitchFamily="49" charset="0"/>
+              </a:rPr>
+              <a:t>desniKotac</a:t>
+            </a:r>
+            <a:r>
+              <a:rPr lang="hr-HR" sz="1400" dirty="0" smtClean="0">
+                <a:latin typeface="Courier New" pitchFamily="49" charset="0"/>
+                <a:cs typeface="Courier New" pitchFamily="49" charset="0"/>
+              </a:rPr>
+              <a:t>);</a:t>
+            </a:r>
+          </a:p>
+          <a:p>
+            <a:r>
+              <a:rPr lang="hr-HR" sz="1400" dirty="0" err="1" smtClean="0">
+                <a:latin typeface="Courier New" pitchFamily="49" charset="0"/>
+                <a:cs typeface="Courier New" pitchFamily="49" charset="0"/>
+              </a:rPr>
+              <a:t>ltr</a:t>
+            </a:r>
+            <a:r>
+              <a:rPr lang="hr-HR" sz="1400" dirty="0" smtClean="0">
+                <a:latin typeface="Courier New" pitchFamily="49" charset="0"/>
+                <a:cs typeface="Courier New" pitchFamily="49" charset="0"/>
+              </a:rPr>
+              <a:t>-&gt;</a:t>
+            </a:r>
+            <a:r>
+              <a:rPr lang="hr-HR" sz="1400" dirty="0" err="1" smtClean="0">
+                <a:latin typeface="Courier New" pitchFamily="49" charset="0"/>
+                <a:cs typeface="Courier New" pitchFamily="49" charset="0"/>
+              </a:rPr>
+              <a:t>setMatrix</a:t>
+            </a:r>
+            <a:r>
+              <a:rPr lang="hr-HR" sz="1400" dirty="0" smtClean="0">
+                <a:latin typeface="Courier New" pitchFamily="49" charset="0"/>
+                <a:cs typeface="Courier New" pitchFamily="49" charset="0"/>
+              </a:rPr>
+              <a:t>(</a:t>
+            </a:r>
+            <a:r>
+              <a:rPr lang="hr-HR" sz="1400" dirty="0" err="1" smtClean="0">
+                <a:latin typeface="Courier New" pitchFamily="49" charset="0"/>
+                <a:cs typeface="Courier New" pitchFamily="49" charset="0"/>
+              </a:rPr>
+              <a:t>osg</a:t>
+            </a:r>
+            <a:r>
+              <a:rPr lang="hr-HR" sz="1400" dirty="0" smtClean="0">
+                <a:latin typeface="Courier New" pitchFamily="49" charset="0"/>
+                <a:cs typeface="Courier New" pitchFamily="49" charset="0"/>
+              </a:rPr>
+              <a:t>::</a:t>
+            </a:r>
+            <a:r>
+              <a:rPr lang="hr-HR" sz="1400" dirty="0" err="1" smtClean="0">
+                <a:latin typeface="Courier New" pitchFamily="49" charset="0"/>
+                <a:cs typeface="Courier New" pitchFamily="49" charset="0"/>
+              </a:rPr>
+              <a:t>Matrix</a:t>
+            </a:r>
+            <a:r>
+              <a:rPr lang="hr-HR" sz="1400" dirty="0" smtClean="0">
+                <a:latin typeface="Courier New" pitchFamily="49" charset="0"/>
+                <a:cs typeface="Courier New" pitchFamily="49" charset="0"/>
+              </a:rPr>
+              <a:t>::</a:t>
+            </a:r>
+            <a:r>
+              <a:rPr lang="hr-HR" sz="1400" dirty="0" err="1" smtClean="0">
+                <a:latin typeface="Courier New" pitchFamily="49" charset="0"/>
+                <a:cs typeface="Courier New" pitchFamily="49" charset="0"/>
+              </a:rPr>
+              <a:t>rotate</a:t>
+            </a:r>
+            <a:r>
+              <a:rPr lang="hr-HR" sz="1400" dirty="0" smtClean="0">
+                <a:latin typeface="Courier New" pitchFamily="49" charset="0"/>
+                <a:cs typeface="Courier New" pitchFamily="49" charset="0"/>
+              </a:rPr>
+              <a:t>(</a:t>
+            </a:r>
+            <a:r>
+              <a:rPr lang="hr-HR" sz="1400" dirty="0" err="1" smtClean="0">
+                <a:latin typeface="Courier New" pitchFamily="49" charset="0"/>
+                <a:cs typeface="Courier New" pitchFamily="49" charset="0"/>
+              </a:rPr>
+              <a:t>osg</a:t>
+            </a:r>
+            <a:r>
+              <a:rPr lang="hr-HR" sz="1400" dirty="0" smtClean="0">
+                <a:latin typeface="Courier New" pitchFamily="49" charset="0"/>
+                <a:cs typeface="Courier New" pitchFamily="49" charset="0"/>
+              </a:rPr>
+              <a:t>::</a:t>
+            </a:r>
+            <a:r>
+              <a:rPr lang="hr-HR" sz="1400" dirty="0" err="1" smtClean="0">
+                <a:latin typeface="Courier New" pitchFamily="49" charset="0"/>
+                <a:cs typeface="Courier New" pitchFamily="49" charset="0"/>
+              </a:rPr>
+              <a:t>inDegrees</a:t>
+            </a:r>
+            <a:r>
+              <a:rPr lang="hr-HR" sz="1400" dirty="0" smtClean="0">
+                <a:latin typeface="Courier New" pitchFamily="49" charset="0"/>
+                <a:cs typeface="Courier New" pitchFamily="49" charset="0"/>
+              </a:rPr>
+              <a:t>(30.0f),</a:t>
+            </a:r>
+            <a:r>
+              <a:rPr lang="hr-HR" sz="1400" dirty="0" err="1" smtClean="0">
+                <a:latin typeface="Courier New" pitchFamily="49" charset="0"/>
+                <a:cs typeface="Courier New" pitchFamily="49" charset="0"/>
+              </a:rPr>
+              <a:t>osg</a:t>
+            </a:r>
+            <a:r>
+              <a:rPr lang="hr-HR" sz="1400" dirty="0" smtClean="0">
+                <a:latin typeface="Courier New" pitchFamily="49" charset="0"/>
+                <a:cs typeface="Courier New" pitchFamily="49" charset="0"/>
+              </a:rPr>
+              <a:t>::Z_AXIS));</a:t>
+            </a:r>
+          </a:p>
+          <a:p>
+            <a:r>
+              <a:rPr lang="hr-HR" sz="1400" dirty="0" err="1" smtClean="0">
+                <a:latin typeface="Courier New" pitchFamily="49" charset="0"/>
+                <a:cs typeface="Courier New" pitchFamily="49" charset="0"/>
+              </a:rPr>
+              <a:t>dtr</a:t>
+            </a:r>
+            <a:r>
+              <a:rPr lang="hr-HR" sz="1400" dirty="0" smtClean="0">
+                <a:latin typeface="Courier New" pitchFamily="49" charset="0"/>
+                <a:cs typeface="Courier New" pitchFamily="49" charset="0"/>
+              </a:rPr>
+              <a:t>-&gt;</a:t>
+            </a:r>
+            <a:r>
+              <a:rPr lang="hr-HR" sz="1400" dirty="0" err="1" smtClean="0">
+                <a:latin typeface="Courier New" pitchFamily="49" charset="0"/>
+                <a:cs typeface="Courier New" pitchFamily="49" charset="0"/>
+              </a:rPr>
+              <a:t>setMatrix</a:t>
+            </a:r>
+            <a:r>
+              <a:rPr lang="hr-HR" sz="1400" dirty="0" smtClean="0">
+                <a:latin typeface="Courier New" pitchFamily="49" charset="0"/>
+                <a:cs typeface="Courier New" pitchFamily="49" charset="0"/>
+              </a:rPr>
+              <a:t>(</a:t>
+            </a:r>
+            <a:r>
+              <a:rPr lang="hr-HR" sz="1400" dirty="0" err="1" smtClean="0">
+                <a:latin typeface="Courier New" pitchFamily="49" charset="0"/>
+                <a:cs typeface="Courier New" pitchFamily="49" charset="0"/>
+              </a:rPr>
+              <a:t>osg</a:t>
+            </a:r>
+            <a:r>
+              <a:rPr lang="hr-HR" sz="1400" dirty="0" smtClean="0">
+                <a:latin typeface="Courier New" pitchFamily="49" charset="0"/>
+                <a:cs typeface="Courier New" pitchFamily="49" charset="0"/>
+              </a:rPr>
+              <a:t>::</a:t>
+            </a:r>
+            <a:r>
+              <a:rPr lang="hr-HR" sz="1400" dirty="0" err="1" smtClean="0">
+                <a:latin typeface="Courier New" pitchFamily="49" charset="0"/>
+                <a:cs typeface="Courier New" pitchFamily="49" charset="0"/>
+              </a:rPr>
+              <a:t>Matrix</a:t>
+            </a:r>
+            <a:r>
+              <a:rPr lang="hr-HR" sz="1400" dirty="0" smtClean="0">
+                <a:latin typeface="Courier New" pitchFamily="49" charset="0"/>
+                <a:cs typeface="Courier New" pitchFamily="49" charset="0"/>
+              </a:rPr>
+              <a:t>::</a:t>
+            </a:r>
+            <a:r>
+              <a:rPr lang="hr-HR" sz="1400" dirty="0" err="1" smtClean="0">
+                <a:latin typeface="Courier New" pitchFamily="49" charset="0"/>
+                <a:cs typeface="Courier New" pitchFamily="49" charset="0"/>
+              </a:rPr>
+              <a:t>rotate</a:t>
+            </a:r>
+            <a:r>
+              <a:rPr lang="hr-HR" sz="1400" dirty="0" smtClean="0">
+                <a:latin typeface="Courier New" pitchFamily="49" charset="0"/>
+                <a:cs typeface="Courier New" pitchFamily="49" charset="0"/>
+              </a:rPr>
+              <a:t>(</a:t>
+            </a:r>
+            <a:r>
+              <a:rPr lang="hr-HR" sz="1400" dirty="0" err="1" smtClean="0">
+                <a:latin typeface="Courier New" pitchFamily="49" charset="0"/>
+                <a:cs typeface="Courier New" pitchFamily="49" charset="0"/>
+              </a:rPr>
+              <a:t>osg</a:t>
+            </a:r>
+            <a:r>
+              <a:rPr lang="hr-HR" sz="1400" dirty="0" smtClean="0">
+                <a:latin typeface="Courier New" pitchFamily="49" charset="0"/>
+                <a:cs typeface="Courier New" pitchFamily="49" charset="0"/>
+              </a:rPr>
+              <a:t>::</a:t>
+            </a:r>
+            <a:r>
+              <a:rPr lang="hr-HR" sz="1400" dirty="0" err="1" smtClean="0">
+                <a:latin typeface="Courier New" pitchFamily="49" charset="0"/>
+                <a:cs typeface="Courier New" pitchFamily="49" charset="0"/>
+              </a:rPr>
+              <a:t>inDegrees</a:t>
+            </a:r>
+            <a:r>
+              <a:rPr lang="hr-HR" sz="1400" dirty="0" smtClean="0">
+                <a:latin typeface="Courier New" pitchFamily="49" charset="0"/>
+                <a:cs typeface="Courier New" pitchFamily="49" charset="0"/>
+              </a:rPr>
+              <a:t>(30.0f),</a:t>
+            </a:r>
+            <a:r>
+              <a:rPr lang="hr-HR" sz="1400" dirty="0" err="1" smtClean="0">
+                <a:latin typeface="Courier New" pitchFamily="49" charset="0"/>
+                <a:cs typeface="Courier New" pitchFamily="49" charset="0"/>
+              </a:rPr>
+              <a:t>osg</a:t>
+            </a:r>
+            <a:r>
+              <a:rPr lang="hr-HR" sz="1400" dirty="0" smtClean="0">
+                <a:latin typeface="Courier New" pitchFamily="49" charset="0"/>
+                <a:cs typeface="Courier New" pitchFamily="49" charset="0"/>
+              </a:rPr>
+              <a:t>::Z_AXIS));</a:t>
+            </a:r>
+          </a:p>
+          <a:p>
+            <a:r>
+              <a:rPr lang="hr-HR" sz="1400" dirty="0" smtClean="0">
+                <a:latin typeface="Courier New" pitchFamily="49" charset="0"/>
+                <a:cs typeface="Courier New" pitchFamily="49" charset="0"/>
+              </a:rPr>
+              <a:t>}</a:t>
+            </a:r>
+            <a:endParaRPr lang="hr-HR" dirty="0"/>
+          </a:p>
+        </p:txBody>
+      </p:sp>
+      <p:sp>
+        <p:nvSpPr>
+          <p:cNvPr id="17" name="Bent Arrow 16"/>
+          <p:cNvSpPr/>
+          <p:nvPr/>
+        </p:nvSpPr>
+        <p:spPr>
+          <a:xfrm rot="16200000" flipV="1">
+            <a:off x="5436096" y="4941168"/>
+            <a:ext cx="1008112" cy="2016224"/>
+          </a:xfrm>
+          <a:prstGeom prst="bentArrow">
+            <a:avLst/>
+          </a:prstGeom>
+        </p:spPr>
+        <p:style>
+          <a:lnRef idx="2">
+            <a:schemeClr val="accent1">
+              <a:shade val="50000"/>
+            </a:schemeClr>
+          </a:lnRef>
+          <a:fillRef idx="1">
+            <a:schemeClr val="accent1"/>
+          </a:fillRef>
+          <a:effectRef idx="0">
+            <a:schemeClr val="accent1"/>
+          </a:effectRef>
+          <a:fontRef idx="minor">
+            <a:schemeClr val="lt1"/>
+          </a:fontRef>
+        </p:style>
+        <p:txBody>
+          <a:bodyPr rtlCol="0" anchor="ctr"/>
+          <a:lstStyle/>
+          <a:p>
+            <a:pPr algn="ctr"/>
+            <a:endParaRPr lang="hr-HR">
+              <a:solidFill>
+                <a:schemeClr val="tx1"/>
+              </a:solidFill>
+            </a:endParaRPr>
+          </a:p>
+        </p:txBody>
+      </p:sp>
+      <p:sp>
+        <p:nvSpPr>
+          <p:cNvPr id="19" name="Oval 18"/>
+          <p:cNvSpPr/>
+          <p:nvPr/>
+        </p:nvSpPr>
+        <p:spPr>
+          <a:xfrm>
+            <a:off x="6948264" y="2276872"/>
+            <a:ext cx="1944216" cy="864096"/>
+          </a:xfrm>
+          <a:prstGeom prst="ellipse">
+            <a:avLst/>
+          </a:prstGeom>
+          <a:solidFill>
+            <a:schemeClr val="accent1">
+              <a:lumMod val="75000"/>
+              <a:alpha val="35000"/>
+            </a:schemeClr>
+          </a:solidFill>
+        </p:spPr>
+        <p:style>
+          <a:lnRef idx="2">
+            <a:schemeClr val="accent1">
+              <a:shade val="50000"/>
+            </a:schemeClr>
+          </a:lnRef>
+          <a:fillRef idx="1">
+            <a:schemeClr val="accent1"/>
+          </a:fillRef>
+          <a:effectRef idx="0">
+            <a:schemeClr val="accent1"/>
+          </a:effectRef>
+          <a:fontRef idx="minor">
+            <a:schemeClr val="lt1"/>
+          </a:fontRef>
+        </p:style>
+        <p:txBody>
+          <a:bodyPr rtlCol="0" anchor="ctr"/>
+          <a:lstStyle/>
+          <a:p>
+            <a:pPr algn="ctr"/>
+            <a:endParaRPr lang="hr-HR"/>
+          </a:p>
+        </p:txBody>
+      </p:sp>
+      <p:sp>
+        <p:nvSpPr>
+          <p:cNvPr id="18" name="TextBox 17"/>
+          <p:cNvSpPr txBox="1"/>
+          <p:nvPr/>
+        </p:nvSpPr>
+        <p:spPr>
+          <a:xfrm>
+            <a:off x="4247456" y="764704"/>
+            <a:ext cx="4896544" cy="5904656"/>
+          </a:xfrm>
+          <a:prstGeom prst="rect">
+            <a:avLst/>
+          </a:prstGeom>
+          <a:solidFill>
+            <a:srgbClr val="FFC000"/>
+          </a:solidFill>
+          <a:ln>
+            <a:solidFill>
+              <a:schemeClr val="accent1">
+                <a:lumMod val="75000"/>
+              </a:schemeClr>
+            </a:solidFill>
+          </a:ln>
+        </p:spPr>
+        <p:txBody>
+          <a:bodyPr wrap="square" rtlCol="0">
+            <a:spAutoFit/>
+          </a:bodyPr>
+          <a:lstStyle/>
+          <a:p>
+            <a:r>
+              <a:rPr lang="hr-HR" sz="1400" dirty="0" smtClean="0">
+                <a:latin typeface="Courier New" pitchFamily="49" charset="0"/>
+                <a:cs typeface="Courier New" pitchFamily="49" charset="0"/>
+              </a:rPr>
+              <a:t>// funkcija za traženje dijelova modela (služi za animaciju kotaca)</a:t>
+            </a:r>
+          </a:p>
+          <a:p>
+            <a:r>
+              <a:rPr lang="hr-HR" sz="1400" dirty="0" err="1" smtClean="0">
+                <a:latin typeface="Courier New" pitchFamily="49" charset="0"/>
+                <a:cs typeface="Courier New" pitchFamily="49" charset="0"/>
+              </a:rPr>
+              <a:t>osg</a:t>
+            </a:r>
+            <a:r>
+              <a:rPr lang="hr-HR" sz="1400" dirty="0" smtClean="0">
+                <a:latin typeface="Courier New" pitchFamily="49" charset="0"/>
+                <a:cs typeface="Courier New" pitchFamily="49" charset="0"/>
+              </a:rPr>
+              <a:t>::</a:t>
+            </a:r>
+            <a:r>
+              <a:rPr lang="hr-HR" sz="1400" dirty="0" err="1" smtClean="0">
+                <a:latin typeface="Courier New" pitchFamily="49" charset="0"/>
+                <a:cs typeface="Courier New" pitchFamily="49" charset="0"/>
+              </a:rPr>
+              <a:t>Node</a:t>
+            </a:r>
+            <a:r>
+              <a:rPr lang="hr-HR" sz="1400" dirty="0" smtClean="0">
+                <a:latin typeface="Courier New" pitchFamily="49" charset="0"/>
+                <a:cs typeface="Courier New" pitchFamily="49" charset="0"/>
+              </a:rPr>
+              <a:t>* </a:t>
+            </a:r>
+            <a:r>
+              <a:rPr lang="hr-HR" sz="1400" dirty="0" err="1" smtClean="0">
+                <a:latin typeface="Courier New" pitchFamily="49" charset="0"/>
+                <a:cs typeface="Courier New" pitchFamily="49" charset="0"/>
+              </a:rPr>
+              <a:t>FindNodeByName</a:t>
+            </a:r>
+            <a:r>
+              <a:rPr lang="hr-HR" sz="1400" dirty="0" smtClean="0">
+                <a:latin typeface="Courier New" pitchFamily="49" charset="0"/>
+                <a:cs typeface="Courier New" pitchFamily="49" charset="0"/>
+              </a:rPr>
+              <a:t>( </a:t>
+            </a:r>
+            <a:r>
+              <a:rPr lang="hr-HR" sz="1400" dirty="0" err="1" smtClean="0">
+                <a:latin typeface="Courier New" pitchFamily="49" charset="0"/>
+                <a:cs typeface="Courier New" pitchFamily="49" charset="0"/>
+              </a:rPr>
+              <a:t>osg</a:t>
+            </a:r>
+            <a:r>
+              <a:rPr lang="hr-HR" sz="1400" dirty="0" smtClean="0">
+                <a:latin typeface="Courier New" pitchFamily="49" charset="0"/>
+                <a:cs typeface="Courier New" pitchFamily="49" charset="0"/>
+              </a:rPr>
+              <a:t>::</a:t>
+            </a:r>
+            <a:r>
+              <a:rPr lang="hr-HR" sz="1400" dirty="0" err="1" smtClean="0">
+                <a:latin typeface="Courier New" pitchFamily="49" charset="0"/>
+                <a:cs typeface="Courier New" pitchFamily="49" charset="0"/>
+              </a:rPr>
+              <a:t>Node</a:t>
+            </a:r>
+            <a:r>
+              <a:rPr lang="hr-HR" sz="1400" dirty="0" smtClean="0">
+                <a:latin typeface="Courier New" pitchFamily="49" charset="0"/>
+                <a:cs typeface="Courier New" pitchFamily="49" charset="0"/>
+              </a:rPr>
+              <a:t>* </a:t>
+            </a:r>
+            <a:r>
+              <a:rPr lang="hr-HR" sz="1400" dirty="0" err="1" smtClean="0">
+                <a:latin typeface="Courier New" pitchFamily="49" charset="0"/>
+                <a:cs typeface="Courier New" pitchFamily="49" charset="0"/>
+              </a:rPr>
+              <a:t>pNode</a:t>
+            </a:r>
+            <a:r>
+              <a:rPr lang="hr-HR" sz="1400" dirty="0" smtClean="0">
+                <a:latin typeface="Courier New" pitchFamily="49" charset="0"/>
+                <a:cs typeface="Courier New" pitchFamily="49" charset="0"/>
+              </a:rPr>
+              <a:t>, </a:t>
+            </a:r>
+            <a:r>
+              <a:rPr lang="hr-HR" sz="1400" dirty="0" err="1" smtClean="0">
+                <a:latin typeface="Courier New" pitchFamily="49" charset="0"/>
+                <a:cs typeface="Courier New" pitchFamily="49" charset="0"/>
+              </a:rPr>
+              <a:t>const</a:t>
+            </a:r>
+            <a:r>
+              <a:rPr lang="hr-HR" sz="1400" dirty="0" smtClean="0">
+                <a:latin typeface="Courier New" pitchFamily="49" charset="0"/>
+                <a:cs typeface="Courier New" pitchFamily="49" charset="0"/>
+              </a:rPr>
+              <a:t> </a:t>
+            </a:r>
+            <a:r>
+              <a:rPr lang="hr-HR" sz="1400" dirty="0" err="1" smtClean="0">
+                <a:latin typeface="Courier New" pitchFamily="49" charset="0"/>
+                <a:cs typeface="Courier New" pitchFamily="49" charset="0"/>
+              </a:rPr>
+              <a:t>std</a:t>
+            </a:r>
+            <a:r>
+              <a:rPr lang="hr-HR" sz="1400" dirty="0" smtClean="0">
+                <a:latin typeface="Courier New" pitchFamily="49" charset="0"/>
+                <a:cs typeface="Courier New" pitchFamily="49" charset="0"/>
+              </a:rPr>
+              <a:t>::</a:t>
+            </a:r>
+            <a:r>
+              <a:rPr lang="hr-HR" sz="1400" dirty="0" err="1" smtClean="0">
+                <a:latin typeface="Courier New" pitchFamily="49" charset="0"/>
+                <a:cs typeface="Courier New" pitchFamily="49" charset="0"/>
+              </a:rPr>
+              <a:t>string</a:t>
+            </a:r>
+            <a:r>
+              <a:rPr lang="hr-HR" sz="1400" dirty="0" smtClean="0">
+                <a:latin typeface="Courier New" pitchFamily="49" charset="0"/>
+                <a:cs typeface="Courier New" pitchFamily="49" charset="0"/>
+              </a:rPr>
+              <a:t>&amp; </a:t>
+            </a:r>
+            <a:r>
+              <a:rPr lang="hr-HR" sz="1400" dirty="0" err="1" smtClean="0">
+                <a:latin typeface="Courier New" pitchFamily="49" charset="0"/>
+                <a:cs typeface="Courier New" pitchFamily="49" charset="0"/>
+              </a:rPr>
+              <a:t>sName</a:t>
+            </a:r>
+            <a:r>
+              <a:rPr lang="hr-HR" sz="1400" dirty="0" smtClean="0">
+                <a:latin typeface="Courier New" pitchFamily="49" charset="0"/>
+                <a:cs typeface="Courier New" pitchFamily="49" charset="0"/>
+              </a:rPr>
+              <a:t> )</a:t>
+            </a:r>
+          </a:p>
+          <a:p>
+            <a:r>
+              <a:rPr lang="hr-HR" sz="1400" dirty="0" smtClean="0">
+                <a:latin typeface="Courier New" pitchFamily="49" charset="0"/>
+                <a:cs typeface="Courier New" pitchFamily="49" charset="0"/>
+              </a:rPr>
+              <a:t>{</a:t>
+            </a:r>
+          </a:p>
+          <a:p>
+            <a:r>
+              <a:rPr lang="hr-HR" sz="1400" dirty="0" err="1" smtClean="0">
+                <a:latin typeface="Courier New" pitchFamily="49" charset="0"/>
+                <a:cs typeface="Courier New" pitchFamily="49" charset="0"/>
+              </a:rPr>
+              <a:t>if</a:t>
+            </a:r>
+            <a:r>
+              <a:rPr lang="hr-HR" sz="1400" dirty="0" smtClean="0">
+                <a:latin typeface="Courier New" pitchFamily="49" charset="0"/>
+                <a:cs typeface="Courier New" pitchFamily="49" charset="0"/>
+              </a:rPr>
+              <a:t> ( </a:t>
+            </a:r>
+            <a:r>
+              <a:rPr lang="hr-HR" sz="1400" dirty="0" err="1" smtClean="0">
+                <a:latin typeface="Courier New" pitchFamily="49" charset="0"/>
+                <a:cs typeface="Courier New" pitchFamily="49" charset="0"/>
+              </a:rPr>
+              <a:t>pNode</a:t>
+            </a:r>
+            <a:r>
+              <a:rPr lang="hr-HR" sz="1400" dirty="0" smtClean="0">
+                <a:latin typeface="Courier New" pitchFamily="49" charset="0"/>
+                <a:cs typeface="Courier New" pitchFamily="49" charset="0"/>
+              </a:rPr>
+              <a:t>-&gt;</a:t>
+            </a:r>
+            <a:r>
+              <a:rPr lang="hr-HR" sz="1400" dirty="0" err="1" smtClean="0">
+                <a:latin typeface="Courier New" pitchFamily="49" charset="0"/>
+                <a:cs typeface="Courier New" pitchFamily="49" charset="0"/>
+              </a:rPr>
+              <a:t>getName</a:t>
+            </a:r>
+            <a:r>
+              <a:rPr lang="hr-HR" sz="1400" dirty="0" smtClean="0">
+                <a:latin typeface="Courier New" pitchFamily="49" charset="0"/>
+                <a:cs typeface="Courier New" pitchFamily="49" charset="0"/>
+              </a:rPr>
+              <a:t>()==</a:t>
+            </a:r>
+            <a:r>
+              <a:rPr lang="hr-HR" sz="1400" dirty="0" err="1" smtClean="0">
+                <a:latin typeface="Courier New" pitchFamily="49" charset="0"/>
+                <a:cs typeface="Courier New" pitchFamily="49" charset="0"/>
+              </a:rPr>
+              <a:t>sName</a:t>
+            </a:r>
+            <a:r>
+              <a:rPr lang="hr-HR" sz="1400" dirty="0" smtClean="0">
+                <a:latin typeface="Courier New" pitchFamily="49" charset="0"/>
+                <a:cs typeface="Courier New" pitchFamily="49" charset="0"/>
+              </a:rPr>
+              <a:t> )</a:t>
+            </a:r>
+          </a:p>
+          <a:p>
+            <a:r>
+              <a:rPr lang="hr-HR" sz="1400" dirty="0" smtClean="0">
+                <a:latin typeface="Courier New" pitchFamily="49" charset="0"/>
+                <a:cs typeface="Courier New" pitchFamily="49" charset="0"/>
+              </a:rPr>
+              <a:t>{</a:t>
+            </a:r>
+          </a:p>
+          <a:p>
+            <a:r>
+              <a:rPr lang="hr-HR" sz="1400" dirty="0" err="1" smtClean="0">
+                <a:latin typeface="Courier New" pitchFamily="49" charset="0"/>
+                <a:cs typeface="Courier New" pitchFamily="49" charset="0"/>
+              </a:rPr>
+              <a:t>return</a:t>
+            </a:r>
+            <a:r>
+              <a:rPr lang="hr-HR" sz="1400" dirty="0" smtClean="0">
+                <a:latin typeface="Courier New" pitchFamily="49" charset="0"/>
+                <a:cs typeface="Courier New" pitchFamily="49" charset="0"/>
+              </a:rPr>
+              <a:t> </a:t>
+            </a:r>
+            <a:r>
+              <a:rPr lang="hr-HR" sz="1400" dirty="0" err="1" smtClean="0">
+                <a:latin typeface="Courier New" pitchFamily="49" charset="0"/>
+                <a:cs typeface="Courier New" pitchFamily="49" charset="0"/>
+              </a:rPr>
+              <a:t>pNode</a:t>
+            </a:r>
+            <a:r>
+              <a:rPr lang="hr-HR" sz="1400" dirty="0" smtClean="0">
+                <a:latin typeface="Courier New" pitchFamily="49" charset="0"/>
+                <a:cs typeface="Courier New" pitchFamily="49" charset="0"/>
+              </a:rPr>
+              <a:t>;</a:t>
+            </a:r>
+          </a:p>
+          <a:p>
+            <a:r>
+              <a:rPr lang="hr-HR" sz="1400" dirty="0" smtClean="0">
+                <a:latin typeface="Courier New" pitchFamily="49" charset="0"/>
+                <a:cs typeface="Courier New" pitchFamily="49" charset="0"/>
+              </a:rPr>
+              <a:t>}</a:t>
+            </a:r>
+          </a:p>
+          <a:p>
+            <a:endParaRPr lang="hr-HR" sz="1400" dirty="0" smtClean="0">
+              <a:latin typeface="Courier New" pitchFamily="49" charset="0"/>
+              <a:cs typeface="Courier New" pitchFamily="49" charset="0"/>
+            </a:endParaRPr>
+          </a:p>
+          <a:p>
+            <a:r>
+              <a:rPr lang="en-US" sz="1400" dirty="0" err="1" smtClean="0">
+                <a:latin typeface="Courier New" pitchFamily="49" charset="0"/>
+                <a:cs typeface="Courier New" pitchFamily="49" charset="0"/>
+              </a:rPr>
+              <a:t>osg</a:t>
+            </a:r>
+            <a:r>
+              <a:rPr lang="en-US" sz="1400" dirty="0" smtClean="0">
+                <a:latin typeface="Courier New" pitchFamily="49" charset="0"/>
+                <a:cs typeface="Courier New" pitchFamily="49" charset="0"/>
+              </a:rPr>
+              <a:t>::Group* </a:t>
+            </a:r>
+            <a:r>
+              <a:rPr lang="en-US" sz="1400" dirty="0" err="1" smtClean="0">
+                <a:latin typeface="Courier New" pitchFamily="49" charset="0"/>
+                <a:cs typeface="Courier New" pitchFamily="49" charset="0"/>
+              </a:rPr>
+              <a:t>pGroup</a:t>
+            </a:r>
+            <a:r>
+              <a:rPr lang="en-US" sz="1400" dirty="0" smtClean="0">
+                <a:latin typeface="Courier New" pitchFamily="49" charset="0"/>
+                <a:cs typeface="Courier New" pitchFamily="49" charset="0"/>
+              </a:rPr>
+              <a:t> = </a:t>
+            </a:r>
+            <a:r>
+              <a:rPr lang="en-US" sz="1400" dirty="0" err="1" smtClean="0">
+                <a:latin typeface="Courier New" pitchFamily="49" charset="0"/>
+                <a:cs typeface="Courier New" pitchFamily="49" charset="0"/>
+              </a:rPr>
+              <a:t>pNode</a:t>
+            </a:r>
+            <a:r>
+              <a:rPr lang="en-US" sz="1400" dirty="0" smtClean="0">
+                <a:latin typeface="Courier New" pitchFamily="49" charset="0"/>
+                <a:cs typeface="Courier New" pitchFamily="49" charset="0"/>
+              </a:rPr>
+              <a:t>-&gt;</a:t>
+            </a:r>
+            <a:r>
+              <a:rPr lang="en-US" sz="1400" dirty="0" err="1" smtClean="0">
+                <a:latin typeface="Courier New" pitchFamily="49" charset="0"/>
+                <a:cs typeface="Courier New" pitchFamily="49" charset="0"/>
+              </a:rPr>
+              <a:t>asGroup</a:t>
+            </a:r>
+            <a:r>
+              <a:rPr lang="en-US" sz="1400" dirty="0" smtClean="0">
+                <a:latin typeface="Courier New" pitchFamily="49" charset="0"/>
+                <a:cs typeface="Courier New" pitchFamily="49" charset="0"/>
+              </a:rPr>
+              <a:t>();</a:t>
+            </a:r>
+          </a:p>
+          <a:p>
+            <a:r>
+              <a:rPr lang="hr-HR" sz="1400" dirty="0" err="1" smtClean="0">
+                <a:latin typeface="Courier New" pitchFamily="49" charset="0"/>
+                <a:cs typeface="Courier New" pitchFamily="49" charset="0"/>
+              </a:rPr>
+              <a:t>if</a:t>
+            </a:r>
+            <a:r>
+              <a:rPr lang="hr-HR" sz="1400" dirty="0" smtClean="0">
+                <a:latin typeface="Courier New" pitchFamily="49" charset="0"/>
+                <a:cs typeface="Courier New" pitchFamily="49" charset="0"/>
+              </a:rPr>
+              <a:t> ( </a:t>
+            </a:r>
+            <a:r>
+              <a:rPr lang="hr-HR" sz="1400" dirty="0" err="1" smtClean="0">
+                <a:latin typeface="Courier New" pitchFamily="49" charset="0"/>
+                <a:cs typeface="Courier New" pitchFamily="49" charset="0"/>
+              </a:rPr>
+              <a:t>pGroup</a:t>
+            </a:r>
+            <a:r>
+              <a:rPr lang="hr-HR" sz="1400" dirty="0" smtClean="0">
+                <a:latin typeface="Courier New" pitchFamily="49" charset="0"/>
+                <a:cs typeface="Courier New" pitchFamily="49" charset="0"/>
+              </a:rPr>
+              <a:t> )</a:t>
+            </a:r>
+          </a:p>
+          <a:p>
+            <a:r>
+              <a:rPr lang="hr-HR" sz="1400" dirty="0" smtClean="0">
+                <a:latin typeface="Courier New" pitchFamily="49" charset="0"/>
+                <a:cs typeface="Courier New" pitchFamily="49" charset="0"/>
+              </a:rPr>
+              <a:t>{</a:t>
+            </a:r>
+          </a:p>
+          <a:p>
+            <a:r>
+              <a:rPr lang="hr-HR" sz="1400" dirty="0" smtClean="0">
+                <a:latin typeface="Courier New" pitchFamily="49" charset="0"/>
+                <a:cs typeface="Courier New" pitchFamily="49" charset="0"/>
+              </a:rPr>
+              <a:t>for ( </a:t>
+            </a:r>
+            <a:r>
+              <a:rPr lang="hr-HR" sz="1400" dirty="0" err="1" smtClean="0">
+                <a:latin typeface="Courier New" pitchFamily="49" charset="0"/>
+                <a:cs typeface="Courier New" pitchFamily="49" charset="0"/>
+              </a:rPr>
+              <a:t>unsigned</a:t>
+            </a:r>
+            <a:r>
+              <a:rPr lang="hr-HR" sz="1400" dirty="0" smtClean="0">
+                <a:latin typeface="Courier New" pitchFamily="49" charset="0"/>
+                <a:cs typeface="Courier New" pitchFamily="49" charset="0"/>
+              </a:rPr>
+              <a:t> int i=0; i&lt;</a:t>
+            </a:r>
+            <a:r>
+              <a:rPr lang="hr-HR" sz="1400" dirty="0" err="1" smtClean="0">
+                <a:latin typeface="Courier New" pitchFamily="49" charset="0"/>
+                <a:cs typeface="Courier New" pitchFamily="49" charset="0"/>
+              </a:rPr>
+              <a:t>pGroup</a:t>
+            </a:r>
+            <a:r>
+              <a:rPr lang="hr-HR" sz="1400" dirty="0" smtClean="0">
+                <a:latin typeface="Courier New" pitchFamily="49" charset="0"/>
+                <a:cs typeface="Courier New" pitchFamily="49" charset="0"/>
+              </a:rPr>
+              <a:t>-&gt;</a:t>
+            </a:r>
+            <a:r>
+              <a:rPr lang="hr-HR" sz="1400" dirty="0" err="1" smtClean="0">
+                <a:latin typeface="Courier New" pitchFamily="49" charset="0"/>
+                <a:cs typeface="Courier New" pitchFamily="49" charset="0"/>
+              </a:rPr>
+              <a:t>getNumChildren</a:t>
+            </a:r>
+            <a:r>
+              <a:rPr lang="hr-HR" sz="1400" dirty="0" smtClean="0">
+                <a:latin typeface="Courier New" pitchFamily="49" charset="0"/>
+                <a:cs typeface="Courier New" pitchFamily="49" charset="0"/>
+              </a:rPr>
+              <a:t>(); </a:t>
+            </a:r>
+            <a:r>
+              <a:rPr lang="hr-HR" sz="1400" dirty="0" err="1" smtClean="0">
+                <a:latin typeface="Courier New" pitchFamily="49" charset="0"/>
+                <a:cs typeface="Courier New" pitchFamily="49" charset="0"/>
+              </a:rPr>
+              <a:t>i</a:t>
+            </a:r>
+            <a:r>
+              <a:rPr lang="hr-HR" sz="1400" dirty="0" smtClean="0">
+                <a:latin typeface="Courier New" pitchFamily="49" charset="0"/>
+                <a:cs typeface="Courier New" pitchFamily="49" charset="0"/>
+              </a:rPr>
+              <a:t>++ )</a:t>
+            </a:r>
+          </a:p>
+          <a:p>
+            <a:r>
+              <a:rPr lang="hr-HR" sz="1400" dirty="0" smtClean="0">
+                <a:latin typeface="Courier New" pitchFamily="49" charset="0"/>
+                <a:cs typeface="Courier New" pitchFamily="49" charset="0"/>
+              </a:rPr>
+              <a:t>{</a:t>
+            </a:r>
+          </a:p>
+          <a:p>
+            <a:r>
+              <a:rPr lang="hr-HR" sz="1400" dirty="0" err="1" smtClean="0">
+                <a:latin typeface="Courier New" pitchFamily="49" charset="0"/>
+                <a:cs typeface="Courier New" pitchFamily="49" charset="0"/>
+              </a:rPr>
+              <a:t>osg</a:t>
+            </a:r>
+            <a:r>
+              <a:rPr lang="hr-HR" sz="1400" dirty="0" smtClean="0">
+                <a:latin typeface="Courier New" pitchFamily="49" charset="0"/>
+                <a:cs typeface="Courier New" pitchFamily="49" charset="0"/>
+              </a:rPr>
+              <a:t>::</a:t>
+            </a:r>
+            <a:r>
+              <a:rPr lang="hr-HR" sz="1400" dirty="0" err="1" smtClean="0">
+                <a:latin typeface="Courier New" pitchFamily="49" charset="0"/>
+                <a:cs typeface="Courier New" pitchFamily="49" charset="0"/>
+              </a:rPr>
+              <a:t>Node</a:t>
+            </a:r>
+            <a:r>
+              <a:rPr lang="hr-HR" sz="1400" dirty="0" smtClean="0">
+                <a:latin typeface="Courier New" pitchFamily="49" charset="0"/>
+                <a:cs typeface="Courier New" pitchFamily="49" charset="0"/>
+              </a:rPr>
+              <a:t>* </a:t>
+            </a:r>
+            <a:r>
+              <a:rPr lang="hr-HR" sz="1400" dirty="0" err="1" smtClean="0">
+                <a:latin typeface="Courier New" pitchFamily="49" charset="0"/>
+                <a:cs typeface="Courier New" pitchFamily="49" charset="0"/>
+              </a:rPr>
+              <a:t>pFound</a:t>
+            </a:r>
+            <a:r>
+              <a:rPr lang="hr-HR" sz="1400" dirty="0" smtClean="0">
+                <a:latin typeface="Courier New" pitchFamily="49" charset="0"/>
+                <a:cs typeface="Courier New" pitchFamily="49" charset="0"/>
+              </a:rPr>
+              <a:t> = </a:t>
+            </a:r>
+            <a:r>
+              <a:rPr lang="hr-HR" sz="1400" dirty="0" err="1" smtClean="0">
+                <a:latin typeface="Courier New" pitchFamily="49" charset="0"/>
+                <a:cs typeface="Courier New" pitchFamily="49" charset="0"/>
+              </a:rPr>
+              <a:t>FindNodeByName</a:t>
+            </a:r>
+            <a:r>
+              <a:rPr lang="hr-HR" sz="1400" dirty="0" smtClean="0">
+                <a:latin typeface="Courier New" pitchFamily="49" charset="0"/>
+                <a:cs typeface="Courier New" pitchFamily="49" charset="0"/>
+              </a:rPr>
+              <a:t>( </a:t>
+            </a:r>
+            <a:r>
+              <a:rPr lang="hr-HR" sz="1400" dirty="0" err="1" smtClean="0">
+                <a:latin typeface="Courier New" pitchFamily="49" charset="0"/>
+                <a:cs typeface="Courier New" pitchFamily="49" charset="0"/>
+              </a:rPr>
+              <a:t>pGroup</a:t>
+            </a:r>
+            <a:r>
+              <a:rPr lang="hr-HR" sz="1400" dirty="0" smtClean="0">
+                <a:latin typeface="Courier New" pitchFamily="49" charset="0"/>
+                <a:cs typeface="Courier New" pitchFamily="49" charset="0"/>
+              </a:rPr>
+              <a:t>-&gt;</a:t>
+            </a:r>
+            <a:r>
+              <a:rPr lang="hr-HR" sz="1400" dirty="0" err="1" smtClean="0">
+                <a:latin typeface="Courier New" pitchFamily="49" charset="0"/>
+                <a:cs typeface="Courier New" pitchFamily="49" charset="0"/>
+              </a:rPr>
+              <a:t>getChild</a:t>
+            </a:r>
+            <a:r>
+              <a:rPr lang="hr-HR" sz="1400" dirty="0" smtClean="0">
+                <a:latin typeface="Courier New" pitchFamily="49" charset="0"/>
+                <a:cs typeface="Courier New" pitchFamily="49" charset="0"/>
+              </a:rPr>
+              <a:t>(i), </a:t>
+            </a:r>
+            <a:r>
+              <a:rPr lang="hr-HR" sz="1400" dirty="0" err="1" smtClean="0">
+                <a:latin typeface="Courier New" pitchFamily="49" charset="0"/>
+                <a:cs typeface="Courier New" pitchFamily="49" charset="0"/>
+              </a:rPr>
+              <a:t>sName</a:t>
+            </a:r>
+            <a:r>
+              <a:rPr lang="hr-HR" sz="1400" dirty="0" smtClean="0">
+                <a:latin typeface="Courier New" pitchFamily="49" charset="0"/>
+                <a:cs typeface="Courier New" pitchFamily="49" charset="0"/>
+              </a:rPr>
+              <a:t> );</a:t>
+            </a:r>
+          </a:p>
+          <a:p>
+            <a:r>
+              <a:rPr lang="hr-HR" sz="1400" dirty="0" err="1" smtClean="0">
+                <a:latin typeface="Courier New" pitchFamily="49" charset="0"/>
+                <a:cs typeface="Courier New" pitchFamily="49" charset="0"/>
+              </a:rPr>
+              <a:t>if</a:t>
+            </a:r>
+            <a:r>
+              <a:rPr lang="hr-HR" sz="1400" dirty="0" smtClean="0">
+                <a:latin typeface="Courier New" pitchFamily="49" charset="0"/>
+                <a:cs typeface="Courier New" pitchFamily="49" charset="0"/>
+              </a:rPr>
+              <a:t> ( </a:t>
+            </a:r>
+            <a:r>
+              <a:rPr lang="hr-HR" sz="1400" dirty="0" err="1" smtClean="0">
+                <a:latin typeface="Courier New" pitchFamily="49" charset="0"/>
+                <a:cs typeface="Courier New" pitchFamily="49" charset="0"/>
+              </a:rPr>
+              <a:t>pFound</a:t>
+            </a:r>
+            <a:r>
+              <a:rPr lang="hr-HR" sz="1400" dirty="0" smtClean="0">
+                <a:latin typeface="Courier New" pitchFamily="49" charset="0"/>
+                <a:cs typeface="Courier New" pitchFamily="49" charset="0"/>
+              </a:rPr>
+              <a:t> )</a:t>
+            </a:r>
+          </a:p>
+          <a:p>
+            <a:r>
+              <a:rPr lang="hr-HR" sz="1400" dirty="0" smtClean="0">
+                <a:latin typeface="Courier New" pitchFamily="49" charset="0"/>
+                <a:cs typeface="Courier New" pitchFamily="49" charset="0"/>
+              </a:rPr>
+              <a:t>{</a:t>
+            </a:r>
+          </a:p>
+          <a:p>
+            <a:r>
+              <a:rPr lang="hr-HR" sz="1400" dirty="0" err="1" smtClean="0">
+                <a:latin typeface="Courier New" pitchFamily="49" charset="0"/>
+                <a:cs typeface="Courier New" pitchFamily="49" charset="0"/>
+              </a:rPr>
+              <a:t>return</a:t>
+            </a:r>
+            <a:r>
+              <a:rPr lang="hr-HR" sz="1400" dirty="0" smtClean="0">
+                <a:latin typeface="Courier New" pitchFamily="49" charset="0"/>
+                <a:cs typeface="Courier New" pitchFamily="49" charset="0"/>
+              </a:rPr>
+              <a:t> </a:t>
+            </a:r>
+            <a:r>
+              <a:rPr lang="hr-HR" sz="1400" dirty="0" err="1" smtClean="0">
+                <a:latin typeface="Courier New" pitchFamily="49" charset="0"/>
+                <a:cs typeface="Courier New" pitchFamily="49" charset="0"/>
+              </a:rPr>
+              <a:t>pFound</a:t>
+            </a:r>
+            <a:r>
+              <a:rPr lang="hr-HR" sz="1400" dirty="0" smtClean="0">
+                <a:latin typeface="Courier New" pitchFamily="49" charset="0"/>
+                <a:cs typeface="Courier New" pitchFamily="49" charset="0"/>
+              </a:rPr>
+              <a:t>;</a:t>
+            </a:r>
+          </a:p>
+          <a:p>
+            <a:r>
+              <a:rPr lang="hr-HR" sz="1400" dirty="0" smtClean="0">
+                <a:latin typeface="Courier New" pitchFamily="49" charset="0"/>
+                <a:cs typeface="Courier New" pitchFamily="49" charset="0"/>
+              </a:rPr>
+              <a:t>}</a:t>
+            </a:r>
+          </a:p>
+          <a:p>
+            <a:r>
+              <a:rPr lang="hr-HR" sz="1400" dirty="0" smtClean="0">
+                <a:latin typeface="Courier New" pitchFamily="49" charset="0"/>
+                <a:cs typeface="Courier New" pitchFamily="49" charset="0"/>
+              </a:rPr>
+              <a:t>}</a:t>
+            </a:r>
+          </a:p>
+          <a:p>
+            <a:r>
+              <a:rPr lang="hr-HR" sz="1400" dirty="0" smtClean="0">
+                <a:latin typeface="Courier New" pitchFamily="49" charset="0"/>
+                <a:cs typeface="Courier New" pitchFamily="49" charset="0"/>
+              </a:rPr>
+              <a:t>}</a:t>
+            </a:r>
+          </a:p>
+          <a:p>
+            <a:endParaRPr lang="hr-HR" sz="1400" dirty="0" smtClean="0">
+              <a:latin typeface="Courier New" pitchFamily="49" charset="0"/>
+              <a:cs typeface="Courier New" pitchFamily="49" charset="0"/>
+            </a:endParaRPr>
+          </a:p>
+          <a:p>
+            <a:r>
+              <a:rPr lang="hr-HR" sz="1400" dirty="0" err="1" smtClean="0">
+                <a:latin typeface="Courier New" pitchFamily="49" charset="0"/>
+                <a:cs typeface="Courier New" pitchFamily="49" charset="0"/>
+              </a:rPr>
+              <a:t>return</a:t>
+            </a:r>
+            <a:r>
+              <a:rPr lang="hr-HR" sz="1400" dirty="0" smtClean="0">
+                <a:latin typeface="Courier New" pitchFamily="49" charset="0"/>
+                <a:cs typeface="Courier New" pitchFamily="49" charset="0"/>
+              </a:rPr>
+              <a:t> 0;</a:t>
+            </a:r>
+          </a:p>
+          <a:p>
+            <a:r>
+              <a:rPr lang="hr-HR" sz="1400" dirty="0" smtClean="0">
+                <a:latin typeface="Courier New" pitchFamily="49" charset="0"/>
+                <a:cs typeface="Courier New" pitchFamily="49" charset="0"/>
+              </a:rPr>
+              <a:t>}</a:t>
+            </a:r>
+            <a:endParaRPr lang="hr-HR" dirty="0"/>
+          </a:p>
+        </p:txBody>
+      </p:sp>
+      <p:sp>
+        <p:nvSpPr>
+          <p:cNvPr id="20" name="Oval 19"/>
+          <p:cNvSpPr/>
+          <p:nvPr/>
+        </p:nvSpPr>
+        <p:spPr>
+          <a:xfrm>
+            <a:off x="683568" y="5877272"/>
+            <a:ext cx="1944216" cy="288032"/>
+          </a:xfrm>
+          <a:prstGeom prst="ellipse">
+            <a:avLst/>
+          </a:prstGeom>
+          <a:solidFill>
+            <a:schemeClr val="accent1">
+              <a:lumMod val="75000"/>
+              <a:alpha val="49000"/>
+            </a:schemeClr>
+          </a:solidFill>
+        </p:spPr>
+        <p:style>
+          <a:lnRef idx="2">
+            <a:schemeClr val="accent1">
+              <a:shade val="50000"/>
+            </a:schemeClr>
+          </a:lnRef>
+          <a:fillRef idx="1">
+            <a:schemeClr val="accent1"/>
+          </a:fillRef>
+          <a:effectRef idx="0">
+            <a:schemeClr val="accent1"/>
+          </a:effectRef>
+          <a:fontRef idx="minor">
+            <a:schemeClr val="lt1"/>
+          </a:fontRef>
+        </p:style>
+        <p:txBody>
+          <a:bodyPr rtlCol="0" anchor="ctr"/>
+          <a:lstStyle/>
+          <a:p>
+            <a:pPr algn="ctr"/>
+            <a:endParaRPr lang="hr-HR"/>
+          </a:p>
+        </p:txBody>
+      </p:sp>
+    </p:spTree>
+  </p:cSld>
+  <p:clrMapOvr>
+    <a:masterClrMapping/>
+  </p:clrMapOvr>
+  <p:timing>
+    <p:tnLst>
+      <p:par>
+        <p:cTn id="1" dur="indefinite" restart="never" nodeType="tmRoot">
+          <p:childTnLst>
+            <p:seq concurrent="1" nextAc="seek">
+              <p:cTn id="2" dur="indefinite" nodeType="mainSeq">
+                <p:childTnLst>
+                  <p:par>
+                    <p:cTn id="3" fill="hold">
+                      <p:stCondLst>
+                        <p:cond delay="indefinite"/>
+                      </p:stCondLst>
+                      <p:childTnLst>
+                        <p:par>
+                          <p:cTn id="4" fill="hold">
+                            <p:stCondLst>
+                              <p:cond delay="0"/>
+                            </p:stCondLst>
+                            <p:childTnLst>
+                              <p:par>
+                                <p:cTn id="5" presetID="2" presetClass="entr" presetSubtype="4" fill="hold" grpId="0" nodeType="clickEffect">
+                                  <p:stCondLst>
+                                    <p:cond delay="0"/>
+                                  </p:stCondLst>
+                                  <p:childTnLst>
+                                    <p:set>
+                                      <p:cBhvr>
+                                        <p:cTn id="6" dur="1" fill="hold">
+                                          <p:stCondLst>
+                                            <p:cond delay="0"/>
+                                          </p:stCondLst>
+                                        </p:cTn>
+                                        <p:tgtEl>
+                                          <p:spTgt spid="5"/>
+                                        </p:tgtEl>
+                                        <p:attrNameLst>
+                                          <p:attrName>style.visibility</p:attrName>
+                                        </p:attrNameLst>
+                                      </p:cBhvr>
+                                      <p:to>
+                                        <p:strVal val="visible"/>
+                                      </p:to>
+                                    </p:set>
+                                    <p:anim calcmode="lin" valueType="num">
+                                      <p:cBhvr additive="base">
+                                        <p:cTn id="7" dur="500" fill="hold"/>
+                                        <p:tgtEl>
+                                          <p:spTgt spid="5"/>
+                                        </p:tgtEl>
+                                        <p:attrNameLst>
+                                          <p:attrName>ppt_x</p:attrName>
+                                        </p:attrNameLst>
+                                      </p:cBhvr>
+                                      <p:tavLst>
+                                        <p:tav tm="0">
+                                          <p:val>
+                                            <p:strVal val="#ppt_x"/>
+                                          </p:val>
+                                        </p:tav>
+                                        <p:tav tm="100000">
+                                          <p:val>
+                                            <p:strVal val="#ppt_x"/>
+                                          </p:val>
+                                        </p:tav>
+                                      </p:tavLst>
+                                    </p:anim>
+                                    <p:anim calcmode="lin" valueType="num">
+                                      <p:cBhvr additive="base">
+                                        <p:cTn id="8" dur="500" fill="hold"/>
+                                        <p:tgtEl>
+                                          <p:spTgt spid="5"/>
+                                        </p:tgtEl>
+                                        <p:attrNameLst>
+                                          <p:attrName>ppt_y</p:attrName>
+                                        </p:attrNameLst>
+                                      </p:cBhvr>
+                                      <p:tavLst>
+                                        <p:tav tm="0">
+                                          <p:val>
+                                            <p:strVal val="1+#ppt_h/2"/>
+                                          </p:val>
+                                        </p:tav>
+                                        <p:tav tm="100000">
+                                          <p:val>
+                                            <p:strVal val="#ppt_y"/>
+                                          </p:val>
+                                        </p:tav>
+                                      </p:tavLst>
+                                    </p:anim>
+                                  </p:childTnLst>
+                                </p:cTn>
+                              </p:par>
+                              <p:par>
+                                <p:cTn id="9" presetID="2" presetClass="entr" presetSubtype="4" fill="hold" grpId="0" nodeType="withEffect">
+                                  <p:stCondLst>
+                                    <p:cond delay="0"/>
+                                  </p:stCondLst>
+                                  <p:childTnLst>
+                                    <p:set>
+                                      <p:cBhvr>
+                                        <p:cTn id="10" dur="1" fill="hold">
+                                          <p:stCondLst>
+                                            <p:cond delay="0"/>
+                                          </p:stCondLst>
+                                        </p:cTn>
+                                        <p:tgtEl>
+                                          <p:spTgt spid="6"/>
+                                        </p:tgtEl>
+                                        <p:attrNameLst>
+                                          <p:attrName>style.visibility</p:attrName>
+                                        </p:attrNameLst>
+                                      </p:cBhvr>
+                                      <p:to>
+                                        <p:strVal val="visible"/>
+                                      </p:to>
+                                    </p:set>
+                                    <p:anim calcmode="lin" valueType="num">
+                                      <p:cBhvr additive="base">
+                                        <p:cTn id="11" dur="500" fill="hold"/>
+                                        <p:tgtEl>
+                                          <p:spTgt spid="6"/>
+                                        </p:tgtEl>
+                                        <p:attrNameLst>
+                                          <p:attrName>ppt_x</p:attrName>
+                                        </p:attrNameLst>
+                                      </p:cBhvr>
+                                      <p:tavLst>
+                                        <p:tav tm="0">
+                                          <p:val>
+                                            <p:strVal val="#ppt_x"/>
+                                          </p:val>
+                                        </p:tav>
+                                        <p:tav tm="100000">
+                                          <p:val>
+                                            <p:strVal val="#ppt_x"/>
+                                          </p:val>
+                                        </p:tav>
+                                      </p:tavLst>
+                                    </p:anim>
+                                    <p:anim calcmode="lin" valueType="num">
+                                      <p:cBhvr additive="base">
+                                        <p:cTn id="12" dur="500" fill="hold"/>
+                                        <p:tgtEl>
+                                          <p:spTgt spid="6"/>
+                                        </p:tgtEl>
+                                        <p:attrNameLst>
+                                          <p:attrName>ppt_y</p:attrName>
+                                        </p:attrNameLst>
+                                      </p:cBhvr>
+                                      <p:tavLst>
+                                        <p:tav tm="0">
+                                          <p:val>
+                                            <p:strVal val="1+#ppt_h/2"/>
+                                          </p:val>
+                                        </p:tav>
+                                        <p:tav tm="100000">
+                                          <p:val>
+                                            <p:strVal val="#ppt_y"/>
+                                          </p:val>
+                                        </p:tav>
+                                      </p:tavLst>
+                                    </p:anim>
+                                  </p:childTnLst>
+                                </p:cTn>
+                              </p:par>
+                            </p:childTnLst>
+                          </p:cTn>
+                        </p:par>
+                      </p:childTnLst>
+                    </p:cTn>
+                  </p:par>
+                  <p:par>
+                    <p:cTn id="13" fill="hold">
+                      <p:stCondLst>
+                        <p:cond delay="indefinite"/>
+                      </p:stCondLst>
+                      <p:childTnLst>
+                        <p:par>
+                          <p:cTn id="14" fill="hold">
+                            <p:stCondLst>
+                              <p:cond delay="0"/>
+                            </p:stCondLst>
+                            <p:childTnLst>
+                              <p:par>
+                                <p:cTn id="15" presetID="1" presetClass="entr" presetSubtype="0" fill="hold" grpId="0" nodeType="clickEffect">
+                                  <p:stCondLst>
+                                    <p:cond delay="0"/>
+                                  </p:stCondLst>
+                                  <p:childTnLst>
+                                    <p:set>
+                                      <p:cBhvr>
+                                        <p:cTn id="16" dur="1" fill="hold">
+                                          <p:stCondLst>
+                                            <p:cond delay="0"/>
+                                          </p:stCondLst>
+                                        </p:cTn>
+                                        <p:tgtEl>
+                                          <p:spTgt spid="13"/>
+                                        </p:tgtEl>
+                                        <p:attrNameLst>
+                                          <p:attrName>style.visibility</p:attrName>
+                                        </p:attrNameLst>
+                                      </p:cBhvr>
+                                      <p:to>
+                                        <p:strVal val="visible"/>
+                                      </p:to>
+                                    </p:set>
+                                  </p:childTnLst>
+                                </p:cTn>
+                              </p:par>
+                              <p:par>
+                                <p:cTn id="17" presetID="1" presetClass="entr" presetSubtype="0" fill="hold" nodeType="withEffect">
+                                  <p:stCondLst>
+                                    <p:cond delay="0"/>
+                                  </p:stCondLst>
+                                  <p:childTnLst>
+                                    <p:set>
+                                      <p:cBhvr>
+                                        <p:cTn id="18" dur="1" fill="hold">
+                                          <p:stCondLst>
+                                            <p:cond delay="0"/>
+                                          </p:stCondLst>
+                                        </p:cTn>
+                                        <p:tgtEl>
+                                          <p:spTgt spid="11"/>
+                                        </p:tgtEl>
+                                        <p:attrNameLst>
+                                          <p:attrName>style.visibility</p:attrName>
+                                        </p:attrNameLst>
+                                      </p:cBhvr>
+                                      <p:to>
+                                        <p:strVal val="visible"/>
+                                      </p:to>
+                                    </p:set>
+                                  </p:childTnLst>
+                                </p:cTn>
+                              </p:par>
+                            </p:childTnLst>
+                          </p:cTn>
+                        </p:par>
+                      </p:childTnLst>
+                    </p:cTn>
+                  </p:par>
+                  <p:par>
+                    <p:cTn id="19" fill="hold">
+                      <p:stCondLst>
+                        <p:cond delay="indefinite"/>
+                      </p:stCondLst>
+                      <p:childTnLst>
+                        <p:par>
+                          <p:cTn id="20" fill="hold">
+                            <p:stCondLst>
+                              <p:cond delay="0"/>
+                            </p:stCondLst>
+                            <p:childTnLst>
+                              <p:par>
+                                <p:cTn id="21" presetID="2" presetClass="entr" presetSubtype="4" fill="hold" grpId="0" nodeType="clickEffect">
+                                  <p:stCondLst>
+                                    <p:cond delay="0"/>
+                                  </p:stCondLst>
+                                  <p:childTnLst>
+                                    <p:set>
+                                      <p:cBhvr>
+                                        <p:cTn id="22" dur="1" fill="hold">
+                                          <p:stCondLst>
+                                            <p:cond delay="0"/>
+                                          </p:stCondLst>
+                                        </p:cTn>
+                                        <p:tgtEl>
+                                          <p:spTgt spid="14"/>
+                                        </p:tgtEl>
+                                        <p:attrNameLst>
+                                          <p:attrName>style.visibility</p:attrName>
+                                        </p:attrNameLst>
+                                      </p:cBhvr>
+                                      <p:to>
+                                        <p:strVal val="visible"/>
+                                      </p:to>
+                                    </p:set>
+                                    <p:anim calcmode="lin" valueType="num">
+                                      <p:cBhvr additive="base">
+                                        <p:cTn id="23" dur="500" fill="hold"/>
+                                        <p:tgtEl>
+                                          <p:spTgt spid="14"/>
+                                        </p:tgtEl>
+                                        <p:attrNameLst>
+                                          <p:attrName>ppt_x</p:attrName>
+                                        </p:attrNameLst>
+                                      </p:cBhvr>
+                                      <p:tavLst>
+                                        <p:tav tm="0">
+                                          <p:val>
+                                            <p:strVal val="#ppt_x"/>
+                                          </p:val>
+                                        </p:tav>
+                                        <p:tav tm="100000">
+                                          <p:val>
+                                            <p:strVal val="#ppt_x"/>
+                                          </p:val>
+                                        </p:tav>
+                                      </p:tavLst>
+                                    </p:anim>
+                                    <p:anim calcmode="lin" valueType="num">
+                                      <p:cBhvr additive="base">
+                                        <p:cTn id="24" dur="500" fill="hold"/>
+                                        <p:tgtEl>
+                                          <p:spTgt spid="14"/>
+                                        </p:tgtEl>
+                                        <p:attrNameLst>
+                                          <p:attrName>ppt_y</p:attrName>
+                                        </p:attrNameLst>
+                                      </p:cBhvr>
+                                      <p:tavLst>
+                                        <p:tav tm="0">
+                                          <p:val>
+                                            <p:strVal val="1+#ppt_h/2"/>
+                                          </p:val>
+                                        </p:tav>
+                                        <p:tav tm="100000">
+                                          <p:val>
+                                            <p:strVal val="#ppt_y"/>
+                                          </p:val>
+                                        </p:tav>
+                                      </p:tavLst>
+                                    </p:anim>
+                                  </p:childTnLst>
+                                </p:cTn>
+                              </p:par>
+                            </p:childTnLst>
+                          </p:cTn>
+                        </p:par>
+                      </p:childTnLst>
+                    </p:cTn>
+                  </p:par>
+                  <p:par>
+                    <p:cTn id="25" fill="hold">
+                      <p:stCondLst>
+                        <p:cond delay="indefinite"/>
+                      </p:stCondLst>
+                      <p:childTnLst>
+                        <p:par>
+                          <p:cTn id="26" fill="hold">
+                            <p:stCondLst>
+                              <p:cond delay="0"/>
+                            </p:stCondLst>
+                            <p:childTnLst>
+                              <p:par>
+                                <p:cTn id="27" presetID="1" presetClass="entr" presetSubtype="0" fill="hold" grpId="0" nodeType="clickEffect">
+                                  <p:stCondLst>
+                                    <p:cond delay="0"/>
+                                  </p:stCondLst>
+                                  <p:childTnLst>
+                                    <p:set>
+                                      <p:cBhvr>
+                                        <p:cTn id="28" dur="1" fill="hold">
+                                          <p:stCondLst>
+                                            <p:cond delay="0"/>
+                                          </p:stCondLst>
+                                        </p:cTn>
+                                        <p:tgtEl>
+                                          <p:spTgt spid="20"/>
+                                        </p:tgtEl>
+                                        <p:attrNameLst>
+                                          <p:attrName>style.visibility</p:attrName>
+                                        </p:attrNameLst>
+                                      </p:cBhvr>
+                                      <p:to>
+                                        <p:strVal val="visible"/>
+                                      </p:to>
+                                    </p:set>
+                                  </p:childTnLst>
+                                </p:cTn>
+                              </p:par>
+                            </p:childTnLst>
+                          </p:cTn>
+                        </p:par>
+                      </p:childTnLst>
+                    </p:cTn>
+                  </p:par>
+                  <p:par>
+                    <p:cTn id="29" fill="hold">
+                      <p:stCondLst>
+                        <p:cond delay="indefinite"/>
+                      </p:stCondLst>
+                      <p:childTnLst>
+                        <p:par>
+                          <p:cTn id="30" fill="hold">
+                            <p:stCondLst>
+                              <p:cond delay="0"/>
+                            </p:stCondLst>
+                            <p:childTnLst>
+                              <p:par>
+                                <p:cTn id="31" presetID="18" presetClass="entr" presetSubtype="6" fill="hold" grpId="0" nodeType="clickEffect">
+                                  <p:stCondLst>
+                                    <p:cond delay="0"/>
+                                  </p:stCondLst>
+                                  <p:childTnLst>
+                                    <p:set>
+                                      <p:cBhvr>
+                                        <p:cTn id="32" dur="1" fill="hold">
+                                          <p:stCondLst>
+                                            <p:cond delay="0"/>
+                                          </p:stCondLst>
+                                        </p:cTn>
+                                        <p:tgtEl>
+                                          <p:spTgt spid="17"/>
+                                        </p:tgtEl>
+                                        <p:attrNameLst>
+                                          <p:attrName>style.visibility</p:attrName>
+                                        </p:attrNameLst>
+                                      </p:cBhvr>
+                                      <p:to>
+                                        <p:strVal val="visible"/>
+                                      </p:to>
+                                    </p:set>
+                                    <p:animEffect transition="in" filter="strips(downRight)">
+                                      <p:cBhvr>
+                                        <p:cTn id="33" dur="500"/>
+                                        <p:tgtEl>
+                                          <p:spTgt spid="17"/>
+                                        </p:tgtEl>
+                                      </p:cBhvr>
+                                    </p:animEffect>
+                                  </p:childTnLst>
+                                </p:cTn>
+                              </p:par>
+                            </p:childTnLst>
+                          </p:cTn>
+                        </p:par>
+                      </p:childTnLst>
+                    </p:cTn>
+                  </p:par>
+                  <p:par>
+                    <p:cTn id="34" fill="hold">
+                      <p:stCondLst>
+                        <p:cond delay="indefinite"/>
+                      </p:stCondLst>
+                      <p:childTnLst>
+                        <p:par>
+                          <p:cTn id="35" fill="hold">
+                            <p:stCondLst>
+                              <p:cond delay="0"/>
+                            </p:stCondLst>
+                            <p:childTnLst>
+                              <p:par>
+                                <p:cTn id="36" presetID="2" presetClass="entr" presetSubtype="4" fill="hold" grpId="0" nodeType="clickEffect">
+                                  <p:stCondLst>
+                                    <p:cond delay="0"/>
+                                  </p:stCondLst>
+                                  <p:childTnLst>
+                                    <p:set>
+                                      <p:cBhvr>
+                                        <p:cTn id="37" dur="1" fill="hold">
+                                          <p:stCondLst>
+                                            <p:cond delay="0"/>
+                                          </p:stCondLst>
+                                        </p:cTn>
+                                        <p:tgtEl>
+                                          <p:spTgt spid="15"/>
+                                        </p:tgtEl>
+                                        <p:attrNameLst>
+                                          <p:attrName>style.visibility</p:attrName>
+                                        </p:attrNameLst>
+                                      </p:cBhvr>
+                                      <p:to>
+                                        <p:strVal val="visible"/>
+                                      </p:to>
+                                    </p:set>
+                                    <p:anim calcmode="lin" valueType="num">
+                                      <p:cBhvr additive="base">
+                                        <p:cTn id="38" dur="500" fill="hold"/>
+                                        <p:tgtEl>
+                                          <p:spTgt spid="15"/>
+                                        </p:tgtEl>
+                                        <p:attrNameLst>
+                                          <p:attrName>ppt_x</p:attrName>
+                                        </p:attrNameLst>
+                                      </p:cBhvr>
+                                      <p:tavLst>
+                                        <p:tav tm="0">
+                                          <p:val>
+                                            <p:strVal val="#ppt_x"/>
+                                          </p:val>
+                                        </p:tav>
+                                        <p:tav tm="100000">
+                                          <p:val>
+                                            <p:strVal val="#ppt_x"/>
+                                          </p:val>
+                                        </p:tav>
+                                      </p:tavLst>
+                                    </p:anim>
+                                    <p:anim calcmode="lin" valueType="num">
+                                      <p:cBhvr additive="base">
+                                        <p:cTn id="39" dur="500" fill="hold"/>
+                                        <p:tgtEl>
+                                          <p:spTgt spid="15"/>
+                                        </p:tgtEl>
+                                        <p:attrNameLst>
+                                          <p:attrName>ppt_y</p:attrName>
+                                        </p:attrNameLst>
+                                      </p:cBhvr>
+                                      <p:tavLst>
+                                        <p:tav tm="0">
+                                          <p:val>
+                                            <p:strVal val="1+#ppt_h/2"/>
+                                          </p:val>
+                                        </p:tav>
+                                        <p:tav tm="100000">
+                                          <p:val>
+                                            <p:strVal val="#ppt_y"/>
+                                          </p:val>
+                                        </p:tav>
+                                      </p:tavLst>
+                                    </p:anim>
+                                  </p:childTnLst>
+                                </p:cTn>
+                              </p:par>
+                            </p:childTnLst>
+                          </p:cTn>
+                        </p:par>
+                      </p:childTnLst>
+                    </p:cTn>
+                  </p:par>
+                  <p:par>
+                    <p:cTn id="40" fill="hold">
+                      <p:stCondLst>
+                        <p:cond delay="indefinite"/>
+                      </p:stCondLst>
+                      <p:childTnLst>
+                        <p:par>
+                          <p:cTn id="41" fill="hold">
+                            <p:stCondLst>
+                              <p:cond delay="0"/>
+                            </p:stCondLst>
+                            <p:childTnLst>
+                              <p:par>
+                                <p:cTn id="42" presetID="1" presetClass="entr" presetSubtype="0" fill="hold" grpId="0" nodeType="clickEffect">
+                                  <p:stCondLst>
+                                    <p:cond delay="0"/>
+                                  </p:stCondLst>
+                                  <p:childTnLst>
+                                    <p:set>
+                                      <p:cBhvr>
+                                        <p:cTn id="43" dur="1" fill="hold">
+                                          <p:stCondLst>
+                                            <p:cond delay="0"/>
+                                          </p:stCondLst>
+                                        </p:cTn>
+                                        <p:tgtEl>
+                                          <p:spTgt spid="19"/>
+                                        </p:tgtEl>
+                                        <p:attrNameLst>
+                                          <p:attrName>style.visibility</p:attrName>
+                                        </p:attrNameLst>
+                                      </p:cBhvr>
+                                      <p:to>
+                                        <p:strVal val="visible"/>
+                                      </p:to>
+                                    </p:set>
+                                  </p:childTnLst>
+                                </p:cTn>
+                              </p:par>
+                            </p:childTnLst>
+                          </p:cTn>
+                        </p:par>
+                      </p:childTnLst>
+                    </p:cTn>
+                  </p:par>
+                  <p:par>
+                    <p:cTn id="44" fill="hold">
+                      <p:stCondLst>
+                        <p:cond delay="indefinite"/>
+                      </p:stCondLst>
+                      <p:childTnLst>
+                        <p:par>
+                          <p:cTn id="45" fill="hold">
+                            <p:stCondLst>
+                              <p:cond delay="0"/>
+                            </p:stCondLst>
+                            <p:childTnLst>
+                              <p:par>
+                                <p:cTn id="46" presetID="2" presetClass="entr" presetSubtype="4" fill="hold" grpId="0" nodeType="clickEffect">
+                                  <p:stCondLst>
+                                    <p:cond delay="0"/>
+                                  </p:stCondLst>
+                                  <p:childTnLst>
+                                    <p:set>
+                                      <p:cBhvr>
+                                        <p:cTn id="47" dur="1" fill="hold">
+                                          <p:stCondLst>
+                                            <p:cond delay="0"/>
+                                          </p:stCondLst>
+                                        </p:cTn>
+                                        <p:tgtEl>
+                                          <p:spTgt spid="18"/>
+                                        </p:tgtEl>
+                                        <p:attrNameLst>
+                                          <p:attrName>style.visibility</p:attrName>
+                                        </p:attrNameLst>
+                                      </p:cBhvr>
+                                      <p:to>
+                                        <p:strVal val="visible"/>
+                                      </p:to>
+                                    </p:set>
+                                    <p:anim calcmode="lin" valueType="num">
+                                      <p:cBhvr additive="base">
+                                        <p:cTn id="48" dur="500" fill="hold"/>
+                                        <p:tgtEl>
+                                          <p:spTgt spid="18"/>
+                                        </p:tgtEl>
+                                        <p:attrNameLst>
+                                          <p:attrName>ppt_x</p:attrName>
+                                        </p:attrNameLst>
+                                      </p:cBhvr>
+                                      <p:tavLst>
+                                        <p:tav tm="0">
+                                          <p:val>
+                                            <p:strVal val="#ppt_x"/>
+                                          </p:val>
+                                        </p:tav>
+                                        <p:tav tm="100000">
+                                          <p:val>
+                                            <p:strVal val="#ppt_x"/>
+                                          </p:val>
+                                        </p:tav>
+                                      </p:tavLst>
+                                    </p:anim>
+                                    <p:anim calcmode="lin" valueType="num">
+                                      <p:cBhvr additive="base">
+                                        <p:cTn id="49" dur="500" fill="hold"/>
+                                        <p:tgtEl>
+                                          <p:spTgt spid="18"/>
+                                        </p:tgtEl>
+                                        <p:attrNameLst>
+                                          <p:attrName>ppt_y</p:attrName>
+                                        </p:attrNameLst>
+                                      </p:cBhvr>
+                                      <p:tavLst>
+                                        <p:tav tm="0">
+                                          <p:val>
+                                            <p:strVal val="1+#ppt_h/2"/>
+                                          </p:val>
+                                        </p:tav>
+                                        <p:tav tm="100000">
+                                          <p:val>
+                                            <p:strVal val="#ppt_y"/>
+                                          </p:val>
+                                        </p:tav>
+                                      </p:tavLst>
+                                    </p:anim>
+                                  </p:childTnLst>
+                                </p:cTn>
+                              </p:par>
+                            </p:childTnLst>
+                          </p:cTn>
+                        </p:par>
+                      </p:childTnLst>
+                    </p:cTn>
+                  </p:par>
+                </p:childTnLst>
+              </p:cTn>
+              <p:prevCondLst>
+                <p:cond evt="onPrev" delay="0">
+                  <p:tgtEl>
+                    <p:sldTgt/>
+                  </p:tgtEl>
+                </p:cond>
+              </p:prevCondLst>
+              <p:nextCondLst>
+                <p:cond evt="onNext" delay="0">
+                  <p:tgtEl>
+                    <p:sldTgt/>
+                  </p:tgtEl>
+                </p:cond>
+              </p:nextCondLst>
+            </p:seq>
+          </p:childTnLst>
+        </p:cTn>
+      </p:par>
+    </p:tnLst>
+    <p:bldLst>
+      <p:bldP spid="5" grpId="0"/>
+      <p:bldP spid="6" grpId="0"/>
+      <p:bldP spid="13" grpId="0"/>
+      <p:bldP spid="14" grpId="0" animBg="1"/>
+      <p:bldP spid="15" grpId="0" animBg="1"/>
+      <p:bldP spid="17" grpId="0" animBg="1"/>
+      <p:bldP spid="19" grpId="0" animBg="1"/>
+      <p:bldP spid="18" grpId="0" animBg="1"/>
+      <p:bldP spid="20" grpId="0" animBg="1"/>
+    </p:bldLst>
+  </p:timing>
+</p:sld>
+</file>
+
 <file path=ppt/theme/theme1.xml><?xml version="1.0" encoding="utf-8"?>
 <a:theme xmlns:a="http://schemas.openxmlformats.org/drawingml/2006/main" name="Module">
   <a:themeElements>

</xml_diff>